<commit_message>
Added my Limitations slide.
Changed a few words.
</commit_message>
<xml_diff>
--- a/Analysis of Healthcare and Congress.pptx
+++ b/Analysis of Healthcare and Congress.pptx
@@ -23,21 +23,22 @@
     <p:sldId id="268" r:id="rId18"/>
     <p:sldId id="269" r:id="rId19"/>
     <p:sldId id="270" r:id="rId20"/>
+    <p:sldId id="271" r:id="rId21"/>
   </p:sldIdLst>
   <p:sldSz cy="5143500" cx="9144000"/>
   <p:notesSz cx="6858000" cy="9144000"/>
   <p:embeddedFontLst>
     <p:embeddedFont>
       <p:font typeface="Roboto Slab"/>
-      <p:regular r:id="rId21"/>
-      <p:bold r:id="rId22"/>
+      <p:regular r:id="rId22"/>
+      <p:bold r:id="rId23"/>
     </p:embeddedFont>
     <p:embeddedFont>
       <p:font typeface="Roboto"/>
-      <p:regular r:id="rId23"/>
-      <p:bold r:id="rId24"/>
-      <p:italic r:id="rId25"/>
-      <p:boldItalic r:id="rId26"/>
+      <p:regular r:id="rId24"/>
+      <p:bold r:id="rId25"/>
+      <p:italic r:id="rId26"/>
+      <p:boldItalic r:id="rId27"/>
     </p:embeddedFont>
   </p:embeddedFontLst>
   <p:defaultTextStyle>
@@ -818,7 +819,7 @@
   <p:cSld>
     <p:spTree>
       <p:nvGrpSpPr>
-        <p:cNvPr id="140" name="Shape 140"/>
+        <p:cNvPr id="142" name="Shape 142"/>
         <p:cNvGrpSpPr/>
         <p:nvPr/>
       </p:nvGrpSpPr>
@@ -832,7 +833,7 @@
       </p:grpSpPr>
       <p:sp>
         <p:nvSpPr>
-          <p:cNvPr id="141" name="Google Shape;141;g2443ed070a7_0_83:notes"/>
+          <p:cNvPr id="143" name="Google Shape;143;g2443ed070a7_0_83:notes"/>
           <p:cNvSpPr/>
           <p:nvPr>
             <p:ph idx="2" type="sldImg"/>
@@ -867,7 +868,7 @@
       </p:sp>
       <p:sp>
         <p:nvSpPr>
-          <p:cNvPr id="142" name="Google Shape;142;g2443ed070a7_0_83:notes"/>
+          <p:cNvPr id="144" name="Google Shape;144;g2443ed070a7_0_83:notes"/>
           <p:cNvSpPr txBox="1"/>
           <p:nvPr>
             <p:ph idx="1" type="body"/>
@@ -917,7 +918,7 @@
   <p:cSld>
     <p:spTree>
       <p:nvGrpSpPr>
-        <p:cNvPr id="150" name="Shape 150"/>
+        <p:cNvPr id="153" name="Shape 153"/>
         <p:cNvGrpSpPr/>
         <p:nvPr/>
       </p:nvGrpSpPr>
@@ -931,7 +932,7 @@
       </p:grpSpPr>
       <p:sp>
         <p:nvSpPr>
-          <p:cNvPr id="151" name="Google Shape;151;g2443ed070a7_0_86:notes"/>
+          <p:cNvPr id="154" name="Google Shape;154;g2443ed070a7_0_86:notes"/>
           <p:cNvSpPr/>
           <p:nvPr>
             <p:ph idx="2" type="sldImg"/>
@@ -966,7 +967,7 @@
       </p:sp>
       <p:sp>
         <p:nvSpPr>
-          <p:cNvPr id="152" name="Google Shape;152;g2443ed070a7_0_86:notes"/>
+          <p:cNvPr id="155" name="Google Shape;155;g2443ed070a7_0_86:notes"/>
           <p:cNvSpPr txBox="1"/>
           <p:nvPr>
             <p:ph idx="1" type="body"/>
@@ -1016,7 +1017,7 @@
   <p:cSld>
     <p:spTree>
       <p:nvGrpSpPr>
-        <p:cNvPr id="160" name="Shape 160"/>
+        <p:cNvPr id="163" name="Shape 163"/>
         <p:cNvGrpSpPr/>
         <p:nvPr/>
       </p:nvGrpSpPr>
@@ -1030,7 +1031,7 @@
       </p:grpSpPr>
       <p:sp>
         <p:nvSpPr>
-          <p:cNvPr id="161" name="Google Shape;161;g2443ed070a7_1_200:notes"/>
+          <p:cNvPr id="164" name="Google Shape;164;g2443ed070a7_1_200:notes"/>
           <p:cNvSpPr/>
           <p:nvPr>
             <p:ph idx="2" type="sldImg"/>
@@ -1065,7 +1066,7 @@
       </p:sp>
       <p:sp>
         <p:nvSpPr>
-          <p:cNvPr id="162" name="Google Shape;162;g2443ed070a7_1_200:notes"/>
+          <p:cNvPr id="165" name="Google Shape;165;g2443ed070a7_1_200:notes"/>
           <p:cNvSpPr txBox="1"/>
           <p:nvPr>
             <p:ph idx="1" type="body"/>
@@ -1115,7 +1116,7 @@
   <p:cSld>
     <p:spTree>
       <p:nvGrpSpPr>
-        <p:cNvPr id="169" name="Shape 169"/>
+        <p:cNvPr id="172" name="Shape 172"/>
         <p:cNvGrpSpPr/>
         <p:nvPr/>
       </p:nvGrpSpPr>
@@ -1129,7 +1130,7 @@
       </p:grpSpPr>
       <p:sp>
         <p:nvSpPr>
-          <p:cNvPr id="170" name="Google Shape;170;g2443ed070a7_1_3:notes"/>
+          <p:cNvPr id="173" name="Google Shape;173;g2443ed070a7_1_3:notes"/>
           <p:cNvSpPr/>
           <p:nvPr>
             <p:ph idx="2" type="sldImg"/>
@@ -1164,7 +1165,7 @@
       </p:sp>
       <p:sp>
         <p:nvSpPr>
-          <p:cNvPr id="171" name="Google Shape;171;g2443ed070a7_1_3:notes"/>
+          <p:cNvPr id="174" name="Google Shape;174;g2443ed070a7_1_3:notes"/>
           <p:cNvSpPr txBox="1"/>
           <p:nvPr>
             <p:ph idx="1" type="body"/>
@@ -1214,7 +1215,7 @@
   <p:cSld>
     <p:spTree>
       <p:nvGrpSpPr>
-        <p:cNvPr id="176" name="Shape 176"/>
+        <p:cNvPr id="179" name="Shape 179"/>
         <p:cNvGrpSpPr/>
         <p:nvPr/>
       </p:nvGrpSpPr>
@@ -1228,7 +1229,7 @@
       </p:grpSpPr>
       <p:sp>
         <p:nvSpPr>
-          <p:cNvPr id="177" name="Google Shape;177;g2443ed070a7_1_9:notes"/>
+          <p:cNvPr id="180" name="Google Shape;180;g2443ed070a7_1_9:notes"/>
           <p:cNvSpPr/>
           <p:nvPr>
             <p:ph idx="2" type="sldImg"/>
@@ -1263,7 +1264,7 @@
       </p:sp>
       <p:sp>
         <p:nvSpPr>
-          <p:cNvPr id="178" name="Google Shape;178;g2443ed070a7_1_9:notes"/>
+          <p:cNvPr id="181" name="Google Shape;181;g2443ed070a7_1_9:notes"/>
           <p:cNvSpPr txBox="1"/>
           <p:nvPr>
             <p:ph idx="1" type="body"/>
@@ -1313,7 +1314,7 @@
   <p:cSld>
     <p:spTree>
       <p:nvGrpSpPr>
-        <p:cNvPr id="182" name="Shape 182"/>
+        <p:cNvPr id="185" name="Shape 185"/>
         <p:cNvGrpSpPr/>
         <p:nvPr/>
       </p:nvGrpSpPr>
@@ -1327,7 +1328,7 @@
       </p:grpSpPr>
       <p:sp>
         <p:nvSpPr>
-          <p:cNvPr id="183" name="Google Shape;183;g2443ed070a7_1_227:notes"/>
+          <p:cNvPr id="186" name="Google Shape;186;g2443ed070a7_1_232:notes"/>
           <p:cNvSpPr/>
           <p:nvPr>
             <p:ph idx="2" type="sldImg"/>
@@ -1362,7 +1363,106 @@
       </p:sp>
       <p:sp>
         <p:nvSpPr>
-          <p:cNvPr id="184" name="Google Shape;184;g2443ed070a7_1_227:notes"/>
+          <p:cNvPr id="187" name="Google Shape;187;g2443ed070a7_1_232:notes"/>
+          <p:cNvSpPr txBox="1"/>
+          <p:nvPr>
+            <p:ph idx="1" type="body"/>
+          </p:nvPr>
+        </p:nvSpPr>
+        <p:spPr>
+          <a:xfrm>
+            <a:off x="685800" y="4343400"/>
+            <a:ext cx="5486400" cy="4114800"/>
+          </a:xfrm>
+          <a:prstGeom prst="rect">
+            <a:avLst/>
+          </a:prstGeom>
+        </p:spPr>
+        <p:txBody>
+          <a:bodyPr anchorCtr="0" anchor="t" bIns="91425" lIns="91425" spcFirstLastPara="1" rIns="91425" wrap="square" tIns="91425">
+            <a:noAutofit/>
+          </a:bodyPr>
+          <a:lstStyle/>
+          <a:p>
+            <a:pPr indent="0" lvl="0" marL="0" rtl="0" algn="l">
+              <a:spcBef>
+                <a:spcPts val="0"/>
+              </a:spcBef>
+              <a:spcAft>
+                <a:spcPts val="0"/>
+              </a:spcAft>
+              <a:buNone/>
+            </a:pPr>
+            <a:r>
+              <a:t/>
+            </a:r>
+            <a:endParaRPr/>
+          </a:p>
+        </p:txBody>
+      </p:sp>
+    </p:spTree>
+  </p:cSld>
+  <p:clrMapOvr>
+    <a:masterClrMapping/>
+  </p:clrMapOvr>
+</p:notes>
+</file>
+
+<file path=ppt/notesSlides/notesSlide16.xml><?xml version="1.0" encoding="utf-8"?>
+<p:notes xmlns:a="http://schemas.openxmlformats.org/drawingml/2006/main" xmlns:r="http://schemas.openxmlformats.org/officeDocument/2006/relationships" xmlns:mc="http://schemas.openxmlformats.org/markup-compatibility/2006" xmlns:mv="urn:schemas-microsoft-com:mac:vml" xmlns:p="http://schemas.openxmlformats.org/presentationml/2006/main" xmlns:c="http://schemas.openxmlformats.org/drawingml/2006/chart" xmlns:dgm="http://schemas.openxmlformats.org/drawingml/2006/diagram" xmlns:o="urn:schemas-microsoft-com:office:office" xmlns:v="urn:schemas-microsoft-com:vml" xmlns:pvml="urn:schemas-microsoft-com:office:powerpoint" xmlns:com="http://schemas.openxmlformats.org/drawingml/2006/compatibility" xmlns:p14="http://schemas.microsoft.com/office/powerpoint/2010/main" xmlns:p15="http://schemas.microsoft.com/office/powerpoint/2012/main" xmlns:ahyp="http://schemas.microsoft.com/office/drawing/2018/hyperlinkcolor" showMasterPhAnim="0" showMasterSp="0">
+  <p:cSld>
+    <p:spTree>
+      <p:nvGrpSpPr>
+        <p:cNvPr id="191" name="Shape 191"/>
+        <p:cNvGrpSpPr/>
+        <p:nvPr/>
+      </p:nvGrpSpPr>
+      <p:grpSpPr>
+        <a:xfrm>
+          <a:off x="0" y="0"/>
+          <a:ext cx="0" cy="0"/>
+          <a:chOff x="0" y="0"/>
+          <a:chExt cx="0" cy="0"/>
+        </a:xfrm>
+      </p:grpSpPr>
+      <p:sp>
+        <p:nvSpPr>
+          <p:cNvPr id="192" name="Google Shape;192;g2443ed070a7_1_227:notes"/>
+          <p:cNvSpPr/>
+          <p:nvPr>
+            <p:ph idx="2" type="sldImg"/>
+          </p:nvPr>
+        </p:nvSpPr>
+        <p:spPr>
+          <a:xfrm>
+            <a:off x="381300" y="685800"/>
+            <a:ext cx="6096000" cy="3429000"/>
+          </a:xfrm>
+          <a:custGeom>
+            <a:rect b="b" l="l" r="r" t="t"/>
+            <a:pathLst>
+              <a:path extrusionOk="0" h="120000" w="120000">
+                <a:moveTo>
+                  <a:pt x="0" y="0"/>
+                </a:moveTo>
+                <a:lnTo>
+                  <a:pt x="120000" y="0"/>
+                </a:lnTo>
+                <a:lnTo>
+                  <a:pt x="120000" y="120000"/>
+                </a:lnTo>
+                <a:lnTo>
+                  <a:pt x="0" y="120000"/>
+                </a:lnTo>
+                <a:close/>
+              </a:path>
+            </a:pathLst>
+          </a:custGeom>
+        </p:spPr>
+      </p:sp>
+      <p:sp>
+        <p:nvSpPr>
+          <p:cNvPr id="193" name="Google Shape;193;g2443ed070a7_1_227:notes"/>
           <p:cNvSpPr txBox="1"/>
           <p:nvPr>
             <p:ph idx="1" type="body"/>
@@ -1907,7 +2007,7 @@
   <p:cSld>
     <p:spTree>
       <p:nvGrpSpPr>
-        <p:cNvPr id="111" name="Shape 111"/>
+        <p:cNvPr id="112" name="Shape 112"/>
         <p:cNvGrpSpPr/>
         <p:nvPr/>
       </p:nvGrpSpPr>
@@ -1921,7 +2021,7 @@
       </p:grpSpPr>
       <p:sp>
         <p:nvSpPr>
-          <p:cNvPr id="112" name="Google Shape;112;g2443ed070a7_1_188:notes"/>
+          <p:cNvPr id="113" name="Google Shape;113;g2443ed070a7_1_188:notes"/>
           <p:cNvSpPr/>
           <p:nvPr>
             <p:ph idx="2" type="sldImg"/>
@@ -1956,7 +2056,7 @@
       </p:sp>
       <p:sp>
         <p:nvSpPr>
-          <p:cNvPr id="113" name="Google Shape;113;g2443ed070a7_1_188:notes"/>
+          <p:cNvPr id="114" name="Google Shape;114;g2443ed070a7_1_188:notes"/>
           <p:cNvSpPr txBox="1"/>
           <p:nvPr>
             <p:ph idx="1" type="body"/>
@@ -2006,7 +2106,7 @@
   <p:cSld>
     <p:spTree>
       <p:nvGrpSpPr>
-        <p:cNvPr id="121" name="Shape 121"/>
+        <p:cNvPr id="122" name="Shape 122"/>
         <p:cNvGrpSpPr/>
         <p:nvPr/>
       </p:nvGrpSpPr>
@@ -2020,7 +2120,7 @@
       </p:grpSpPr>
       <p:sp>
         <p:nvSpPr>
-          <p:cNvPr id="122" name="Google Shape;122;g2443ed070a7_1_218:notes"/>
+          <p:cNvPr id="123" name="Google Shape;123;g2443ed070a7_1_218:notes"/>
           <p:cNvSpPr/>
           <p:nvPr>
             <p:ph idx="2" type="sldImg"/>
@@ -2055,7 +2155,7 @@
       </p:sp>
       <p:sp>
         <p:nvSpPr>
-          <p:cNvPr id="123" name="Google Shape;123;g2443ed070a7_1_218:notes"/>
+          <p:cNvPr id="124" name="Google Shape;124;g2443ed070a7_1_218:notes"/>
           <p:cNvSpPr txBox="1"/>
           <p:nvPr>
             <p:ph idx="1" type="body"/>
@@ -2105,7 +2205,7 @@
   <p:cSld>
     <p:spTree>
       <p:nvGrpSpPr>
-        <p:cNvPr id="130" name="Shape 130"/>
+        <p:cNvPr id="131" name="Shape 131"/>
         <p:cNvGrpSpPr/>
         <p:nvPr/>
       </p:nvGrpSpPr>
@@ -2119,7 +2219,7 @@
       </p:grpSpPr>
       <p:sp>
         <p:nvSpPr>
-          <p:cNvPr id="131" name="Google Shape;131;g2443ed070a7_0_80:notes"/>
+          <p:cNvPr id="132" name="Google Shape;132;g2443ed070a7_0_80:notes"/>
           <p:cNvSpPr/>
           <p:nvPr>
             <p:ph idx="2" type="sldImg"/>
@@ -2154,7 +2254,7 @@
       </p:sp>
       <p:sp>
         <p:nvSpPr>
-          <p:cNvPr id="132" name="Google Shape;132;g2443ed070a7_0_80:notes"/>
+          <p:cNvPr id="133" name="Google Shape;133;g2443ed070a7_0_80:notes"/>
           <p:cNvSpPr txBox="1"/>
           <p:nvPr>
             <p:ph idx="1" type="body"/>
@@ -7601,7 +7701,7 @@
   <p:cSld>
     <p:spTree>
       <p:nvGrpSpPr>
-        <p:cNvPr id="143" name="Shape 143"/>
+        <p:cNvPr id="145" name="Shape 145"/>
         <p:cNvGrpSpPr/>
         <p:nvPr/>
       </p:nvGrpSpPr>
@@ -7615,7 +7715,7 @@
       </p:grpSpPr>
       <p:pic>
         <p:nvPicPr>
-          <p:cNvPr id="144" name="Google Shape;144;p22"/>
+          <p:cNvPr id="146" name="Google Shape;146;p22"/>
           <p:cNvPicPr preferRelativeResize="0"/>
           <p:nvPr/>
         </p:nvPicPr>
@@ -7643,7 +7743,7 @@
       </p:pic>
       <p:pic>
         <p:nvPicPr>
-          <p:cNvPr id="145" name="Google Shape;145;p22"/>
+          <p:cNvPr id="147" name="Google Shape;147;p22"/>
           <p:cNvPicPr preferRelativeResize="0"/>
           <p:nvPr/>
         </p:nvPicPr>
@@ -7671,7 +7771,7 @@
       </p:pic>
       <p:sp>
         <p:nvSpPr>
-          <p:cNvPr id="146" name="Google Shape;146;p22"/>
+          <p:cNvPr id="148" name="Google Shape;148;p22"/>
           <p:cNvSpPr/>
           <p:nvPr/>
         </p:nvSpPr>
@@ -7723,7 +7823,7 @@
       </p:sp>
       <p:sp>
         <p:nvSpPr>
-          <p:cNvPr id="147" name="Google Shape;147;p22"/>
+          <p:cNvPr id="149" name="Google Shape;149;p22"/>
           <p:cNvSpPr/>
           <p:nvPr/>
         </p:nvSpPr>
@@ -7775,7 +7875,7 @@
       </p:sp>
       <p:sp>
         <p:nvSpPr>
-          <p:cNvPr id="148" name="Google Shape;148;p22"/>
+          <p:cNvPr id="150" name="Google Shape;150;p22"/>
           <p:cNvSpPr txBox="1"/>
           <p:nvPr/>
         </p:nvSpPr>
@@ -7833,7 +7933,7 @@
       </p:sp>
       <p:sp>
         <p:nvSpPr>
-          <p:cNvPr id="149" name="Google Shape;149;p22"/>
+          <p:cNvPr id="151" name="Google Shape;151;p22"/>
           <p:cNvSpPr txBox="1"/>
           <p:nvPr/>
         </p:nvSpPr>
@@ -7856,7 +7956,7 @@
           </a:bodyPr>
           <a:lstStyle/>
           <a:p>
-            <a:pPr indent="0" lvl="0" marL="0" rtl="0" algn="l">
+            <a:pPr indent="0" lvl="0" marL="0" rtl="0" algn="ctr">
               <a:spcBef>
                 <a:spcPts val="0"/>
               </a:spcBef>
@@ -7875,7 +7975,7 @@
                 <a:cs typeface="Roboto"/>
                 <a:sym typeface="Roboto"/>
               </a:rPr>
-              <a:t>Still a significant number in the overall number of laws passed, however it has slid down from congress 116, 4200 to merely around 70!</a:t>
+              <a:t>Still a significant increase (p=0.0001) in the overall number of laws passed, however it has slid down from congress 116, 4200 to merely around 70!</a:t>
             </a:r>
             <a:endParaRPr>
               <a:solidFill>
@@ -7886,6 +7986,58 @@
               <a:cs typeface="Roboto"/>
               <a:sym typeface="Roboto"/>
             </a:endParaRPr>
+          </a:p>
+        </p:txBody>
+      </p:sp>
+      <p:sp>
+        <p:nvSpPr>
+          <p:cNvPr id="152" name="Google Shape;152;p22"/>
+          <p:cNvSpPr/>
+          <p:nvPr/>
+        </p:nvSpPr>
+        <p:spPr>
+          <a:xfrm rot="-643651">
+            <a:off x="3544986" y="1425269"/>
+            <a:ext cx="665633" cy="232702"/>
+          </a:xfrm>
+          <a:prstGeom prst="leftArrow">
+            <a:avLst>
+              <a:gd fmla="val 50000" name="adj1"/>
+              <a:gd fmla="val 50000" name="adj2"/>
+            </a:avLst>
+          </a:prstGeom>
+          <a:solidFill>
+            <a:srgbClr val="FF0000"/>
+          </a:solidFill>
+          <a:ln cap="flat" cmpd="sng" w="9525">
+            <a:solidFill>
+              <a:schemeClr val="dk2"/>
+            </a:solidFill>
+            <a:prstDash val="solid"/>
+            <a:round/>
+            <a:headEnd len="sm" w="sm" type="none"/>
+            <a:tailEnd len="sm" w="sm" type="none"/>
+          </a:ln>
+        </p:spPr>
+        <p:txBody>
+          <a:bodyPr anchorCtr="0" anchor="ctr" bIns="91425" lIns="91425" spcFirstLastPara="1" rIns="91425" wrap="square" tIns="91425">
+            <a:noAutofit/>
+          </a:bodyPr>
+          <a:lstStyle/>
+          <a:p>
+            <a:pPr indent="0" lvl="0" marL="0" rtl="0" algn="l">
+              <a:spcBef>
+                <a:spcPts val="0"/>
+              </a:spcBef>
+              <a:spcAft>
+                <a:spcPts val="0"/>
+              </a:spcAft>
+              <a:buNone/>
+            </a:pPr>
+            <a:r>
+              <a:t/>
+            </a:r>
+            <a:endParaRPr/>
           </a:p>
         </p:txBody>
       </p:sp>
@@ -7902,7 +8054,7 @@
   <p:cSld>
     <p:spTree>
       <p:nvGrpSpPr>
-        <p:cNvPr id="153" name="Shape 153"/>
+        <p:cNvPr id="156" name="Shape 156"/>
         <p:cNvGrpSpPr/>
         <p:nvPr/>
       </p:nvGrpSpPr>
@@ -7916,7 +8068,7 @@
       </p:grpSpPr>
       <p:pic>
         <p:nvPicPr>
-          <p:cNvPr id="154" name="Google Shape;154;p23"/>
+          <p:cNvPr id="157" name="Google Shape;157;p23"/>
           <p:cNvPicPr preferRelativeResize="0"/>
           <p:nvPr/>
         </p:nvPicPr>
@@ -7944,7 +8096,7 @@
       </p:pic>
       <p:pic>
         <p:nvPicPr>
-          <p:cNvPr id="155" name="Google Shape;155;p23"/>
+          <p:cNvPr id="158" name="Google Shape;158;p23"/>
           <p:cNvPicPr preferRelativeResize="0"/>
           <p:nvPr/>
         </p:nvPicPr>
@@ -7972,7 +8124,7 @@
       </p:pic>
       <p:sp>
         <p:nvSpPr>
-          <p:cNvPr id="156" name="Google Shape;156;p23"/>
+          <p:cNvPr id="159" name="Google Shape;159;p23"/>
           <p:cNvSpPr/>
           <p:nvPr/>
         </p:nvSpPr>
@@ -8024,7 +8176,7 @@
       </p:sp>
       <p:sp>
         <p:nvSpPr>
-          <p:cNvPr id="157" name="Google Shape;157;p23"/>
+          <p:cNvPr id="160" name="Google Shape;160;p23"/>
           <p:cNvSpPr/>
           <p:nvPr/>
         </p:nvSpPr>
@@ -8076,7 +8228,7 @@
       </p:sp>
       <p:sp>
         <p:nvSpPr>
-          <p:cNvPr id="158" name="Google Shape;158;p23"/>
+          <p:cNvPr id="161" name="Google Shape;161;p23"/>
           <p:cNvSpPr txBox="1"/>
           <p:nvPr/>
         </p:nvSpPr>
@@ -8134,14 +8286,14 @@
       </p:sp>
       <p:sp>
         <p:nvSpPr>
-          <p:cNvPr id="159" name="Google Shape;159;p23"/>
+          <p:cNvPr id="162" name="Google Shape;162;p23"/>
           <p:cNvSpPr txBox="1"/>
           <p:nvPr/>
         </p:nvSpPr>
         <p:spPr>
           <a:xfrm>
             <a:off x="793750" y="4191000"/>
-            <a:ext cx="7286700" cy="615600"/>
+            <a:ext cx="7286700" cy="831300"/>
           </a:xfrm>
           <a:prstGeom prst="rect">
             <a:avLst/>
@@ -8157,7 +8309,7 @@
           </a:bodyPr>
           <a:lstStyle/>
           <a:p>
-            <a:pPr indent="0" lvl="0" marL="0" rtl="0" algn="l">
+            <a:pPr indent="0" lvl="0" marL="0" rtl="0" algn="ctr">
               <a:spcBef>
                 <a:spcPts val="0"/>
               </a:spcBef>
@@ -8224,7 +8376,7 @@
                 <a:cs typeface="Roboto"/>
                 <a:sym typeface="Roboto"/>
               </a:rPr>
-              <a:t> gone down, although the number of laws being passed has risen. This suggest less working together in congress.</a:t>
+              <a:t> gone down (p=0.01), although the number of laws being passed has risen. This suggest less working together in congress.</a:t>
             </a:r>
             <a:endParaRPr>
               <a:solidFill>
@@ -8251,7 +8403,7 @@
   <p:cSld>
     <p:spTree>
       <p:nvGrpSpPr>
-        <p:cNvPr id="163" name="Shape 163"/>
+        <p:cNvPr id="166" name="Shape 166"/>
         <p:cNvGrpSpPr/>
         <p:nvPr/>
       </p:nvGrpSpPr>
@@ -8265,7 +8417,7 @@
       </p:grpSpPr>
       <p:pic>
         <p:nvPicPr>
-          <p:cNvPr id="164" name="Google Shape;164;p24"/>
+          <p:cNvPr id="167" name="Google Shape;167;p24"/>
           <p:cNvPicPr preferRelativeResize="0"/>
           <p:nvPr/>
         </p:nvPicPr>
@@ -8293,7 +8445,7 @@
       </p:pic>
       <p:pic>
         <p:nvPicPr>
-          <p:cNvPr id="165" name="Google Shape;165;p24"/>
+          <p:cNvPr id="168" name="Google Shape;168;p24"/>
           <p:cNvPicPr preferRelativeResize="0"/>
           <p:nvPr/>
         </p:nvPicPr>
@@ -8321,7 +8473,7 @@
       </p:pic>
       <p:pic>
         <p:nvPicPr>
-          <p:cNvPr id="166" name="Google Shape;166;p24"/>
+          <p:cNvPr id="169" name="Google Shape;169;p24"/>
           <p:cNvPicPr preferRelativeResize="0"/>
           <p:nvPr/>
         </p:nvPicPr>
@@ -8349,7 +8501,7 @@
       </p:pic>
       <p:pic>
         <p:nvPicPr>
-          <p:cNvPr id="167" name="Google Shape;167;p24"/>
+          <p:cNvPr id="170" name="Google Shape;170;p24"/>
           <p:cNvPicPr preferRelativeResize="0"/>
           <p:nvPr/>
         </p:nvPicPr>
@@ -8377,7 +8529,7 @@
       </p:pic>
       <p:sp>
         <p:nvSpPr>
-          <p:cNvPr id="168" name="Google Shape;168;p24"/>
+          <p:cNvPr id="171" name="Google Shape;171;p24"/>
           <p:cNvSpPr txBox="1"/>
           <p:nvPr/>
         </p:nvSpPr>
@@ -8446,7 +8598,7 @@
   <p:cSld>
     <p:spTree>
       <p:nvGrpSpPr>
-        <p:cNvPr id="172" name="Shape 172"/>
+        <p:cNvPr id="175" name="Shape 175"/>
         <p:cNvGrpSpPr/>
         <p:nvPr/>
       </p:nvGrpSpPr>
@@ -8460,7 +8612,7 @@
       </p:grpSpPr>
       <p:pic>
         <p:nvPicPr>
-          <p:cNvPr id="173" name="Google Shape;173;p25"/>
+          <p:cNvPr id="176" name="Google Shape;176;p25"/>
           <p:cNvPicPr preferRelativeResize="0"/>
           <p:nvPr/>
         </p:nvPicPr>
@@ -8488,7 +8640,7 @@
       </p:pic>
       <p:sp>
         <p:nvSpPr>
-          <p:cNvPr id="174" name="Google Shape;174;p25"/>
+          <p:cNvPr id="177" name="Google Shape;177;p25"/>
           <p:cNvSpPr txBox="1"/>
           <p:nvPr/>
         </p:nvSpPr>
@@ -8546,13 +8698,13 @@
       </p:sp>
       <p:sp>
         <p:nvSpPr>
-          <p:cNvPr id="175" name="Google Shape;175;p25"/>
+          <p:cNvPr id="178" name="Google Shape;178;p25"/>
           <p:cNvSpPr txBox="1"/>
           <p:nvPr/>
         </p:nvSpPr>
         <p:spPr>
           <a:xfrm>
-            <a:off x="1008075" y="3786200"/>
+            <a:off x="1255300" y="3770325"/>
             <a:ext cx="6477000" cy="831300"/>
           </a:xfrm>
           <a:prstGeom prst="rect">
@@ -8569,7 +8721,7 @@
           </a:bodyPr>
           <a:lstStyle/>
           <a:p>
-            <a:pPr indent="0" lvl="0" marL="0" rtl="0" algn="l">
+            <a:pPr indent="0" lvl="0" marL="0" rtl="0" algn="ctr">
               <a:spcBef>
                 <a:spcPts val="0"/>
               </a:spcBef>
@@ -8663,7 +8815,7 @@
   <p:cSld>
     <p:spTree>
       <p:nvGrpSpPr>
-        <p:cNvPr id="179" name="Shape 179"/>
+        <p:cNvPr id="182" name="Shape 182"/>
         <p:cNvGrpSpPr/>
         <p:nvPr/>
       </p:nvGrpSpPr>
@@ -8677,7 +8829,7 @@
       </p:grpSpPr>
       <p:sp>
         <p:nvSpPr>
-          <p:cNvPr id="180" name="Google Shape;180;p26"/>
+          <p:cNvPr id="183" name="Google Shape;183;p26"/>
           <p:cNvSpPr txBox="1"/>
           <p:nvPr>
             <p:ph type="title"/>
@@ -8698,7 +8850,7 @@
           </a:bodyPr>
           <a:lstStyle/>
           <a:p>
-            <a:pPr indent="0" lvl="0" marL="0" rtl="0" algn="l">
+            <a:pPr indent="0" lvl="0" marL="0" rtl="0" algn="ctr">
               <a:spcBef>
                 <a:spcPts val="0"/>
               </a:spcBef>
@@ -8709,7 +8861,7 @@
             </a:pPr>
             <a:r>
               <a:rPr lang="en"/>
-              <a:t>Hypotheses Answer:</a:t>
+              <a:t>Hypotheses Answers:</a:t>
             </a:r>
             <a:endParaRPr/>
           </a:p>
@@ -8717,7 +8869,7 @@
       </p:sp>
       <p:sp>
         <p:nvSpPr>
-          <p:cNvPr id="181" name="Google Shape;181;p26"/>
+          <p:cNvPr id="184" name="Google Shape;184;p26"/>
           <p:cNvSpPr txBox="1"/>
           <p:nvPr>
             <p:ph idx="1" type="body"/>
@@ -8749,7 +8901,27 @@
             </a:pPr>
             <a:r>
               <a:rPr lang="en"/>
-              <a:t> - The age of congress is show to be </a:t>
+              <a:t> - The age of congress in </a:t>
+            </a:r>
+            <a:r>
+              <a:rPr lang="en"/>
+              <a:t>2005-2023 (recent group) </a:t>
+            </a:r>
+            <a:r>
+              <a:rPr lang="en"/>
+              <a:t>is shown to be </a:t>
+            </a:r>
+            <a:r>
+              <a:rPr lang="en">
+                <a:solidFill>
+                  <a:srgbClr val="FF0000"/>
+                </a:solidFill>
+              </a:rPr>
+              <a:t>positively</a:t>
+            </a:r>
+            <a:r>
+              <a:rPr lang="en"/>
+              <a:t> </a:t>
             </a:r>
             <a:r>
               <a:rPr lang="en"/>
@@ -8757,7 +8929,7 @@
             </a:r>
             <a:r>
               <a:rPr lang="en"/>
-              <a:t> different from the past 1923- 2005 and the recent grouping of 2005 - 2023</a:t>
+              <a:t> different from the past 1923-2005.</a:t>
             </a:r>
             <a:endParaRPr/>
           </a:p>
@@ -8773,10 +8945,26 @@
             </a:pPr>
             <a:r>
               <a:rPr lang="en"/>
-              <a:t>-  We have found that through a linear model, that there is a increase in the number of laws being passed, however there is a </a:t>
+              <a:t>-  We have found that through a linear model, that there is a </a:t>
+            </a:r>
+            <a:r>
+              <a:rPr lang="en">
+                <a:solidFill>
+                  <a:srgbClr val="FF0000"/>
+                </a:solidFill>
+              </a:rPr>
+              <a:t>increase</a:t>
             </a:r>
             <a:r>
               <a:rPr lang="en"/>
+              <a:t> in the number of laws being passed, however there is a </a:t>
+            </a:r>
+            <a:r>
+              <a:rPr lang="en">
+                <a:solidFill>
+                  <a:srgbClr val="FF0000"/>
+                </a:solidFill>
+              </a:rPr>
               <a:t>decrease</a:t>
             </a:r>
             <a:r>
@@ -8798,16 +8986,9 @@
 <file path=ppt/slides/slide15.xml><?xml version="1.0" encoding="utf-8"?>
 <p:sld xmlns:a="http://schemas.openxmlformats.org/drawingml/2006/main" xmlns:r="http://schemas.openxmlformats.org/officeDocument/2006/relationships" xmlns:mc="http://schemas.openxmlformats.org/markup-compatibility/2006" xmlns:mv="urn:schemas-microsoft-com:mac:vml" xmlns:p="http://schemas.openxmlformats.org/presentationml/2006/main" xmlns:c="http://schemas.openxmlformats.org/drawingml/2006/chart" xmlns:dgm="http://schemas.openxmlformats.org/drawingml/2006/diagram" xmlns:o="urn:schemas-microsoft-com:office:office" xmlns:v="urn:schemas-microsoft-com:vml" xmlns:pvml="urn:schemas-microsoft-com:office:powerpoint" xmlns:com="http://schemas.openxmlformats.org/drawingml/2006/compatibility" xmlns:p14="http://schemas.microsoft.com/office/powerpoint/2010/main" xmlns:p15="http://schemas.microsoft.com/office/powerpoint/2012/main" xmlns:ahyp="http://schemas.microsoft.com/office/drawing/2018/hyperlinkcolor">
   <p:cSld>
-    <p:bg>
-      <p:bgPr>
-        <a:solidFill>
-          <a:srgbClr val="FF9900"/>
-        </a:solidFill>
-      </p:bgPr>
-    </p:bg>
     <p:spTree>
       <p:nvGrpSpPr>
-        <p:cNvPr id="185" name="Shape 185"/>
+        <p:cNvPr id="188" name="Shape 188"/>
         <p:cNvGrpSpPr/>
         <p:nvPr/>
       </p:nvGrpSpPr>
@@ -8821,7 +9002,163 @@
       </p:grpSpPr>
       <p:sp>
         <p:nvSpPr>
-          <p:cNvPr id="186" name="Google Shape;186;p27"/>
+          <p:cNvPr id="189" name="Google Shape;189;p27"/>
+          <p:cNvSpPr txBox="1"/>
+          <p:nvPr>
+            <p:ph type="title"/>
+          </p:nvPr>
+        </p:nvSpPr>
+        <p:spPr>
+          <a:xfrm>
+            <a:off x="387900" y="458025"/>
+            <a:ext cx="8368200" cy="686100"/>
+          </a:xfrm>
+          <a:prstGeom prst="rect">
+            <a:avLst/>
+          </a:prstGeom>
+        </p:spPr>
+        <p:txBody>
+          <a:bodyPr anchorCtr="0" anchor="b" bIns="91425" lIns="91425" spcFirstLastPara="1" rIns="91425" wrap="square" tIns="91425">
+            <a:normAutofit/>
+          </a:bodyPr>
+          <a:lstStyle/>
+          <a:p>
+            <a:pPr indent="0" lvl="0" marL="0" rtl="0" algn="ctr">
+              <a:spcBef>
+                <a:spcPts val="0"/>
+              </a:spcBef>
+              <a:spcAft>
+                <a:spcPts val="0"/>
+              </a:spcAft>
+              <a:buNone/>
+            </a:pPr>
+            <a:r>
+              <a:rPr lang="en" sz="3200"/>
+              <a:t>Limitations</a:t>
+            </a:r>
+            <a:endParaRPr sz="3200"/>
+          </a:p>
+        </p:txBody>
+      </p:sp>
+      <p:sp>
+        <p:nvSpPr>
+          <p:cNvPr id="190" name="Google Shape;190;p27"/>
+          <p:cNvSpPr txBox="1"/>
+          <p:nvPr>
+            <p:ph idx="1" type="body"/>
+          </p:nvPr>
+        </p:nvSpPr>
+        <p:spPr>
+          <a:xfrm>
+            <a:off x="387900" y="1489824"/>
+            <a:ext cx="8368200" cy="3078900"/>
+          </a:xfrm>
+          <a:prstGeom prst="rect">
+            <a:avLst/>
+          </a:prstGeom>
+        </p:spPr>
+        <p:txBody>
+          <a:bodyPr anchorCtr="0" anchor="t" bIns="91425" lIns="91425" spcFirstLastPara="1" rIns="91425" wrap="square" tIns="91425">
+            <a:normAutofit/>
+          </a:bodyPr>
+          <a:lstStyle/>
+          <a:p>
+            <a:pPr indent="0" lvl="0" marL="0" rtl="0" algn="l">
+              <a:spcBef>
+                <a:spcPts val="0"/>
+              </a:spcBef>
+              <a:spcAft>
+                <a:spcPts val="0"/>
+              </a:spcAft>
+              <a:buNone/>
+            </a:pPr>
+            <a:r>
+              <a:rPr lang="en"/>
+              <a:t>- The original web scraping plan had to be downsized to a realistic level. Originally I planned to gather the bills under the healthcare search, find out how  congress people voted, and create a ggplot of how it trended over time.</a:t>
+            </a:r>
+            <a:endParaRPr/>
+          </a:p>
+          <a:p>
+            <a:pPr indent="0" lvl="0" marL="0" rtl="0" algn="l">
+              <a:spcBef>
+                <a:spcPts val="1200"/>
+              </a:spcBef>
+              <a:spcAft>
+                <a:spcPts val="0"/>
+              </a:spcAft>
+              <a:buNone/>
+            </a:pPr>
+            <a:r>
+              <a:rPr lang="en"/>
+              <a:t>- Limitation of data quality: I could not screen through individual healthcare bills, so some bills are strongly related to healthcare and others only mention it peripherally.  If I were able to screen more, I would have chosen to only count the healthcare bills that are </a:t>
+            </a:r>
+            <a:r>
+              <a:rPr b="1" lang="en"/>
+              <a:t>strongly</a:t>
+            </a:r>
+            <a:r>
+              <a:rPr lang="en"/>
+              <a:t> related to healthcare.</a:t>
+            </a:r>
+            <a:endParaRPr/>
+          </a:p>
+          <a:p>
+            <a:pPr indent="0" lvl="0" marL="0" rtl="0" algn="l">
+              <a:spcBef>
+                <a:spcPts val="1200"/>
+              </a:spcBef>
+              <a:spcAft>
+                <a:spcPts val="1200"/>
+              </a:spcAft>
+              <a:buNone/>
+            </a:pPr>
+            <a:r>
+              <a:rPr lang="en"/>
+              <a:t>- ggmap </a:t>
+            </a:r>
+            <a:r>
+              <a:rPr lang="en"/>
+              <a:t>is a little polygonal visually</a:t>
+            </a:r>
+            <a:endParaRPr/>
+          </a:p>
+        </p:txBody>
+      </p:sp>
+    </p:spTree>
+  </p:cSld>
+  <p:clrMapOvr>
+    <a:masterClrMapping/>
+  </p:clrMapOvr>
+</p:sld>
+</file>
+
+<file path=ppt/slides/slide16.xml><?xml version="1.0" encoding="utf-8"?>
+<p:sld xmlns:a="http://schemas.openxmlformats.org/drawingml/2006/main" xmlns:r="http://schemas.openxmlformats.org/officeDocument/2006/relationships" xmlns:mc="http://schemas.openxmlformats.org/markup-compatibility/2006" xmlns:mv="urn:schemas-microsoft-com:mac:vml" xmlns:p="http://schemas.openxmlformats.org/presentationml/2006/main" xmlns:c="http://schemas.openxmlformats.org/drawingml/2006/chart" xmlns:dgm="http://schemas.openxmlformats.org/drawingml/2006/diagram" xmlns:o="urn:schemas-microsoft-com:office:office" xmlns:v="urn:schemas-microsoft-com:vml" xmlns:pvml="urn:schemas-microsoft-com:office:powerpoint" xmlns:com="http://schemas.openxmlformats.org/drawingml/2006/compatibility" xmlns:p14="http://schemas.microsoft.com/office/powerpoint/2010/main" xmlns:p15="http://schemas.microsoft.com/office/powerpoint/2012/main" xmlns:ahyp="http://schemas.microsoft.com/office/drawing/2018/hyperlinkcolor">
+  <p:cSld>
+    <p:bg>
+      <p:bgPr>
+        <a:solidFill>
+          <a:srgbClr val="FF9900"/>
+        </a:solidFill>
+      </p:bgPr>
+    </p:bg>
+    <p:spTree>
+      <p:nvGrpSpPr>
+        <p:cNvPr id="194" name="Shape 194"/>
+        <p:cNvGrpSpPr/>
+        <p:nvPr/>
+      </p:nvGrpSpPr>
+      <p:grpSpPr>
+        <a:xfrm>
+          <a:off x="0" y="0"/>
+          <a:ext cx="0" cy="0"/>
+          <a:chOff x="0" y="0"/>
+          <a:chExt cx="0" cy="0"/>
+        </a:xfrm>
+      </p:grpSpPr>
+      <p:sp>
+        <p:nvSpPr>
+          <p:cNvPr id="195" name="Google Shape;195;p28"/>
           <p:cNvSpPr txBox="1"/>
           <p:nvPr>
             <p:ph type="title"/>
@@ -8861,7 +9198,7 @@
       </p:sp>
       <p:sp>
         <p:nvSpPr>
-          <p:cNvPr id="187" name="Google Shape;187;p27"/>
+          <p:cNvPr id="196" name="Google Shape;196;p28"/>
           <p:cNvSpPr txBox="1"/>
           <p:nvPr>
             <p:ph idx="1" type="body"/>
@@ -8987,14 +9324,15 @@
           </a:bodyPr>
           <a:lstStyle/>
           <a:p>
-            <a:pPr indent="0" lvl="0" marL="0" rtl="0" algn="ctr">
-              <a:spcBef>
-                <a:spcPts val="0"/>
-              </a:spcBef>
-              <a:spcAft>
-                <a:spcPts val="0"/>
-              </a:spcAft>
-              <a:buNone/>
+            <a:pPr indent="-342900" lvl="0" marL="457200" rtl="0" algn="l">
+              <a:spcBef>
+                <a:spcPts val="0"/>
+              </a:spcBef>
+              <a:spcAft>
+                <a:spcPts val="0"/>
+              </a:spcAft>
+              <a:buSzPts val="1800"/>
+              <a:buChar char="●"/>
             </a:pPr>
             <a:r>
               <a:rPr lang="en"/>
@@ -9003,6 +9341,23 @@
             <a:endParaRPr/>
           </a:p>
           <a:p>
+            <a:pPr indent="-342900" lvl="0" marL="457200" rtl="0" algn="l">
+              <a:spcBef>
+                <a:spcPts val="0"/>
+              </a:spcBef>
+              <a:spcAft>
+                <a:spcPts val="0"/>
+              </a:spcAft>
+              <a:buSzPts val="1800"/>
+              <a:buChar char="●"/>
+            </a:pPr>
+            <a:r>
+              <a:rPr lang="en"/>
+              <a:t>Does healthcare in laws increase as congress age increases?</a:t>
+            </a:r>
+            <a:endParaRPr/>
+          </a:p>
+          <a:p>
             <a:pPr indent="0" lvl="0" marL="0" rtl="0" algn="ctr">
               <a:spcBef>
                 <a:spcPts val="1200"/>
@@ -9029,7 +9384,7 @@
             </a:pPr>
             <a:r>
               <a:rPr lang="en"/>
-              <a:t>Does healthcare in laws increase as congress age increases?</a:t>
+              <a:t>I think that yes, the age is increasing as time goes by, and that the healthcare laws or increasing.</a:t>
             </a:r>
             <a:endParaRPr/>
           </a:p>
@@ -9083,7 +9438,7 @@
           </a:bodyPr>
           <a:lstStyle/>
           <a:p>
-            <a:pPr indent="0" lvl="0" marL="0" rtl="0" algn="l">
+            <a:pPr indent="0" lvl="0" marL="0" rtl="0" algn="ctr">
               <a:spcBef>
                 <a:spcPts val="0"/>
               </a:spcBef>
@@ -9568,7 +9923,7 @@
           </a:bodyPr>
           <a:lstStyle/>
           <a:p>
-            <a:pPr indent="0" lvl="0" marL="0" rtl="0" algn="l">
+            <a:pPr indent="0" lvl="0" marL="0" rtl="0" algn="ctr">
               <a:spcBef>
                 <a:spcPts val="0"/>
               </a:spcBef>
@@ -10095,7 +10450,7 @@
           </a:bodyPr>
           <a:lstStyle/>
           <a:p>
-            <a:pPr indent="0" lvl="0" marL="0" rtl="0" algn="l">
+            <a:pPr indent="0" lvl="0" marL="0" rtl="0" algn="ctr">
               <a:spcBef>
                 <a:spcPts val="0"/>
               </a:spcBef>
@@ -10114,7 +10469,7 @@
                 <a:cs typeface="Roboto"/>
                 <a:sym typeface="Roboto"/>
               </a:rPr>
-              <a:t>Using the healthcare filter, we are given a robust data set. We have two subplots that we have extracted out of them the introduced laws and the became law.</a:t>
+              <a:t>Using the “health care” filter, we are given a robust data set. We have two subplots that we have extracted out of them the introduced laws and the became law.</a:t>
             </a:r>
             <a:endParaRPr>
               <a:solidFill>
@@ -10332,7 +10687,7 @@
           </a:bodyPr>
           <a:lstStyle/>
           <a:p>
-            <a:pPr indent="0" lvl="0" marL="0" rtl="0" algn="l">
+            <a:pPr indent="0" lvl="0" marL="0" rtl="0" algn="ctr">
               <a:spcBef>
                 <a:spcPts val="0"/>
               </a:spcBef>
@@ -10351,7 +10706,7 @@
                 <a:cs typeface="Roboto"/>
                 <a:sym typeface="Roboto"/>
               </a:rPr>
-              <a:t>Scrapped the data from the Affordable Cares Act, cleaned and </a:t>
+              <a:t>Scrapped the data from the Affordable Cares Act voting record, cleaned and </a:t>
             </a:r>
             <a:r>
               <a:rPr lang="en">
@@ -10377,6 +10732,60 @@
           </a:p>
         </p:txBody>
       </p:sp>
+      <p:sp>
+        <p:nvSpPr>
+          <p:cNvPr id="111" name="Google Shape;111;p18"/>
+          <p:cNvSpPr/>
+          <p:nvPr/>
+        </p:nvSpPr>
+        <p:spPr>
+          <a:xfrm rot="-5400000">
+            <a:off x="5320765" y="3103201"/>
+            <a:ext cx="607500" cy="672600"/>
+          </a:xfrm>
+          <a:prstGeom prst="bentArrow">
+            <a:avLst>
+              <a:gd fmla="val 36049" name="adj1"/>
+              <a:gd fmla="val 34474" name="adj2"/>
+              <a:gd fmla="val 25000" name="adj3"/>
+              <a:gd fmla="val 19062" name="adj4"/>
+            </a:avLst>
+          </a:prstGeom>
+          <a:solidFill>
+            <a:schemeClr val="lt2"/>
+          </a:solidFill>
+          <a:ln cap="flat" cmpd="sng" w="9525">
+            <a:solidFill>
+              <a:schemeClr val="dk2"/>
+            </a:solidFill>
+            <a:prstDash val="solid"/>
+            <a:round/>
+            <a:headEnd len="sm" w="sm" type="none"/>
+            <a:tailEnd len="sm" w="sm" type="none"/>
+          </a:ln>
+        </p:spPr>
+        <p:txBody>
+          <a:bodyPr anchorCtr="0" anchor="ctr" bIns="91425" lIns="91425" spcFirstLastPara="1" rIns="91425" wrap="square" tIns="91425">
+            <a:noAutofit/>
+          </a:bodyPr>
+          <a:lstStyle/>
+          <a:p>
+            <a:pPr indent="0" lvl="0" marL="0" rtl="0" algn="l">
+              <a:spcBef>
+                <a:spcPts val="0"/>
+              </a:spcBef>
+              <a:spcAft>
+                <a:spcPts val="0"/>
+              </a:spcAft>
+              <a:buNone/>
+            </a:pPr>
+            <a:r>
+              <a:t/>
+            </a:r>
+            <a:endParaRPr/>
+          </a:p>
+        </p:txBody>
+      </p:sp>
     </p:spTree>
   </p:cSld>
   <p:clrMapOvr>
@@ -10390,7 +10799,7 @@
   <p:cSld>
     <p:spTree>
       <p:nvGrpSpPr>
-        <p:cNvPr id="114" name="Shape 114"/>
+        <p:cNvPr id="115" name="Shape 115"/>
         <p:cNvGrpSpPr/>
         <p:nvPr/>
       </p:nvGrpSpPr>
@@ -10404,7 +10813,7 @@
       </p:grpSpPr>
       <p:pic>
         <p:nvPicPr>
-          <p:cNvPr id="115" name="Google Shape;115;p19"/>
+          <p:cNvPr id="116" name="Google Shape;116;p19"/>
           <p:cNvPicPr preferRelativeResize="0"/>
           <p:nvPr/>
         </p:nvPicPr>
@@ -10432,7 +10841,7 @@
       </p:pic>
       <p:pic>
         <p:nvPicPr>
-          <p:cNvPr id="116" name="Google Shape;116;p19"/>
+          <p:cNvPr id="117" name="Google Shape;117;p19"/>
           <p:cNvPicPr preferRelativeResize="0"/>
           <p:nvPr/>
         </p:nvPicPr>
@@ -10460,7 +10869,7 @@
       </p:pic>
       <p:sp>
         <p:nvSpPr>
-          <p:cNvPr id="117" name="Google Shape;117;p19"/>
+          <p:cNvPr id="118" name="Google Shape;118;p19"/>
           <p:cNvSpPr/>
           <p:nvPr/>
         </p:nvSpPr>
@@ -10512,7 +10921,7 @@
       </p:sp>
       <p:sp>
         <p:nvSpPr>
-          <p:cNvPr id="118" name="Google Shape;118;p19"/>
+          <p:cNvPr id="119" name="Google Shape;119;p19"/>
           <p:cNvSpPr txBox="1"/>
           <p:nvPr/>
         </p:nvSpPr>
@@ -10570,7 +10979,7 @@
       </p:sp>
       <p:sp>
         <p:nvSpPr>
-          <p:cNvPr id="119" name="Google Shape;119;p19"/>
+          <p:cNvPr id="120" name="Google Shape;120;p19"/>
           <p:cNvSpPr txBox="1"/>
           <p:nvPr/>
         </p:nvSpPr>
@@ -10616,7 +11025,7 @@
       </p:sp>
       <p:sp>
         <p:nvSpPr>
-          <p:cNvPr id="120" name="Google Shape;120;p19"/>
+          <p:cNvPr id="121" name="Google Shape;121;p19"/>
           <p:cNvSpPr txBox="1"/>
           <p:nvPr/>
         </p:nvSpPr>
@@ -10639,7 +11048,7 @@
           </a:bodyPr>
           <a:lstStyle/>
           <a:p>
-            <a:pPr indent="0" lvl="0" marL="0" rtl="0" algn="l">
+            <a:pPr indent="0" lvl="0" marL="0" rtl="0" algn="ctr">
               <a:spcBef>
                 <a:spcPts val="0"/>
               </a:spcBef>
@@ -10685,7 +11094,7 @@
   <p:cSld>
     <p:spTree>
       <p:nvGrpSpPr>
-        <p:cNvPr id="124" name="Shape 124"/>
+        <p:cNvPr id="125" name="Shape 125"/>
         <p:cNvGrpSpPr/>
         <p:nvPr/>
       </p:nvGrpSpPr>
@@ -10699,7 +11108,7 @@
       </p:grpSpPr>
       <p:pic>
         <p:nvPicPr>
-          <p:cNvPr id="125" name="Google Shape;125;p20"/>
+          <p:cNvPr id="126" name="Google Shape;126;p20"/>
           <p:cNvPicPr preferRelativeResize="0"/>
           <p:nvPr/>
         </p:nvPicPr>
@@ -10727,7 +11136,7 @@
       </p:pic>
       <p:sp>
         <p:nvSpPr>
-          <p:cNvPr id="126" name="Google Shape;126;p20"/>
+          <p:cNvPr id="127" name="Google Shape;127;p20"/>
           <p:cNvSpPr txBox="1"/>
           <p:nvPr/>
         </p:nvSpPr>
@@ -10785,14 +11194,14 @@
       </p:sp>
       <p:sp>
         <p:nvSpPr>
-          <p:cNvPr id="127" name="Google Shape;127;p20"/>
+          <p:cNvPr id="128" name="Google Shape;128;p20"/>
           <p:cNvSpPr txBox="1"/>
           <p:nvPr/>
         </p:nvSpPr>
         <p:spPr>
           <a:xfrm>
             <a:off x="881075" y="4214825"/>
-            <a:ext cx="7509000" cy="400200"/>
+            <a:ext cx="7509000" cy="615600"/>
           </a:xfrm>
           <a:prstGeom prst="rect">
             <a:avLst/>
@@ -10808,7 +11217,7 @@
           </a:bodyPr>
           <a:lstStyle/>
           <a:p>
-            <a:pPr indent="0" lvl="0" marL="0" rtl="0" algn="l">
+            <a:pPr indent="0" lvl="0" marL="0" rtl="0" algn="ctr">
               <a:spcBef>
                 <a:spcPts val="0"/>
               </a:spcBef>
@@ -10851,7 +11260,7 @@
                 <a:cs typeface="Roboto"/>
                 <a:sym typeface="Roboto"/>
               </a:rPr>
-              <a:t> difference between the two time periods. </a:t>
+              <a:t> difference between the most recent 20 years (2005-2023) and the years before (1925-2005). </a:t>
             </a:r>
             <a:endParaRPr>
               <a:solidFill>
@@ -10867,7 +11276,7 @@
       </p:sp>
       <p:pic>
         <p:nvPicPr>
-          <p:cNvPr id="128" name="Google Shape;128;p20"/>
+          <p:cNvPr id="129" name="Google Shape;129;p20"/>
           <p:cNvPicPr preferRelativeResize="0"/>
           <p:nvPr/>
         </p:nvPicPr>
@@ -10895,7 +11304,7 @@
       </p:pic>
       <p:sp>
         <p:nvSpPr>
-          <p:cNvPr id="129" name="Google Shape;129;p20"/>
+          <p:cNvPr id="130" name="Google Shape;130;p20"/>
           <p:cNvSpPr/>
           <p:nvPr/>
         </p:nvSpPr>
@@ -10958,7 +11367,7 @@
   <p:cSld>
     <p:spTree>
       <p:nvGrpSpPr>
-        <p:cNvPr id="133" name="Shape 133"/>
+        <p:cNvPr id="134" name="Shape 134"/>
         <p:cNvGrpSpPr/>
         <p:nvPr/>
       </p:nvGrpSpPr>
@@ -10972,7 +11381,7 @@
       </p:grpSpPr>
       <p:pic>
         <p:nvPicPr>
-          <p:cNvPr id="134" name="Google Shape;134;p21"/>
+          <p:cNvPr id="135" name="Google Shape;135;p21"/>
           <p:cNvPicPr preferRelativeResize="0"/>
           <p:nvPr/>
         </p:nvPicPr>
@@ -11000,7 +11409,7 @@
       </p:pic>
       <p:pic>
         <p:nvPicPr>
-          <p:cNvPr id="135" name="Google Shape;135;p21"/>
+          <p:cNvPr id="136" name="Google Shape;136;p21"/>
           <p:cNvPicPr preferRelativeResize="0"/>
           <p:nvPr/>
         </p:nvPicPr>
@@ -11028,7 +11437,7 @@
       </p:pic>
       <p:sp>
         <p:nvSpPr>
-          <p:cNvPr id="136" name="Google Shape;136;p21"/>
+          <p:cNvPr id="137" name="Google Shape;137;p21"/>
           <p:cNvSpPr/>
           <p:nvPr/>
         </p:nvSpPr>
@@ -11080,7 +11489,7 @@
       </p:sp>
       <p:sp>
         <p:nvSpPr>
-          <p:cNvPr id="137" name="Google Shape;137;p21"/>
+          <p:cNvPr id="138" name="Google Shape;138;p21"/>
           <p:cNvSpPr/>
           <p:nvPr/>
         </p:nvSpPr>
@@ -11132,7 +11541,7 @@
       </p:sp>
       <p:sp>
         <p:nvSpPr>
-          <p:cNvPr id="138" name="Google Shape;138;p21"/>
+          <p:cNvPr id="139" name="Google Shape;139;p21"/>
           <p:cNvSpPr txBox="1"/>
           <p:nvPr/>
         </p:nvSpPr>
@@ -11190,7 +11599,7 @@
       </p:sp>
       <p:sp>
         <p:nvSpPr>
-          <p:cNvPr id="139" name="Google Shape;139;p21"/>
+          <p:cNvPr id="140" name="Google Shape;140;p21"/>
           <p:cNvSpPr txBox="1"/>
           <p:nvPr/>
         </p:nvSpPr>
@@ -11213,7 +11622,7 @@
           </a:bodyPr>
           <a:lstStyle/>
           <a:p>
-            <a:pPr indent="0" lvl="0" marL="0" rtl="0" algn="l">
+            <a:pPr indent="0" lvl="0" marL="0" rtl="0" algn="ctr">
               <a:spcBef>
                 <a:spcPts val="0"/>
               </a:spcBef>
@@ -11256,7 +11665,7 @@
                 <a:cs typeface="Roboto"/>
                 <a:sym typeface="Roboto"/>
               </a:rPr>
-              <a:t> increase in how many laws were proposed as the linear model suggests.  In congress 116 nearly 4200 laws proposed.</a:t>
+              <a:t> increase (p=8e-06) in how many laws were proposed as the linear model suggests.  In congress 116 nearly 4200 laws were proposed.</a:t>
             </a:r>
             <a:endParaRPr>
               <a:solidFill>
@@ -11270,6 +11679,58 @@
           </a:p>
         </p:txBody>
       </p:sp>
+      <p:sp>
+        <p:nvSpPr>
+          <p:cNvPr id="141" name="Google Shape;141;p21"/>
+          <p:cNvSpPr/>
+          <p:nvPr/>
+        </p:nvSpPr>
+        <p:spPr>
+          <a:xfrm>
+            <a:off x="3524250" y="1301750"/>
+            <a:ext cx="412800" cy="190500"/>
+          </a:xfrm>
+          <a:prstGeom prst="leftArrow">
+            <a:avLst>
+              <a:gd fmla="val 50000" name="adj1"/>
+              <a:gd fmla="val 50000" name="adj2"/>
+            </a:avLst>
+          </a:prstGeom>
+          <a:solidFill>
+            <a:srgbClr val="FF0000"/>
+          </a:solidFill>
+          <a:ln cap="flat" cmpd="sng" w="9525">
+            <a:solidFill>
+              <a:schemeClr val="dk2"/>
+            </a:solidFill>
+            <a:prstDash val="solid"/>
+            <a:round/>
+            <a:headEnd len="sm" w="sm" type="none"/>
+            <a:tailEnd len="sm" w="sm" type="none"/>
+          </a:ln>
+        </p:spPr>
+        <p:txBody>
+          <a:bodyPr anchorCtr="0" anchor="ctr" bIns="91425" lIns="91425" spcFirstLastPara="1" rIns="91425" wrap="square" tIns="91425">
+            <a:noAutofit/>
+          </a:bodyPr>
+          <a:lstStyle/>
+          <a:p>
+            <a:pPr indent="0" lvl="0" marL="0" rtl="0" algn="l">
+              <a:spcBef>
+                <a:spcPts val="0"/>
+              </a:spcBef>
+              <a:spcAft>
+                <a:spcPts val="0"/>
+              </a:spcAft>
+              <a:buNone/>
+            </a:pPr>
+            <a:r>
+              <a:t/>
+            </a:r>
+            <a:endParaRPr/>
+          </a:p>
+        </p:txBody>
+      </p:sp>
     </p:spTree>
   </p:cSld>
   <p:clrMapOvr>
@@ -11279,6 +11740,285 @@
 </file>
 
 <file path=ppt/theme/theme1.xml><?xml version="1.0" encoding="utf-8"?>
+<a:theme xmlns:a="http://schemas.openxmlformats.org/drawingml/2006/main" xmlns:r="http://schemas.openxmlformats.org/officeDocument/2006/relationships" name="Marina">
+  <a:themeElements>
+    <a:clrScheme name="Marina">
+      <a:dk1>
+        <a:srgbClr val="FFFFFF"/>
+      </a:dk1>
+      <a:lt1>
+        <a:srgbClr val="00517C"/>
+      </a:lt1>
+      <a:dk2>
+        <a:srgbClr val="004065"/>
+      </a:dk2>
+      <a:lt2>
+        <a:srgbClr val="CFD8DC"/>
+      </a:lt2>
+      <a:accent1>
+        <a:srgbClr val="0277BD"/>
+      </a:accent1>
+      <a:accent2>
+        <a:srgbClr val="558B2F"/>
+      </a:accent2>
+      <a:accent3>
+        <a:srgbClr val="009688"/>
+      </a:accent3>
+      <a:accent4>
+        <a:srgbClr val="039BE5"/>
+      </a:accent4>
+      <a:accent5>
+        <a:srgbClr val="8BC34A"/>
+      </a:accent5>
+      <a:accent6>
+        <a:srgbClr val="FFEB38"/>
+      </a:accent6>
+      <a:hlink>
+        <a:srgbClr val="8BC34A"/>
+      </a:hlink>
+      <a:folHlink>
+        <a:srgbClr val="8BC34A"/>
+      </a:folHlink>
+    </a:clrScheme>
+    <a:fontScheme name="Office">
+      <a:majorFont>
+        <a:latin typeface="Arial"/>
+        <a:ea typeface=""/>
+        <a:cs typeface=""/>
+        <a:font script="Jpan" typeface="ＭＳ Ｐゴシック"/>
+        <a:font script="Hang" typeface="맑은 고딕"/>
+        <a:font script="Hans" typeface="宋体"/>
+        <a:font script="Hant" typeface="新細明體"/>
+        <a:font script="Arab" typeface="Times New Roman"/>
+        <a:font script="Hebr" typeface="Times New Roman"/>
+        <a:font script="Thai" typeface="Angsana New"/>
+        <a:font script="Ethi" typeface="Nyala"/>
+        <a:font script="Beng" typeface="Vrinda"/>
+        <a:font script="Gujr" typeface="Shruti"/>
+        <a:font script="Khmr" typeface="MoolBoran"/>
+        <a:font script="Knda" typeface="Tunga"/>
+        <a:font script="Guru" typeface="Raavi"/>
+        <a:font script="Cans" typeface="Euphemia"/>
+        <a:font script="Cher" typeface="Plantagenet Cherokee"/>
+        <a:font script="Yiii" typeface="Microsoft Yi Baiti"/>
+        <a:font script="Tibt" typeface="Microsoft Himalaya"/>
+        <a:font script="Thaa" typeface="MV Boli"/>
+        <a:font script="Deva" typeface="Mangal"/>
+        <a:font script="Telu" typeface="Gautami"/>
+        <a:font script="Taml" typeface="Latha"/>
+        <a:font script="Syrc" typeface="Estrangelo Edessa"/>
+        <a:font script="Orya" typeface="Kalinga"/>
+        <a:font script="Mlym" typeface="Kartika"/>
+        <a:font script="Laoo" typeface="DokChampa"/>
+        <a:font script="Sinh" typeface="Iskoola Pota"/>
+        <a:font script="Mong" typeface="Mongolian Baiti"/>
+        <a:font script="Viet" typeface="Times New Roman"/>
+        <a:font script="Uigh" typeface="Microsoft Uighur"/>
+        <a:font script="Geor" typeface="Sylfaen"/>
+      </a:majorFont>
+      <a:minorFont>
+        <a:latin typeface="Arial"/>
+        <a:ea typeface=""/>
+        <a:cs typeface=""/>
+        <a:font script="Jpan" typeface="ＭＳ Ｐゴシック"/>
+        <a:font script="Hang" typeface="맑은 고딕"/>
+        <a:font script="Hans" typeface="宋体"/>
+        <a:font script="Hant" typeface="新細明體"/>
+        <a:font script="Arab" typeface="Arial"/>
+        <a:font script="Hebr" typeface="Arial"/>
+        <a:font script="Thai" typeface="Cordia New"/>
+        <a:font script="Ethi" typeface="Nyala"/>
+        <a:font script="Beng" typeface="Vrinda"/>
+        <a:font script="Gujr" typeface="Shruti"/>
+        <a:font script="Khmr" typeface="DaunPenh"/>
+        <a:font script="Knda" typeface="Tunga"/>
+        <a:font script="Guru" typeface="Raavi"/>
+        <a:font script="Cans" typeface="Euphemia"/>
+        <a:font script="Cher" typeface="Plantagenet Cherokee"/>
+        <a:font script="Yiii" typeface="Microsoft Yi Baiti"/>
+        <a:font script="Tibt" typeface="Microsoft Himalaya"/>
+        <a:font script="Thaa" typeface="MV Boli"/>
+        <a:font script="Deva" typeface="Mangal"/>
+        <a:font script="Telu" typeface="Gautami"/>
+        <a:font script="Taml" typeface="Latha"/>
+        <a:font script="Syrc" typeface="Estrangelo Edessa"/>
+        <a:font script="Orya" typeface="Kalinga"/>
+        <a:font script="Mlym" typeface="Kartika"/>
+        <a:font script="Laoo" typeface="DokChampa"/>
+        <a:font script="Sinh" typeface="Iskoola Pota"/>
+        <a:font script="Mong" typeface="Mongolian Baiti"/>
+        <a:font script="Viet" typeface="Arial"/>
+        <a:font script="Uigh" typeface="Microsoft Uighur"/>
+        <a:font script="Geor" typeface="Sylfaen"/>
+      </a:minorFont>
+    </a:fontScheme>
+    <a:fmtScheme name="Office">
+      <a:fillStyleLst>
+        <a:solidFill>
+          <a:schemeClr val="phClr"/>
+        </a:solidFill>
+        <a:gradFill rotWithShape="1">
+          <a:gsLst>
+            <a:gs pos="0">
+              <a:schemeClr val="phClr">
+                <a:tint val="50000"/>
+                <a:satMod val="300000"/>
+              </a:schemeClr>
+            </a:gs>
+            <a:gs pos="35000">
+              <a:schemeClr val="phClr">
+                <a:tint val="37000"/>
+                <a:satMod val="300000"/>
+              </a:schemeClr>
+            </a:gs>
+            <a:gs pos="100000">
+              <a:schemeClr val="phClr">
+                <a:tint val="15000"/>
+                <a:satMod val="350000"/>
+              </a:schemeClr>
+            </a:gs>
+          </a:gsLst>
+          <a:lin ang="16200000" scaled="1"/>
+        </a:gradFill>
+        <a:gradFill rotWithShape="1">
+          <a:gsLst>
+            <a:gs pos="0">
+              <a:schemeClr val="phClr">
+                <a:tint val="100000"/>
+                <a:shade val="100000"/>
+                <a:satMod val="130000"/>
+              </a:schemeClr>
+            </a:gs>
+            <a:gs pos="100000">
+              <a:schemeClr val="phClr">
+                <a:tint val="50000"/>
+                <a:shade val="100000"/>
+                <a:satMod val="350000"/>
+              </a:schemeClr>
+            </a:gs>
+          </a:gsLst>
+          <a:lin ang="16200000" scaled="0"/>
+        </a:gradFill>
+      </a:fillStyleLst>
+      <a:lnStyleLst>
+        <a:ln w="9525" cap="flat" cmpd="sng" algn="ctr">
+          <a:solidFill>
+            <a:schemeClr val="phClr">
+              <a:shade val="95000"/>
+              <a:satMod val="105000"/>
+            </a:schemeClr>
+          </a:solidFill>
+          <a:prstDash val="solid"/>
+        </a:ln>
+        <a:ln w="25400" cap="flat" cmpd="sng" algn="ctr">
+          <a:solidFill>
+            <a:schemeClr val="phClr"/>
+          </a:solidFill>
+          <a:prstDash val="solid"/>
+        </a:ln>
+        <a:ln w="38100" cap="flat" cmpd="sng" algn="ctr">
+          <a:solidFill>
+            <a:schemeClr val="phClr"/>
+          </a:solidFill>
+          <a:prstDash val="solid"/>
+        </a:ln>
+      </a:lnStyleLst>
+      <a:effectStyleLst>
+        <a:effectStyle>
+          <a:effectLst>
+            <a:outerShdw blurRad="40000" dist="20000" dir="5400000" rotWithShape="0">
+              <a:srgbClr val="000000">
+                <a:alpha val="38000"/>
+              </a:srgbClr>
+            </a:outerShdw>
+          </a:effectLst>
+        </a:effectStyle>
+        <a:effectStyle>
+          <a:effectLst>
+            <a:outerShdw blurRad="40000" dist="23000" dir="5400000" rotWithShape="0">
+              <a:srgbClr val="000000">
+                <a:alpha val="35000"/>
+              </a:srgbClr>
+            </a:outerShdw>
+          </a:effectLst>
+        </a:effectStyle>
+        <a:effectStyle>
+          <a:effectLst>
+            <a:outerShdw blurRad="40000" dist="23000" dir="5400000" rotWithShape="0">
+              <a:srgbClr val="000000">
+                <a:alpha val="35000"/>
+              </a:srgbClr>
+            </a:outerShdw>
+          </a:effectLst>
+          <a:scene3d>
+            <a:camera prst="orthographicFront">
+              <a:rot lat="0" lon="0" rev="0"/>
+            </a:camera>
+            <a:lightRig rig="threePt" dir="t">
+              <a:rot lat="0" lon="0" rev="1200000"/>
+            </a:lightRig>
+          </a:scene3d>
+          <a:sp3d>
+            <a:bevelT w="63500" h="25400"/>
+          </a:sp3d>
+        </a:effectStyle>
+      </a:effectStyleLst>
+      <a:bgFillStyleLst>
+        <a:solidFill>
+          <a:schemeClr val="phClr"/>
+        </a:solidFill>
+        <a:gradFill rotWithShape="1">
+          <a:gsLst>
+            <a:gs pos="0">
+              <a:schemeClr val="phClr">
+                <a:tint val="40000"/>
+                <a:satMod val="350000"/>
+              </a:schemeClr>
+            </a:gs>
+            <a:gs pos="40000">
+              <a:schemeClr val="phClr">
+                <a:tint val="45000"/>
+                <a:shade val="99000"/>
+                <a:satMod val="350000"/>
+              </a:schemeClr>
+            </a:gs>
+            <a:gs pos="100000">
+              <a:schemeClr val="phClr">
+                <a:shade val="20000"/>
+                <a:satMod val="255000"/>
+              </a:schemeClr>
+            </a:gs>
+          </a:gsLst>
+          <a:path path="circle">
+            <a:fillToRect l="50000" t="-80000" r="50000" b="180000"/>
+          </a:path>
+        </a:gradFill>
+        <a:gradFill rotWithShape="1">
+          <a:gsLst>
+            <a:gs pos="0">
+              <a:schemeClr val="phClr">
+                <a:tint val="80000"/>
+                <a:satMod val="300000"/>
+              </a:schemeClr>
+            </a:gs>
+            <a:gs pos="100000">
+              <a:schemeClr val="phClr">
+                <a:shade val="30000"/>
+                <a:satMod val="200000"/>
+              </a:schemeClr>
+            </a:gs>
+          </a:gsLst>
+          <a:path path="circle">
+            <a:fillToRect l="50000" t="50000" r="50000" b="50000"/>
+          </a:path>
+        </a:gradFill>
+      </a:bgFillStyleLst>
+    </a:fmtScheme>
+  </a:themeElements>
+</a:theme>
+</file>
+
+<file path=ppt/theme/theme2.xml><?xml version="1.0" encoding="utf-8"?>
 <a:theme xmlns:a="http://schemas.openxmlformats.org/drawingml/2006/main" xmlns:r="http://schemas.openxmlformats.org/officeDocument/2006/relationships">
   <a:themeElements>
     <a:clrScheme name="Default">
@@ -11555,283 +12295,4 @@
     </a:fmtScheme>
   </a:themeElements>
 </a:theme>
-</file>
-
-<file path=ppt/theme/theme2.xml><?xml version="1.0" encoding="utf-8"?>
-<a:theme xmlns:a="http://schemas.openxmlformats.org/drawingml/2006/main" xmlns:r="http://schemas.openxmlformats.org/officeDocument/2006/relationships" name="Marina">
-  <a:themeElements>
-    <a:clrScheme name="Marina">
-      <a:dk1>
-        <a:srgbClr val="FFFFFF"/>
-      </a:dk1>
-      <a:lt1>
-        <a:srgbClr val="00517C"/>
-      </a:lt1>
-      <a:dk2>
-        <a:srgbClr val="004065"/>
-      </a:dk2>
-      <a:lt2>
-        <a:srgbClr val="CFD8DC"/>
-      </a:lt2>
-      <a:accent1>
-        <a:srgbClr val="0277BD"/>
-      </a:accent1>
-      <a:accent2>
-        <a:srgbClr val="558B2F"/>
-      </a:accent2>
-      <a:accent3>
-        <a:srgbClr val="009688"/>
-      </a:accent3>
-      <a:accent4>
-        <a:srgbClr val="039BE5"/>
-      </a:accent4>
-      <a:accent5>
-        <a:srgbClr val="8BC34A"/>
-      </a:accent5>
-      <a:accent6>
-        <a:srgbClr val="FFEB38"/>
-      </a:accent6>
-      <a:hlink>
-        <a:srgbClr val="8BC34A"/>
-      </a:hlink>
-      <a:folHlink>
-        <a:srgbClr val="8BC34A"/>
-      </a:folHlink>
-    </a:clrScheme>
-    <a:fontScheme name="Office">
-      <a:majorFont>
-        <a:latin typeface="Arial"/>
-        <a:ea typeface=""/>
-        <a:cs typeface=""/>
-        <a:font script="Jpan" typeface="ＭＳ Ｐゴシック"/>
-        <a:font script="Hang" typeface="맑은 고딕"/>
-        <a:font script="Hans" typeface="宋体"/>
-        <a:font script="Hant" typeface="新細明體"/>
-        <a:font script="Arab" typeface="Times New Roman"/>
-        <a:font script="Hebr" typeface="Times New Roman"/>
-        <a:font script="Thai" typeface="Angsana New"/>
-        <a:font script="Ethi" typeface="Nyala"/>
-        <a:font script="Beng" typeface="Vrinda"/>
-        <a:font script="Gujr" typeface="Shruti"/>
-        <a:font script="Khmr" typeface="MoolBoran"/>
-        <a:font script="Knda" typeface="Tunga"/>
-        <a:font script="Guru" typeface="Raavi"/>
-        <a:font script="Cans" typeface="Euphemia"/>
-        <a:font script="Cher" typeface="Plantagenet Cherokee"/>
-        <a:font script="Yiii" typeface="Microsoft Yi Baiti"/>
-        <a:font script="Tibt" typeface="Microsoft Himalaya"/>
-        <a:font script="Thaa" typeface="MV Boli"/>
-        <a:font script="Deva" typeface="Mangal"/>
-        <a:font script="Telu" typeface="Gautami"/>
-        <a:font script="Taml" typeface="Latha"/>
-        <a:font script="Syrc" typeface="Estrangelo Edessa"/>
-        <a:font script="Orya" typeface="Kalinga"/>
-        <a:font script="Mlym" typeface="Kartika"/>
-        <a:font script="Laoo" typeface="DokChampa"/>
-        <a:font script="Sinh" typeface="Iskoola Pota"/>
-        <a:font script="Mong" typeface="Mongolian Baiti"/>
-        <a:font script="Viet" typeface="Times New Roman"/>
-        <a:font script="Uigh" typeface="Microsoft Uighur"/>
-        <a:font script="Geor" typeface="Sylfaen"/>
-      </a:majorFont>
-      <a:minorFont>
-        <a:latin typeface="Arial"/>
-        <a:ea typeface=""/>
-        <a:cs typeface=""/>
-        <a:font script="Jpan" typeface="ＭＳ Ｐゴシック"/>
-        <a:font script="Hang" typeface="맑은 고딕"/>
-        <a:font script="Hans" typeface="宋体"/>
-        <a:font script="Hant" typeface="新細明體"/>
-        <a:font script="Arab" typeface="Arial"/>
-        <a:font script="Hebr" typeface="Arial"/>
-        <a:font script="Thai" typeface="Cordia New"/>
-        <a:font script="Ethi" typeface="Nyala"/>
-        <a:font script="Beng" typeface="Vrinda"/>
-        <a:font script="Gujr" typeface="Shruti"/>
-        <a:font script="Khmr" typeface="DaunPenh"/>
-        <a:font script="Knda" typeface="Tunga"/>
-        <a:font script="Guru" typeface="Raavi"/>
-        <a:font script="Cans" typeface="Euphemia"/>
-        <a:font script="Cher" typeface="Plantagenet Cherokee"/>
-        <a:font script="Yiii" typeface="Microsoft Yi Baiti"/>
-        <a:font script="Tibt" typeface="Microsoft Himalaya"/>
-        <a:font script="Thaa" typeface="MV Boli"/>
-        <a:font script="Deva" typeface="Mangal"/>
-        <a:font script="Telu" typeface="Gautami"/>
-        <a:font script="Taml" typeface="Latha"/>
-        <a:font script="Syrc" typeface="Estrangelo Edessa"/>
-        <a:font script="Orya" typeface="Kalinga"/>
-        <a:font script="Mlym" typeface="Kartika"/>
-        <a:font script="Laoo" typeface="DokChampa"/>
-        <a:font script="Sinh" typeface="Iskoola Pota"/>
-        <a:font script="Mong" typeface="Mongolian Baiti"/>
-        <a:font script="Viet" typeface="Arial"/>
-        <a:font script="Uigh" typeface="Microsoft Uighur"/>
-        <a:font script="Geor" typeface="Sylfaen"/>
-      </a:minorFont>
-    </a:fontScheme>
-    <a:fmtScheme name="Office">
-      <a:fillStyleLst>
-        <a:solidFill>
-          <a:schemeClr val="phClr"/>
-        </a:solidFill>
-        <a:gradFill rotWithShape="1">
-          <a:gsLst>
-            <a:gs pos="0">
-              <a:schemeClr val="phClr">
-                <a:tint val="50000"/>
-                <a:satMod val="300000"/>
-              </a:schemeClr>
-            </a:gs>
-            <a:gs pos="35000">
-              <a:schemeClr val="phClr">
-                <a:tint val="37000"/>
-                <a:satMod val="300000"/>
-              </a:schemeClr>
-            </a:gs>
-            <a:gs pos="100000">
-              <a:schemeClr val="phClr">
-                <a:tint val="15000"/>
-                <a:satMod val="350000"/>
-              </a:schemeClr>
-            </a:gs>
-          </a:gsLst>
-          <a:lin ang="16200000" scaled="1"/>
-        </a:gradFill>
-        <a:gradFill rotWithShape="1">
-          <a:gsLst>
-            <a:gs pos="0">
-              <a:schemeClr val="phClr">
-                <a:tint val="100000"/>
-                <a:shade val="100000"/>
-                <a:satMod val="130000"/>
-              </a:schemeClr>
-            </a:gs>
-            <a:gs pos="100000">
-              <a:schemeClr val="phClr">
-                <a:tint val="50000"/>
-                <a:shade val="100000"/>
-                <a:satMod val="350000"/>
-              </a:schemeClr>
-            </a:gs>
-          </a:gsLst>
-          <a:lin ang="16200000" scaled="0"/>
-        </a:gradFill>
-      </a:fillStyleLst>
-      <a:lnStyleLst>
-        <a:ln w="9525" cap="flat" cmpd="sng" algn="ctr">
-          <a:solidFill>
-            <a:schemeClr val="phClr">
-              <a:shade val="95000"/>
-              <a:satMod val="105000"/>
-            </a:schemeClr>
-          </a:solidFill>
-          <a:prstDash val="solid"/>
-        </a:ln>
-        <a:ln w="25400" cap="flat" cmpd="sng" algn="ctr">
-          <a:solidFill>
-            <a:schemeClr val="phClr"/>
-          </a:solidFill>
-          <a:prstDash val="solid"/>
-        </a:ln>
-        <a:ln w="38100" cap="flat" cmpd="sng" algn="ctr">
-          <a:solidFill>
-            <a:schemeClr val="phClr"/>
-          </a:solidFill>
-          <a:prstDash val="solid"/>
-        </a:ln>
-      </a:lnStyleLst>
-      <a:effectStyleLst>
-        <a:effectStyle>
-          <a:effectLst>
-            <a:outerShdw blurRad="40000" dist="20000" dir="5400000" rotWithShape="0">
-              <a:srgbClr val="000000">
-                <a:alpha val="38000"/>
-              </a:srgbClr>
-            </a:outerShdw>
-          </a:effectLst>
-        </a:effectStyle>
-        <a:effectStyle>
-          <a:effectLst>
-            <a:outerShdw blurRad="40000" dist="23000" dir="5400000" rotWithShape="0">
-              <a:srgbClr val="000000">
-                <a:alpha val="35000"/>
-              </a:srgbClr>
-            </a:outerShdw>
-          </a:effectLst>
-        </a:effectStyle>
-        <a:effectStyle>
-          <a:effectLst>
-            <a:outerShdw blurRad="40000" dist="23000" dir="5400000" rotWithShape="0">
-              <a:srgbClr val="000000">
-                <a:alpha val="35000"/>
-              </a:srgbClr>
-            </a:outerShdw>
-          </a:effectLst>
-          <a:scene3d>
-            <a:camera prst="orthographicFront">
-              <a:rot lat="0" lon="0" rev="0"/>
-            </a:camera>
-            <a:lightRig rig="threePt" dir="t">
-              <a:rot lat="0" lon="0" rev="1200000"/>
-            </a:lightRig>
-          </a:scene3d>
-          <a:sp3d>
-            <a:bevelT w="63500" h="25400"/>
-          </a:sp3d>
-        </a:effectStyle>
-      </a:effectStyleLst>
-      <a:bgFillStyleLst>
-        <a:solidFill>
-          <a:schemeClr val="phClr"/>
-        </a:solidFill>
-        <a:gradFill rotWithShape="1">
-          <a:gsLst>
-            <a:gs pos="0">
-              <a:schemeClr val="phClr">
-                <a:tint val="40000"/>
-                <a:satMod val="350000"/>
-              </a:schemeClr>
-            </a:gs>
-            <a:gs pos="40000">
-              <a:schemeClr val="phClr">
-                <a:tint val="45000"/>
-                <a:shade val="99000"/>
-                <a:satMod val="350000"/>
-              </a:schemeClr>
-            </a:gs>
-            <a:gs pos="100000">
-              <a:schemeClr val="phClr">
-                <a:shade val="20000"/>
-                <a:satMod val="255000"/>
-              </a:schemeClr>
-            </a:gs>
-          </a:gsLst>
-          <a:path path="circle">
-            <a:fillToRect l="50000" t="-80000" r="50000" b="180000"/>
-          </a:path>
-        </a:gradFill>
-        <a:gradFill rotWithShape="1">
-          <a:gsLst>
-            <a:gs pos="0">
-              <a:schemeClr val="phClr">
-                <a:tint val="80000"/>
-                <a:satMod val="300000"/>
-              </a:schemeClr>
-            </a:gs>
-            <a:gs pos="100000">
-              <a:schemeClr val="phClr">
-                <a:shade val="30000"/>
-                <a:satMod val="200000"/>
-              </a:schemeClr>
-            </a:gs>
-          </a:gsLst>
-          <a:path path="circle">
-            <a:fillToRect l="50000" t="50000" r="50000" b="50000"/>
-          </a:path>
-        </a:gradFill>
-      </a:bgFillStyleLst>
-    </a:fmtScheme>
-  </a:themeElements>
-</a:theme>
 </file>
</xml_diff>

<commit_message>
Highlighted some words, added Congress 116
</commit_message>
<xml_diff>
--- a/Analysis of Healthcare and Congress.pptx
+++ b/Analysis of Healthcare and Congress.pptx
@@ -24,21 +24,22 @@
     <p:sldId id="269" r:id="rId19"/>
     <p:sldId id="270" r:id="rId20"/>
     <p:sldId id="271" r:id="rId21"/>
+    <p:sldId id="272" r:id="rId22"/>
   </p:sldIdLst>
   <p:sldSz cy="5143500" cx="9144000"/>
   <p:notesSz cx="6858000" cy="9144000"/>
   <p:embeddedFontLst>
     <p:embeddedFont>
       <p:font typeface="Roboto Slab"/>
-      <p:regular r:id="rId22"/>
-      <p:bold r:id="rId23"/>
+      <p:regular r:id="rId23"/>
+      <p:bold r:id="rId24"/>
     </p:embeddedFont>
     <p:embeddedFont>
       <p:font typeface="Roboto"/>
-      <p:regular r:id="rId24"/>
-      <p:bold r:id="rId25"/>
-      <p:italic r:id="rId26"/>
-      <p:boldItalic r:id="rId27"/>
+      <p:regular r:id="rId25"/>
+      <p:bold r:id="rId26"/>
+      <p:italic r:id="rId27"/>
+      <p:boldItalic r:id="rId28"/>
     </p:embeddedFont>
   </p:embeddedFontLst>
   <p:defaultTextStyle>
@@ -819,7 +820,7 @@
   <p:cSld>
     <p:spTree>
       <p:nvGrpSpPr>
-        <p:cNvPr id="142" name="Shape 142"/>
+        <p:cNvPr id="143" name="Shape 143"/>
         <p:cNvGrpSpPr/>
         <p:nvPr/>
       </p:nvGrpSpPr>
@@ -833,7 +834,7 @@
       </p:grpSpPr>
       <p:sp>
         <p:nvSpPr>
-          <p:cNvPr id="143" name="Google Shape;143;g2443ed070a7_0_83:notes"/>
+          <p:cNvPr id="144" name="Google Shape;144;g2443ed070a7_0_80:notes"/>
           <p:cNvSpPr/>
           <p:nvPr>
             <p:ph idx="2" type="sldImg"/>
@@ -868,7 +869,7 @@
       </p:sp>
       <p:sp>
         <p:nvSpPr>
-          <p:cNvPr id="144" name="Google Shape;144;g2443ed070a7_0_83:notes"/>
+          <p:cNvPr id="145" name="Google Shape;145;g2443ed070a7_0_80:notes"/>
           <p:cNvSpPr txBox="1"/>
           <p:nvPr>
             <p:ph idx="1" type="body"/>
@@ -918,7 +919,7 @@
   <p:cSld>
     <p:spTree>
       <p:nvGrpSpPr>
-        <p:cNvPr id="153" name="Shape 153"/>
+        <p:cNvPr id="155" name="Shape 155"/>
         <p:cNvGrpSpPr/>
         <p:nvPr/>
       </p:nvGrpSpPr>
@@ -932,7 +933,7 @@
       </p:grpSpPr>
       <p:sp>
         <p:nvSpPr>
-          <p:cNvPr id="154" name="Google Shape;154;g2443ed070a7_0_86:notes"/>
+          <p:cNvPr id="156" name="Google Shape;156;g2443ed070a7_0_83:notes"/>
           <p:cNvSpPr/>
           <p:nvPr>
             <p:ph idx="2" type="sldImg"/>
@@ -967,7 +968,7 @@
       </p:sp>
       <p:sp>
         <p:nvSpPr>
-          <p:cNvPr id="155" name="Google Shape;155;g2443ed070a7_0_86:notes"/>
+          <p:cNvPr id="157" name="Google Shape;157;g2443ed070a7_0_83:notes"/>
           <p:cNvSpPr txBox="1"/>
           <p:nvPr>
             <p:ph idx="1" type="body"/>
@@ -1017,7 +1018,7 @@
   <p:cSld>
     <p:spTree>
       <p:nvGrpSpPr>
-        <p:cNvPr id="163" name="Shape 163"/>
+        <p:cNvPr id="167" name="Shape 167"/>
         <p:cNvGrpSpPr/>
         <p:nvPr/>
       </p:nvGrpSpPr>
@@ -1031,7 +1032,7 @@
       </p:grpSpPr>
       <p:sp>
         <p:nvSpPr>
-          <p:cNvPr id="164" name="Google Shape;164;g2443ed070a7_1_200:notes"/>
+          <p:cNvPr id="168" name="Google Shape;168;g2443ed070a7_0_86:notes"/>
           <p:cNvSpPr/>
           <p:nvPr>
             <p:ph idx="2" type="sldImg"/>
@@ -1066,7 +1067,7 @@
       </p:sp>
       <p:sp>
         <p:nvSpPr>
-          <p:cNvPr id="165" name="Google Shape;165;g2443ed070a7_1_200:notes"/>
+          <p:cNvPr id="169" name="Google Shape;169;g2443ed070a7_0_86:notes"/>
           <p:cNvSpPr txBox="1"/>
           <p:nvPr>
             <p:ph idx="1" type="body"/>
@@ -1116,7 +1117,7 @@
   <p:cSld>
     <p:spTree>
       <p:nvGrpSpPr>
-        <p:cNvPr id="172" name="Shape 172"/>
+        <p:cNvPr id="179" name="Shape 179"/>
         <p:cNvGrpSpPr/>
         <p:nvPr/>
       </p:nvGrpSpPr>
@@ -1130,7 +1131,7 @@
       </p:grpSpPr>
       <p:sp>
         <p:nvSpPr>
-          <p:cNvPr id="173" name="Google Shape;173;g2443ed070a7_1_3:notes"/>
+          <p:cNvPr id="180" name="Google Shape;180;g2443ed070a7_1_200:notes"/>
           <p:cNvSpPr/>
           <p:nvPr>
             <p:ph idx="2" type="sldImg"/>
@@ -1165,7 +1166,7 @@
       </p:sp>
       <p:sp>
         <p:nvSpPr>
-          <p:cNvPr id="174" name="Google Shape;174;g2443ed070a7_1_3:notes"/>
+          <p:cNvPr id="181" name="Google Shape;181;g2443ed070a7_1_200:notes"/>
           <p:cNvSpPr txBox="1"/>
           <p:nvPr>
             <p:ph idx="1" type="body"/>
@@ -1215,7 +1216,7 @@
   <p:cSld>
     <p:spTree>
       <p:nvGrpSpPr>
-        <p:cNvPr id="179" name="Shape 179"/>
+        <p:cNvPr id="188" name="Shape 188"/>
         <p:cNvGrpSpPr/>
         <p:nvPr/>
       </p:nvGrpSpPr>
@@ -1229,7 +1230,7 @@
       </p:grpSpPr>
       <p:sp>
         <p:nvSpPr>
-          <p:cNvPr id="180" name="Google Shape;180;g2443ed070a7_1_9:notes"/>
+          <p:cNvPr id="189" name="Google Shape;189;g2443ed070a7_1_3:notes"/>
           <p:cNvSpPr/>
           <p:nvPr>
             <p:ph idx="2" type="sldImg"/>
@@ -1264,7 +1265,7 @@
       </p:sp>
       <p:sp>
         <p:nvSpPr>
-          <p:cNvPr id="181" name="Google Shape;181;g2443ed070a7_1_9:notes"/>
+          <p:cNvPr id="190" name="Google Shape;190;g2443ed070a7_1_3:notes"/>
           <p:cNvSpPr txBox="1"/>
           <p:nvPr>
             <p:ph idx="1" type="body"/>
@@ -1314,7 +1315,7 @@
   <p:cSld>
     <p:spTree>
       <p:nvGrpSpPr>
-        <p:cNvPr id="185" name="Shape 185"/>
+        <p:cNvPr id="195" name="Shape 195"/>
         <p:cNvGrpSpPr/>
         <p:nvPr/>
       </p:nvGrpSpPr>
@@ -1328,7 +1329,7 @@
       </p:grpSpPr>
       <p:sp>
         <p:nvSpPr>
-          <p:cNvPr id="186" name="Google Shape;186;g2443ed070a7_1_232:notes"/>
+          <p:cNvPr id="196" name="Google Shape;196;g2443ed070a7_1_9:notes"/>
           <p:cNvSpPr/>
           <p:nvPr>
             <p:ph idx="2" type="sldImg"/>
@@ -1363,7 +1364,7 @@
       </p:sp>
       <p:sp>
         <p:nvSpPr>
-          <p:cNvPr id="187" name="Google Shape;187;g2443ed070a7_1_232:notes"/>
+          <p:cNvPr id="197" name="Google Shape;197;g2443ed070a7_1_9:notes"/>
           <p:cNvSpPr txBox="1"/>
           <p:nvPr>
             <p:ph idx="1" type="body"/>
@@ -1413,7 +1414,7 @@
   <p:cSld>
     <p:spTree>
       <p:nvGrpSpPr>
-        <p:cNvPr id="191" name="Shape 191"/>
+        <p:cNvPr id="201" name="Shape 201"/>
         <p:cNvGrpSpPr/>
         <p:nvPr/>
       </p:nvGrpSpPr>
@@ -1427,7 +1428,7 @@
       </p:grpSpPr>
       <p:sp>
         <p:nvSpPr>
-          <p:cNvPr id="192" name="Google Shape;192;g2443ed070a7_1_227:notes"/>
+          <p:cNvPr id="202" name="Google Shape;202;g2443ed070a7_1_232:notes"/>
           <p:cNvSpPr/>
           <p:nvPr>
             <p:ph idx="2" type="sldImg"/>
@@ -1462,7 +1463,106 @@
       </p:sp>
       <p:sp>
         <p:nvSpPr>
-          <p:cNvPr id="193" name="Google Shape;193;g2443ed070a7_1_227:notes"/>
+          <p:cNvPr id="203" name="Google Shape;203;g2443ed070a7_1_232:notes"/>
+          <p:cNvSpPr txBox="1"/>
+          <p:nvPr>
+            <p:ph idx="1" type="body"/>
+          </p:nvPr>
+        </p:nvSpPr>
+        <p:spPr>
+          <a:xfrm>
+            <a:off x="685800" y="4343400"/>
+            <a:ext cx="5486400" cy="4114800"/>
+          </a:xfrm>
+          <a:prstGeom prst="rect">
+            <a:avLst/>
+          </a:prstGeom>
+        </p:spPr>
+        <p:txBody>
+          <a:bodyPr anchorCtr="0" anchor="t" bIns="91425" lIns="91425" spcFirstLastPara="1" rIns="91425" wrap="square" tIns="91425">
+            <a:noAutofit/>
+          </a:bodyPr>
+          <a:lstStyle/>
+          <a:p>
+            <a:pPr indent="0" lvl="0" marL="0" rtl="0" algn="l">
+              <a:spcBef>
+                <a:spcPts val="0"/>
+              </a:spcBef>
+              <a:spcAft>
+                <a:spcPts val="0"/>
+              </a:spcAft>
+              <a:buNone/>
+            </a:pPr>
+            <a:r>
+              <a:t/>
+            </a:r>
+            <a:endParaRPr/>
+          </a:p>
+        </p:txBody>
+      </p:sp>
+    </p:spTree>
+  </p:cSld>
+  <p:clrMapOvr>
+    <a:masterClrMapping/>
+  </p:clrMapOvr>
+</p:notes>
+</file>
+
+<file path=ppt/notesSlides/notesSlide17.xml><?xml version="1.0" encoding="utf-8"?>
+<p:notes xmlns:a="http://schemas.openxmlformats.org/drawingml/2006/main" xmlns:r="http://schemas.openxmlformats.org/officeDocument/2006/relationships" xmlns:mc="http://schemas.openxmlformats.org/markup-compatibility/2006" xmlns:mv="urn:schemas-microsoft-com:mac:vml" xmlns:p="http://schemas.openxmlformats.org/presentationml/2006/main" xmlns:c="http://schemas.openxmlformats.org/drawingml/2006/chart" xmlns:dgm="http://schemas.openxmlformats.org/drawingml/2006/diagram" xmlns:o="urn:schemas-microsoft-com:office:office" xmlns:v="urn:schemas-microsoft-com:vml" xmlns:pvml="urn:schemas-microsoft-com:office:powerpoint" xmlns:com="http://schemas.openxmlformats.org/drawingml/2006/compatibility" xmlns:p14="http://schemas.microsoft.com/office/powerpoint/2010/main" xmlns:p15="http://schemas.microsoft.com/office/powerpoint/2012/main" xmlns:ahyp="http://schemas.microsoft.com/office/drawing/2018/hyperlinkcolor" showMasterPhAnim="0" showMasterSp="0">
+  <p:cSld>
+    <p:spTree>
+      <p:nvGrpSpPr>
+        <p:cNvPr id="207" name="Shape 207"/>
+        <p:cNvGrpSpPr/>
+        <p:nvPr/>
+      </p:nvGrpSpPr>
+      <p:grpSpPr>
+        <a:xfrm>
+          <a:off x="0" y="0"/>
+          <a:ext cx="0" cy="0"/>
+          <a:chOff x="0" y="0"/>
+          <a:chExt cx="0" cy="0"/>
+        </a:xfrm>
+      </p:grpSpPr>
+      <p:sp>
+        <p:nvSpPr>
+          <p:cNvPr id="208" name="Google Shape;208;g2443ed070a7_1_227:notes"/>
+          <p:cNvSpPr/>
+          <p:nvPr>
+            <p:ph idx="2" type="sldImg"/>
+          </p:nvPr>
+        </p:nvSpPr>
+        <p:spPr>
+          <a:xfrm>
+            <a:off x="381300" y="685800"/>
+            <a:ext cx="6096000" cy="3429000"/>
+          </a:xfrm>
+          <a:custGeom>
+            <a:rect b="b" l="l" r="r" t="t"/>
+            <a:pathLst>
+              <a:path extrusionOk="0" h="120000" w="120000">
+                <a:moveTo>
+                  <a:pt x="0" y="0"/>
+                </a:moveTo>
+                <a:lnTo>
+                  <a:pt x="120000" y="0"/>
+                </a:lnTo>
+                <a:lnTo>
+                  <a:pt x="120000" y="120000"/>
+                </a:lnTo>
+                <a:lnTo>
+                  <a:pt x="0" y="120000"/>
+                </a:lnTo>
+                <a:close/>
+              </a:path>
+            </a:pathLst>
+          </a:custGeom>
+        </p:spPr>
+      </p:sp>
+      <p:sp>
+        <p:nvSpPr>
+          <p:cNvPr id="209" name="Google Shape;209;g2443ed070a7_1_227:notes"/>
           <p:cNvSpPr txBox="1"/>
           <p:nvPr>
             <p:ph idx="1" type="body"/>
@@ -1512,7 +1612,7 @@
   <p:cSld>
     <p:spTree>
       <p:nvGrpSpPr>
-        <p:cNvPr id="65" name="Shape 65"/>
+        <p:cNvPr id="67" name="Shape 67"/>
         <p:cNvGrpSpPr/>
         <p:nvPr/>
       </p:nvGrpSpPr>
@@ -1526,7 +1626,7 @@
       </p:grpSpPr>
       <p:sp>
         <p:nvSpPr>
-          <p:cNvPr id="66" name="Google Shape;66;g2443ed070a7_1_18:notes"/>
+          <p:cNvPr id="68" name="Google Shape;68;g244c98cb09e_0_2:notes"/>
           <p:cNvSpPr/>
           <p:nvPr>
             <p:ph idx="2" type="sldImg"/>
@@ -1561,7 +1661,7 @@
       </p:sp>
       <p:sp>
         <p:nvSpPr>
-          <p:cNvPr id="67" name="Google Shape;67;g2443ed070a7_1_18:notes"/>
+          <p:cNvPr id="69" name="Google Shape;69;g244c98cb09e_0_2:notes"/>
           <p:cNvSpPr txBox="1"/>
           <p:nvPr>
             <p:ph idx="1" type="body"/>
@@ -1611,7 +1711,7 @@
   <p:cSld>
     <p:spTree>
       <p:nvGrpSpPr>
-        <p:cNvPr id="71" name="Shape 71"/>
+        <p:cNvPr id="75" name="Shape 75"/>
         <p:cNvGrpSpPr/>
         <p:nvPr/>
       </p:nvGrpSpPr>
@@ -1625,7 +1725,7 @@
       </p:grpSpPr>
       <p:sp>
         <p:nvSpPr>
-          <p:cNvPr id="72" name="Google Shape;72;g2443ed070a7_1_23:notes"/>
+          <p:cNvPr id="76" name="Google Shape;76;g2443ed070a7_1_18:notes"/>
           <p:cNvSpPr/>
           <p:nvPr>
             <p:ph idx="2" type="sldImg"/>
@@ -1660,7 +1760,7 @@
       </p:sp>
       <p:sp>
         <p:nvSpPr>
-          <p:cNvPr id="73" name="Google Shape;73;g2443ed070a7_1_23:notes"/>
+          <p:cNvPr id="77" name="Google Shape;77;g2443ed070a7_1_18:notes"/>
           <p:cNvSpPr txBox="1"/>
           <p:nvPr>
             <p:ph idx="1" type="body"/>
@@ -1710,7 +1810,7 @@
   <p:cSld>
     <p:spTree>
       <p:nvGrpSpPr>
-        <p:cNvPr id="77" name="Shape 77"/>
+        <p:cNvPr id="83" name="Shape 83"/>
         <p:cNvGrpSpPr/>
         <p:nvPr/>
       </p:nvGrpSpPr>
@@ -1724,7 +1824,7 @@
       </p:grpSpPr>
       <p:sp>
         <p:nvSpPr>
-          <p:cNvPr id="78" name="Google Shape;78;g2443ed070a7_1_29:notes"/>
+          <p:cNvPr id="84" name="Google Shape;84;g2443ed070a7_1_23:notes"/>
           <p:cNvSpPr/>
           <p:nvPr>
             <p:ph idx="2" type="sldImg"/>
@@ -1759,7 +1859,7 @@
       </p:sp>
       <p:sp>
         <p:nvSpPr>
-          <p:cNvPr id="79" name="Google Shape;79;g2443ed070a7_1_29:notes"/>
+          <p:cNvPr id="85" name="Google Shape;85;g2443ed070a7_1_23:notes"/>
           <p:cNvSpPr txBox="1"/>
           <p:nvPr>
             <p:ph idx="1" type="body"/>
@@ -1809,7 +1909,7 @@
   <p:cSld>
     <p:spTree>
       <p:nvGrpSpPr>
-        <p:cNvPr id="88" name="Shape 88"/>
+        <p:cNvPr id="89" name="Shape 89"/>
         <p:cNvGrpSpPr/>
         <p:nvPr/>
       </p:nvGrpSpPr>
@@ -1823,7 +1923,7 @@
       </p:grpSpPr>
       <p:sp>
         <p:nvSpPr>
-          <p:cNvPr id="89" name="Google Shape;89;g2443ed070a7_1_6:notes"/>
+          <p:cNvPr id="90" name="Google Shape;90;g2443ed070a7_1_29:notes"/>
           <p:cNvSpPr/>
           <p:nvPr>
             <p:ph idx="2" type="sldImg"/>
@@ -1858,7 +1958,7 @@
       </p:sp>
       <p:sp>
         <p:nvSpPr>
-          <p:cNvPr id="90" name="Google Shape;90;g2443ed070a7_1_6:notes"/>
+          <p:cNvPr id="91" name="Google Shape;91;g2443ed070a7_1_29:notes"/>
           <p:cNvSpPr txBox="1"/>
           <p:nvPr>
             <p:ph idx="1" type="body"/>
@@ -1908,7 +2008,7 @@
   <p:cSld>
     <p:spTree>
       <p:nvGrpSpPr>
-        <p:cNvPr id="102" name="Shape 102"/>
+        <p:cNvPr id="100" name="Shape 100"/>
         <p:cNvGrpSpPr/>
         <p:nvPr/>
       </p:nvGrpSpPr>
@@ -1922,7 +2022,7 @@
       </p:grpSpPr>
       <p:sp>
         <p:nvSpPr>
-          <p:cNvPr id="103" name="Google Shape;103;g2443ed070a7_0_77:notes"/>
+          <p:cNvPr id="101" name="Google Shape;101;g2443ed070a7_1_6:notes"/>
           <p:cNvSpPr/>
           <p:nvPr>
             <p:ph idx="2" type="sldImg"/>
@@ -1957,7 +2057,7 @@
       </p:sp>
       <p:sp>
         <p:nvSpPr>
-          <p:cNvPr id="104" name="Google Shape;104;g2443ed070a7_0_77:notes"/>
+          <p:cNvPr id="102" name="Google Shape;102;g2443ed070a7_1_6:notes"/>
           <p:cNvSpPr txBox="1"/>
           <p:nvPr>
             <p:ph idx="1" type="body"/>
@@ -2007,7 +2107,7 @@
   <p:cSld>
     <p:spTree>
       <p:nvGrpSpPr>
-        <p:cNvPr id="112" name="Shape 112"/>
+        <p:cNvPr id="114" name="Shape 114"/>
         <p:cNvGrpSpPr/>
         <p:nvPr/>
       </p:nvGrpSpPr>
@@ -2021,7 +2121,7 @@
       </p:grpSpPr>
       <p:sp>
         <p:nvSpPr>
-          <p:cNvPr id="113" name="Google Shape;113;g2443ed070a7_1_188:notes"/>
+          <p:cNvPr id="115" name="Google Shape;115;g2443ed070a7_0_77:notes"/>
           <p:cNvSpPr/>
           <p:nvPr>
             <p:ph idx="2" type="sldImg"/>
@@ -2056,7 +2156,7 @@
       </p:sp>
       <p:sp>
         <p:nvSpPr>
-          <p:cNvPr id="114" name="Google Shape;114;g2443ed070a7_1_188:notes"/>
+          <p:cNvPr id="116" name="Google Shape;116;g2443ed070a7_0_77:notes"/>
           <p:cNvSpPr txBox="1"/>
           <p:nvPr>
             <p:ph idx="1" type="body"/>
@@ -2106,7 +2206,7 @@
   <p:cSld>
     <p:spTree>
       <p:nvGrpSpPr>
-        <p:cNvPr id="122" name="Shape 122"/>
+        <p:cNvPr id="124" name="Shape 124"/>
         <p:cNvGrpSpPr/>
         <p:nvPr/>
       </p:nvGrpSpPr>
@@ -2120,7 +2220,7 @@
       </p:grpSpPr>
       <p:sp>
         <p:nvSpPr>
-          <p:cNvPr id="123" name="Google Shape;123;g2443ed070a7_1_218:notes"/>
+          <p:cNvPr id="125" name="Google Shape;125;g2443ed070a7_1_188:notes"/>
           <p:cNvSpPr/>
           <p:nvPr>
             <p:ph idx="2" type="sldImg"/>
@@ -2155,7 +2255,7 @@
       </p:sp>
       <p:sp>
         <p:nvSpPr>
-          <p:cNvPr id="124" name="Google Shape;124;g2443ed070a7_1_218:notes"/>
+          <p:cNvPr id="126" name="Google Shape;126;g2443ed070a7_1_188:notes"/>
           <p:cNvSpPr txBox="1"/>
           <p:nvPr>
             <p:ph idx="1" type="body"/>
@@ -2205,7 +2305,7 @@
   <p:cSld>
     <p:spTree>
       <p:nvGrpSpPr>
-        <p:cNvPr id="131" name="Shape 131"/>
+        <p:cNvPr id="134" name="Shape 134"/>
         <p:cNvGrpSpPr/>
         <p:nvPr/>
       </p:nvGrpSpPr>
@@ -2219,7 +2319,7 @@
       </p:grpSpPr>
       <p:sp>
         <p:nvSpPr>
-          <p:cNvPr id="132" name="Google Shape;132;g2443ed070a7_0_80:notes"/>
+          <p:cNvPr id="135" name="Google Shape;135;g2443ed070a7_1_218:notes"/>
           <p:cNvSpPr/>
           <p:nvPr>
             <p:ph idx="2" type="sldImg"/>
@@ -2254,7 +2354,7 @@
       </p:sp>
       <p:sp>
         <p:nvSpPr>
-          <p:cNvPr id="133" name="Google Shape;133;g2443ed070a7_0_80:notes"/>
+          <p:cNvPr id="136" name="Google Shape;136;g2443ed070a7_1_218:notes"/>
           <p:cNvSpPr txBox="1"/>
           <p:nvPr>
             <p:ph idx="1" type="body"/>
@@ -7688,6 +7788,60 @@
           </a:p>
         </p:txBody>
       </p:sp>
+      <p:pic>
+        <p:nvPicPr>
+          <p:cNvPr id="65" name="Google Shape;65;p13"/>
+          <p:cNvPicPr preferRelativeResize="0"/>
+          <p:nvPr/>
+        </p:nvPicPr>
+        <p:blipFill rotWithShape="1">
+          <a:blip r:embed="rId3">
+            <a:alphaModFix/>
+          </a:blip>
+          <a:srcRect b="32025" l="27820" r="26697" t="33284"/>
+          <a:stretch/>
+        </p:blipFill>
+        <p:spPr>
+          <a:xfrm>
+            <a:off x="642425" y="2471623"/>
+            <a:ext cx="2252624" cy="1668600"/>
+          </a:xfrm>
+          <a:prstGeom prst="rect">
+            <a:avLst/>
+          </a:prstGeom>
+          <a:noFill/>
+          <a:ln>
+            <a:noFill/>
+          </a:ln>
+        </p:spPr>
+      </p:pic>
+      <p:pic>
+        <p:nvPicPr>
+          <p:cNvPr id="66" name="Google Shape;66;p13"/>
+          <p:cNvPicPr preferRelativeResize="0"/>
+          <p:nvPr/>
+        </p:nvPicPr>
+        <p:blipFill rotWithShape="1">
+          <a:blip r:embed="rId3">
+            <a:alphaModFix/>
+          </a:blip>
+          <a:srcRect b="69861" l="34946" r="32880" t="0"/>
+          <a:stretch/>
+        </p:blipFill>
+        <p:spPr>
+          <a:xfrm>
+            <a:off x="6899725" y="252325"/>
+            <a:ext cx="1593524" cy="1449674"/>
+          </a:xfrm>
+          <a:prstGeom prst="rect">
+            <a:avLst/>
+          </a:prstGeom>
+          <a:noFill/>
+          <a:ln>
+            <a:noFill/>
+          </a:ln>
+        </p:spPr>
+      </p:pic>
     </p:spTree>
   </p:cSld>
   <p:clrMapOvr>
@@ -7701,7 +7855,7 @@
   <p:cSld>
     <p:spTree>
       <p:nvGrpSpPr>
-        <p:cNvPr id="145" name="Shape 145"/>
+        <p:cNvPr id="146" name="Shape 146"/>
         <p:cNvGrpSpPr/>
         <p:nvPr/>
       </p:nvGrpSpPr>
@@ -7715,7 +7869,7 @@
       </p:grpSpPr>
       <p:pic>
         <p:nvPicPr>
-          <p:cNvPr id="146" name="Google Shape;146;p22"/>
+          <p:cNvPr id="147" name="Google Shape;147;p22"/>
           <p:cNvPicPr preferRelativeResize="0"/>
           <p:nvPr/>
         </p:nvPicPr>
@@ -7729,8 +7883,8 @@
         </p:blipFill>
         <p:spPr>
           <a:xfrm>
-            <a:off x="180350" y="879475"/>
-            <a:ext cx="4999151" cy="3089975"/>
+            <a:off x="208300" y="921375"/>
+            <a:ext cx="4999151" cy="2952750"/>
           </a:xfrm>
           <a:prstGeom prst="rect">
             <a:avLst/>
@@ -7743,7 +7897,7 @@
       </p:pic>
       <p:pic>
         <p:nvPicPr>
-          <p:cNvPr id="147" name="Google Shape;147;p22"/>
+          <p:cNvPr id="148" name="Google Shape;148;p22"/>
           <p:cNvPicPr preferRelativeResize="0"/>
           <p:nvPr/>
         </p:nvPicPr>
@@ -7757,8 +7911,8 @@
         </p:blipFill>
         <p:spPr>
           <a:xfrm>
-            <a:off x="5317926" y="1256950"/>
-            <a:ext cx="3659698" cy="2482824"/>
+            <a:off x="5345851" y="1247238"/>
+            <a:ext cx="3631750" cy="2301032"/>
           </a:xfrm>
           <a:prstGeom prst="rect">
             <a:avLst/>
@@ -7771,14 +7925,14 @@
       </p:pic>
       <p:sp>
         <p:nvSpPr>
-          <p:cNvPr id="148" name="Google Shape;148;p22"/>
+          <p:cNvPr id="149" name="Google Shape;149;p22"/>
           <p:cNvSpPr/>
           <p:nvPr/>
         </p:nvSpPr>
         <p:spPr>
-          <a:xfrm rot="-1133244">
-            <a:off x="5903080" y="2709400"/>
-            <a:ext cx="324365" cy="164222"/>
+          <a:xfrm rot="-1242391">
+            <a:off x="5804301" y="2595236"/>
+            <a:ext cx="387747" cy="198632"/>
           </a:xfrm>
           <a:prstGeom prst="rightArrow">
             <a:avLst>
@@ -7823,16 +7977,16 @@
       </p:sp>
       <p:sp>
         <p:nvSpPr>
-          <p:cNvPr id="149" name="Google Shape;149;p22"/>
+          <p:cNvPr id="150" name="Google Shape;150;p22"/>
           <p:cNvSpPr/>
           <p:nvPr/>
         </p:nvSpPr>
         <p:spPr>
-          <a:xfrm>
-            <a:off x="8160275" y="2645400"/>
-            <a:ext cx="300300" cy="160200"/>
-          </a:xfrm>
-          <a:prstGeom prst="leftArrow">
+          <a:xfrm rot="10797341">
+            <a:off x="7929241" y="2496488"/>
+            <a:ext cx="387900" cy="198600"/>
+          </a:xfrm>
+          <a:prstGeom prst="rightArrow">
             <a:avLst>
               <a:gd fmla="val 50000" name="adj1"/>
               <a:gd fmla="val 50000" name="adj2"/>
@@ -7875,7 +8029,7 @@
       </p:sp>
       <p:sp>
         <p:nvSpPr>
-          <p:cNvPr id="150" name="Google Shape;150;p22"/>
+          <p:cNvPr id="151" name="Google Shape;151;p22"/>
           <p:cNvSpPr txBox="1"/>
           <p:nvPr/>
         </p:nvSpPr>
@@ -7933,14 +8087,14 @@
       </p:sp>
       <p:sp>
         <p:nvSpPr>
-          <p:cNvPr id="151" name="Google Shape;151;p22"/>
+          <p:cNvPr id="152" name="Google Shape;152;p22"/>
           <p:cNvSpPr txBox="1"/>
           <p:nvPr/>
         </p:nvSpPr>
         <p:spPr>
           <a:xfrm>
-            <a:off x="1000125" y="4191000"/>
-            <a:ext cx="6524700" cy="615600"/>
+            <a:off x="952500" y="4119575"/>
+            <a:ext cx="6540600" cy="615600"/>
           </a:xfrm>
           <a:prstGeom prst="rect">
             <a:avLst/>
@@ -7975,7 +8129,55 @@
                 <a:cs typeface="Roboto"/>
                 <a:sym typeface="Roboto"/>
               </a:rPr>
-              <a:t>Still a significant increase (p=0.0001) in the overall number of laws passed, however it has slid down from congress 116, 4200 to merely around 70!</a:t>
+              <a:t>There is a </a:t>
+            </a:r>
+            <a:r>
+              <a:rPr lang="en">
+                <a:solidFill>
+                  <a:schemeClr val="dk1"/>
+                </a:solidFill>
+                <a:latin typeface="Roboto"/>
+                <a:ea typeface="Roboto"/>
+                <a:cs typeface="Roboto"/>
+                <a:sym typeface="Roboto"/>
+              </a:rPr>
+              <a:t>significant</a:t>
+            </a:r>
+            <a:r>
+              <a:rPr lang="en">
+                <a:solidFill>
+                  <a:schemeClr val="dk1"/>
+                </a:solidFill>
+                <a:latin typeface="Roboto"/>
+                <a:ea typeface="Roboto"/>
+                <a:cs typeface="Roboto"/>
+                <a:sym typeface="Roboto"/>
+              </a:rPr>
+              <a:t> increase (p=8e-06) in how many laws were proposed as the linear model suggests.  In “Congress 116” nearly </a:t>
+            </a:r>
+            <a:r>
+              <a:rPr lang="en">
+                <a:solidFill>
+                  <a:srgbClr val="F9CB9C"/>
+                </a:solidFill>
+                <a:latin typeface="Roboto"/>
+                <a:ea typeface="Roboto"/>
+                <a:cs typeface="Roboto"/>
+                <a:sym typeface="Roboto"/>
+              </a:rPr>
+              <a:t>4200</a:t>
+            </a:r>
+            <a:r>
+              <a:rPr lang="en">
+                <a:solidFill>
+                  <a:schemeClr val="dk1"/>
+                </a:solidFill>
+                <a:latin typeface="Roboto"/>
+                <a:ea typeface="Roboto"/>
+                <a:cs typeface="Roboto"/>
+                <a:sym typeface="Roboto"/>
+              </a:rPr>
+              <a:t> laws were proposed.</a:t>
             </a:r>
             <a:endParaRPr>
               <a:solidFill>
@@ -7991,14 +8193,14 @@
       </p:sp>
       <p:sp>
         <p:nvSpPr>
-          <p:cNvPr id="152" name="Google Shape;152;p22"/>
+          <p:cNvPr id="153" name="Google Shape;153;p22"/>
           <p:cNvSpPr/>
           <p:nvPr/>
         </p:nvSpPr>
         <p:spPr>
-          <a:xfrm rot="-643651">
-            <a:off x="3544986" y="1425269"/>
-            <a:ext cx="665633" cy="232702"/>
+          <a:xfrm>
+            <a:off x="3524250" y="1301750"/>
+            <a:ext cx="412800" cy="190500"/>
           </a:xfrm>
           <a:prstGeom prst="leftArrow">
             <a:avLst>
@@ -8038,6 +8240,58 @@
               <a:t/>
             </a:r>
             <a:endParaRPr/>
+          </a:p>
+        </p:txBody>
+      </p:sp>
+      <p:sp>
+        <p:nvSpPr>
+          <p:cNvPr id="154" name="Google Shape;154;p22"/>
+          <p:cNvSpPr txBox="1"/>
+          <p:nvPr/>
+        </p:nvSpPr>
+        <p:spPr>
+          <a:xfrm>
+            <a:off x="3909750" y="1196900"/>
+            <a:ext cx="1324500" cy="400200"/>
+          </a:xfrm>
+          <a:prstGeom prst="rect">
+            <a:avLst/>
+          </a:prstGeom>
+          <a:noFill/>
+          <a:ln>
+            <a:noFill/>
+          </a:ln>
+        </p:spPr>
+        <p:txBody>
+          <a:bodyPr anchorCtr="0" anchor="t" bIns="91425" lIns="91425" spcFirstLastPara="1" rIns="91425" wrap="square" tIns="91425">
+            <a:spAutoFit/>
+          </a:bodyPr>
+          <a:lstStyle/>
+          <a:p>
+            <a:pPr indent="0" lvl="0" marL="0" rtl="0" algn="l">
+              <a:spcBef>
+                <a:spcPts val="0"/>
+              </a:spcBef>
+              <a:spcAft>
+                <a:spcPts val="0"/>
+              </a:spcAft>
+              <a:buNone/>
+            </a:pPr>
+            <a:r>
+              <a:rPr lang="en">
+                <a:latin typeface="Roboto"/>
+                <a:ea typeface="Roboto"/>
+                <a:cs typeface="Roboto"/>
+                <a:sym typeface="Roboto"/>
+              </a:rPr>
+              <a:t>Congress 116</a:t>
+            </a:r>
+            <a:endParaRPr>
+              <a:latin typeface="Roboto"/>
+              <a:ea typeface="Roboto"/>
+              <a:cs typeface="Roboto"/>
+              <a:sym typeface="Roboto"/>
+            </a:endParaRPr>
           </a:p>
         </p:txBody>
       </p:sp>
@@ -8054,7 +8308,7 @@
   <p:cSld>
     <p:spTree>
       <p:nvGrpSpPr>
-        <p:cNvPr id="156" name="Shape 156"/>
+        <p:cNvPr id="158" name="Shape 158"/>
         <p:cNvGrpSpPr/>
         <p:nvPr/>
       </p:nvGrpSpPr>
@@ -8068,7 +8322,7 @@
       </p:grpSpPr>
       <p:pic>
         <p:nvPicPr>
-          <p:cNvPr id="157" name="Google Shape;157;p23"/>
+          <p:cNvPr id="159" name="Google Shape;159;p23"/>
           <p:cNvPicPr preferRelativeResize="0"/>
           <p:nvPr/>
         </p:nvPicPr>
@@ -8082,8 +8336,8 @@
         </p:blipFill>
         <p:spPr>
           <a:xfrm>
-            <a:off x="166425" y="959550"/>
-            <a:ext cx="5186577" cy="3051776"/>
+            <a:off x="180350" y="879475"/>
+            <a:ext cx="4999151" cy="3089975"/>
           </a:xfrm>
           <a:prstGeom prst="rect">
             <a:avLst/>
@@ -8096,7 +8350,7 @@
       </p:pic>
       <p:pic>
         <p:nvPicPr>
-          <p:cNvPr id="158" name="Google Shape;158;p23"/>
+          <p:cNvPr id="160" name="Google Shape;160;p23"/>
           <p:cNvPicPr preferRelativeResize="0"/>
           <p:nvPr/>
         </p:nvPicPr>
@@ -8110,8 +8364,8 @@
         </p:blipFill>
         <p:spPr>
           <a:xfrm>
-            <a:off x="5533377" y="1397675"/>
-            <a:ext cx="3486199" cy="2348142"/>
+            <a:off x="5317926" y="1256950"/>
+            <a:ext cx="3659698" cy="2482824"/>
           </a:xfrm>
           <a:prstGeom prst="rect">
             <a:avLst/>
@@ -8124,16 +8378,16 @@
       </p:pic>
       <p:sp>
         <p:nvSpPr>
-          <p:cNvPr id="159" name="Google Shape;159;p23"/>
+          <p:cNvPr id="161" name="Google Shape;161;p23"/>
           <p:cNvSpPr/>
           <p:nvPr/>
         </p:nvSpPr>
         <p:spPr>
-          <a:xfrm>
-            <a:off x="8232300" y="2709425"/>
-            <a:ext cx="320100" cy="148200"/>
-          </a:xfrm>
-          <a:prstGeom prst="leftArrow">
+          <a:xfrm rot="-1133244">
+            <a:off x="5903080" y="2709400"/>
+            <a:ext cx="324365" cy="164222"/>
+          </a:xfrm>
+          <a:prstGeom prst="rightArrow">
             <a:avLst>
               <a:gd fmla="val 50000" name="adj1"/>
               <a:gd fmla="val 50000" name="adj2"/>
@@ -8176,16 +8430,16 @@
       </p:sp>
       <p:sp>
         <p:nvSpPr>
-          <p:cNvPr id="160" name="Google Shape;160;p23"/>
+          <p:cNvPr id="162" name="Google Shape;162;p23"/>
           <p:cNvSpPr/>
           <p:nvPr/>
         </p:nvSpPr>
         <p:spPr>
-          <a:xfrm rot="-1522476">
-            <a:off x="6050573" y="2827785"/>
-            <a:ext cx="316427" cy="161703"/>
-          </a:xfrm>
-          <a:prstGeom prst="rightArrow">
+          <a:xfrm>
+            <a:off x="8160275" y="2645400"/>
+            <a:ext cx="300300" cy="160200"/>
+          </a:xfrm>
+          <a:prstGeom prst="leftArrow">
             <a:avLst>
               <a:gd fmla="val 50000" name="adj1"/>
               <a:gd fmla="val 50000" name="adj2"/>
@@ -8228,7 +8482,7 @@
       </p:sp>
       <p:sp>
         <p:nvSpPr>
-          <p:cNvPr id="161" name="Google Shape;161;p23"/>
+          <p:cNvPr id="163" name="Google Shape;163;p23"/>
           <p:cNvSpPr txBox="1"/>
           <p:nvPr/>
         </p:nvSpPr>
@@ -8286,7 +8540,460 @@
       </p:sp>
       <p:sp>
         <p:nvSpPr>
-          <p:cNvPr id="162" name="Google Shape;162;p23"/>
+          <p:cNvPr id="164" name="Google Shape;164;p23"/>
+          <p:cNvSpPr txBox="1"/>
+          <p:nvPr/>
+        </p:nvSpPr>
+        <p:spPr>
+          <a:xfrm>
+            <a:off x="1000125" y="4191000"/>
+            <a:ext cx="6524700" cy="831300"/>
+          </a:xfrm>
+          <a:prstGeom prst="rect">
+            <a:avLst/>
+          </a:prstGeom>
+          <a:noFill/>
+          <a:ln>
+            <a:noFill/>
+          </a:ln>
+        </p:spPr>
+        <p:txBody>
+          <a:bodyPr anchorCtr="0" anchor="t" bIns="91425" lIns="91425" spcFirstLastPara="1" rIns="91425" wrap="square" tIns="91425">
+            <a:spAutoFit/>
+          </a:bodyPr>
+          <a:lstStyle/>
+          <a:p>
+            <a:pPr indent="0" lvl="0" marL="0" rtl="0" algn="ctr">
+              <a:spcBef>
+                <a:spcPts val="0"/>
+              </a:spcBef>
+              <a:spcAft>
+                <a:spcPts val="0"/>
+              </a:spcAft>
+              <a:buNone/>
+            </a:pPr>
+            <a:r>
+              <a:rPr lang="en">
+                <a:solidFill>
+                  <a:schemeClr val="dk1"/>
+                </a:solidFill>
+                <a:latin typeface="Roboto"/>
+                <a:ea typeface="Roboto"/>
+                <a:cs typeface="Roboto"/>
+                <a:sym typeface="Roboto"/>
+              </a:rPr>
+              <a:t>Still a significant increase (p=0.0001) in the overall number of laws passed, however it has slid down from “Congress 116”, </a:t>
+            </a:r>
+            <a:r>
+              <a:rPr lang="en">
+                <a:solidFill>
+                  <a:srgbClr val="F9CB9C"/>
+                </a:solidFill>
+                <a:latin typeface="Roboto"/>
+                <a:ea typeface="Roboto"/>
+                <a:cs typeface="Roboto"/>
+                <a:sym typeface="Roboto"/>
+              </a:rPr>
+              <a:t>4200 </a:t>
+            </a:r>
+            <a:r>
+              <a:rPr lang="en">
+                <a:solidFill>
+                  <a:schemeClr val="dk1"/>
+                </a:solidFill>
+                <a:latin typeface="Roboto"/>
+                <a:ea typeface="Roboto"/>
+                <a:cs typeface="Roboto"/>
+                <a:sym typeface="Roboto"/>
+              </a:rPr>
+              <a:t>laws proposed to merely around </a:t>
+            </a:r>
+            <a:r>
+              <a:rPr lang="en">
+                <a:solidFill>
+                  <a:srgbClr val="F9CB9C"/>
+                </a:solidFill>
+                <a:latin typeface="Roboto"/>
+                <a:ea typeface="Roboto"/>
+                <a:cs typeface="Roboto"/>
+                <a:sym typeface="Roboto"/>
+              </a:rPr>
+              <a:t>70</a:t>
+            </a:r>
+            <a:r>
+              <a:rPr lang="en">
+                <a:solidFill>
+                  <a:schemeClr val="dk1"/>
+                </a:solidFill>
+                <a:latin typeface="Roboto"/>
+                <a:ea typeface="Roboto"/>
+                <a:cs typeface="Roboto"/>
+                <a:sym typeface="Roboto"/>
+              </a:rPr>
+              <a:t> laws passed!</a:t>
+            </a:r>
+            <a:endParaRPr>
+              <a:solidFill>
+                <a:schemeClr val="dk1"/>
+              </a:solidFill>
+              <a:latin typeface="Roboto"/>
+              <a:ea typeface="Roboto"/>
+              <a:cs typeface="Roboto"/>
+              <a:sym typeface="Roboto"/>
+            </a:endParaRPr>
+          </a:p>
+        </p:txBody>
+      </p:sp>
+      <p:sp>
+        <p:nvSpPr>
+          <p:cNvPr id="165" name="Google Shape;165;p23"/>
+          <p:cNvSpPr/>
+          <p:nvPr/>
+        </p:nvSpPr>
+        <p:spPr>
+          <a:xfrm rot="-993673">
+            <a:off x="3505369" y="1438976"/>
+            <a:ext cx="429414" cy="232637"/>
+          </a:xfrm>
+          <a:prstGeom prst="leftArrow">
+            <a:avLst>
+              <a:gd fmla="val 50000" name="adj1"/>
+              <a:gd fmla="val 50000" name="adj2"/>
+            </a:avLst>
+          </a:prstGeom>
+          <a:solidFill>
+            <a:srgbClr val="FF0000"/>
+          </a:solidFill>
+          <a:ln cap="flat" cmpd="sng" w="9525">
+            <a:solidFill>
+              <a:schemeClr val="dk2"/>
+            </a:solidFill>
+            <a:prstDash val="solid"/>
+            <a:round/>
+            <a:headEnd len="sm" w="sm" type="none"/>
+            <a:tailEnd len="sm" w="sm" type="none"/>
+          </a:ln>
+        </p:spPr>
+        <p:txBody>
+          <a:bodyPr anchorCtr="0" anchor="ctr" bIns="91425" lIns="91425" spcFirstLastPara="1" rIns="91425" wrap="square" tIns="91425">
+            <a:noAutofit/>
+          </a:bodyPr>
+          <a:lstStyle/>
+          <a:p>
+            <a:pPr indent="0" lvl="0" marL="0" rtl="0" algn="l">
+              <a:spcBef>
+                <a:spcPts val="0"/>
+              </a:spcBef>
+              <a:spcAft>
+                <a:spcPts val="0"/>
+              </a:spcAft>
+              <a:buNone/>
+            </a:pPr>
+            <a:r>
+              <a:t/>
+            </a:r>
+            <a:endParaRPr/>
+          </a:p>
+        </p:txBody>
+      </p:sp>
+      <p:sp>
+        <p:nvSpPr>
+          <p:cNvPr id="166" name="Google Shape;166;p23"/>
+          <p:cNvSpPr txBox="1"/>
+          <p:nvPr/>
+        </p:nvSpPr>
+        <p:spPr>
+          <a:xfrm>
+            <a:off x="3909750" y="1256950"/>
+            <a:ext cx="1324500" cy="400200"/>
+          </a:xfrm>
+          <a:prstGeom prst="rect">
+            <a:avLst/>
+          </a:prstGeom>
+          <a:noFill/>
+          <a:ln>
+            <a:noFill/>
+          </a:ln>
+        </p:spPr>
+        <p:txBody>
+          <a:bodyPr anchorCtr="0" anchor="t" bIns="91425" lIns="91425" spcFirstLastPara="1" rIns="91425" wrap="square" tIns="91425">
+            <a:spAutoFit/>
+          </a:bodyPr>
+          <a:lstStyle/>
+          <a:p>
+            <a:pPr indent="0" lvl="0" marL="0" rtl="0" algn="l">
+              <a:spcBef>
+                <a:spcPts val="0"/>
+              </a:spcBef>
+              <a:spcAft>
+                <a:spcPts val="0"/>
+              </a:spcAft>
+              <a:buNone/>
+            </a:pPr>
+            <a:r>
+              <a:rPr lang="en">
+                <a:latin typeface="Roboto"/>
+                <a:ea typeface="Roboto"/>
+                <a:cs typeface="Roboto"/>
+                <a:sym typeface="Roboto"/>
+              </a:rPr>
+              <a:t>Congress 116</a:t>
+            </a:r>
+            <a:endParaRPr>
+              <a:latin typeface="Roboto"/>
+              <a:ea typeface="Roboto"/>
+              <a:cs typeface="Roboto"/>
+              <a:sym typeface="Roboto"/>
+            </a:endParaRPr>
+          </a:p>
+        </p:txBody>
+      </p:sp>
+    </p:spTree>
+  </p:cSld>
+  <p:clrMapOvr>
+    <a:masterClrMapping/>
+  </p:clrMapOvr>
+</p:sld>
+</file>
+
+<file path=ppt/slides/slide12.xml><?xml version="1.0" encoding="utf-8"?>
+<p:sld xmlns:a="http://schemas.openxmlformats.org/drawingml/2006/main" xmlns:r="http://schemas.openxmlformats.org/officeDocument/2006/relationships" xmlns:mc="http://schemas.openxmlformats.org/markup-compatibility/2006" xmlns:mv="urn:schemas-microsoft-com:mac:vml" xmlns:p="http://schemas.openxmlformats.org/presentationml/2006/main" xmlns:c="http://schemas.openxmlformats.org/drawingml/2006/chart" xmlns:dgm="http://schemas.openxmlformats.org/drawingml/2006/diagram" xmlns:o="urn:schemas-microsoft-com:office:office" xmlns:v="urn:schemas-microsoft-com:vml" xmlns:pvml="urn:schemas-microsoft-com:office:powerpoint" xmlns:com="http://schemas.openxmlformats.org/drawingml/2006/compatibility" xmlns:p14="http://schemas.microsoft.com/office/powerpoint/2010/main" xmlns:p15="http://schemas.microsoft.com/office/powerpoint/2012/main" xmlns:ahyp="http://schemas.microsoft.com/office/drawing/2018/hyperlinkcolor">
+  <p:cSld>
+    <p:spTree>
+      <p:nvGrpSpPr>
+        <p:cNvPr id="170" name="Shape 170"/>
+        <p:cNvGrpSpPr/>
+        <p:nvPr/>
+      </p:nvGrpSpPr>
+      <p:grpSpPr>
+        <a:xfrm>
+          <a:off x="0" y="0"/>
+          <a:ext cx="0" cy="0"/>
+          <a:chOff x="0" y="0"/>
+          <a:chExt cx="0" cy="0"/>
+        </a:xfrm>
+      </p:grpSpPr>
+      <p:pic>
+        <p:nvPicPr>
+          <p:cNvPr id="171" name="Google Shape;171;p24"/>
+          <p:cNvPicPr preferRelativeResize="0"/>
+          <p:nvPr/>
+        </p:nvPicPr>
+        <p:blipFill>
+          <a:blip r:embed="rId3">
+            <a:alphaModFix/>
+          </a:blip>
+          <a:stretch>
+            <a:fillRect/>
+          </a:stretch>
+        </p:blipFill>
+        <p:spPr>
+          <a:xfrm>
+            <a:off x="166425" y="959550"/>
+            <a:ext cx="5186577" cy="3051776"/>
+          </a:xfrm>
+          <a:prstGeom prst="rect">
+            <a:avLst/>
+          </a:prstGeom>
+          <a:noFill/>
+          <a:ln>
+            <a:noFill/>
+          </a:ln>
+        </p:spPr>
+      </p:pic>
+      <p:pic>
+        <p:nvPicPr>
+          <p:cNvPr id="172" name="Google Shape;172;p24"/>
+          <p:cNvPicPr preferRelativeResize="0"/>
+          <p:nvPr/>
+        </p:nvPicPr>
+        <p:blipFill>
+          <a:blip r:embed="rId4">
+            <a:alphaModFix/>
+          </a:blip>
+          <a:stretch>
+            <a:fillRect/>
+          </a:stretch>
+        </p:blipFill>
+        <p:spPr>
+          <a:xfrm>
+            <a:off x="5533377" y="1397675"/>
+            <a:ext cx="3486199" cy="2348142"/>
+          </a:xfrm>
+          <a:prstGeom prst="rect">
+            <a:avLst/>
+          </a:prstGeom>
+          <a:noFill/>
+          <a:ln>
+            <a:noFill/>
+          </a:ln>
+        </p:spPr>
+      </p:pic>
+      <p:sp>
+        <p:nvSpPr>
+          <p:cNvPr id="173" name="Google Shape;173;p24"/>
+          <p:cNvSpPr/>
+          <p:nvPr/>
+        </p:nvSpPr>
+        <p:spPr>
+          <a:xfrm>
+            <a:off x="8232300" y="2709425"/>
+            <a:ext cx="320100" cy="148200"/>
+          </a:xfrm>
+          <a:prstGeom prst="leftArrow">
+            <a:avLst>
+              <a:gd fmla="val 50000" name="adj1"/>
+              <a:gd fmla="val 50000" name="adj2"/>
+            </a:avLst>
+          </a:prstGeom>
+          <a:solidFill>
+            <a:srgbClr val="FF0000"/>
+          </a:solidFill>
+          <a:ln cap="flat" cmpd="sng" w="9525">
+            <a:solidFill>
+              <a:schemeClr val="dk2"/>
+            </a:solidFill>
+            <a:prstDash val="solid"/>
+            <a:round/>
+            <a:headEnd len="sm" w="sm" type="none"/>
+            <a:tailEnd len="sm" w="sm" type="none"/>
+          </a:ln>
+        </p:spPr>
+        <p:txBody>
+          <a:bodyPr anchorCtr="0" anchor="ctr" bIns="91425" lIns="91425" spcFirstLastPara="1" rIns="91425" wrap="square" tIns="91425">
+            <a:noAutofit/>
+          </a:bodyPr>
+          <a:lstStyle/>
+          <a:p>
+            <a:pPr indent="0" lvl="0" marL="0" rtl="0" algn="l">
+              <a:spcBef>
+                <a:spcPts val="0"/>
+              </a:spcBef>
+              <a:spcAft>
+                <a:spcPts val="0"/>
+              </a:spcAft>
+              <a:buNone/>
+            </a:pPr>
+            <a:r>
+              <a:t/>
+            </a:r>
+            <a:endParaRPr/>
+          </a:p>
+        </p:txBody>
+      </p:sp>
+      <p:sp>
+        <p:nvSpPr>
+          <p:cNvPr id="174" name="Google Shape;174;p24"/>
+          <p:cNvSpPr/>
+          <p:nvPr/>
+        </p:nvSpPr>
+        <p:spPr>
+          <a:xfrm rot="-1522476">
+            <a:off x="6050573" y="2827785"/>
+            <a:ext cx="316427" cy="161703"/>
+          </a:xfrm>
+          <a:prstGeom prst="rightArrow">
+            <a:avLst>
+              <a:gd fmla="val 50000" name="adj1"/>
+              <a:gd fmla="val 50000" name="adj2"/>
+            </a:avLst>
+          </a:prstGeom>
+          <a:solidFill>
+            <a:srgbClr val="FF0000"/>
+          </a:solidFill>
+          <a:ln cap="flat" cmpd="sng" w="9525">
+            <a:solidFill>
+              <a:schemeClr val="dk2"/>
+            </a:solidFill>
+            <a:prstDash val="solid"/>
+            <a:round/>
+            <a:headEnd len="sm" w="sm" type="none"/>
+            <a:tailEnd len="sm" w="sm" type="none"/>
+          </a:ln>
+        </p:spPr>
+        <p:txBody>
+          <a:bodyPr anchorCtr="0" anchor="ctr" bIns="91425" lIns="91425" spcFirstLastPara="1" rIns="91425" wrap="square" tIns="91425">
+            <a:noAutofit/>
+          </a:bodyPr>
+          <a:lstStyle/>
+          <a:p>
+            <a:pPr indent="0" lvl="0" marL="0" rtl="0" algn="l">
+              <a:spcBef>
+                <a:spcPts val="0"/>
+              </a:spcBef>
+              <a:spcAft>
+                <a:spcPts val="0"/>
+              </a:spcAft>
+              <a:buNone/>
+            </a:pPr>
+            <a:r>
+              <a:t/>
+            </a:r>
+            <a:endParaRPr/>
+          </a:p>
+        </p:txBody>
+      </p:sp>
+      <p:sp>
+        <p:nvSpPr>
+          <p:cNvPr id="175" name="Google Shape;175;p24"/>
+          <p:cNvSpPr txBox="1"/>
+          <p:nvPr/>
+        </p:nvSpPr>
+        <p:spPr>
+          <a:xfrm>
+            <a:off x="2433275" y="176075"/>
+            <a:ext cx="4122300" cy="523200"/>
+          </a:xfrm>
+          <a:prstGeom prst="rect">
+            <a:avLst/>
+          </a:prstGeom>
+          <a:noFill/>
+          <a:ln>
+            <a:noFill/>
+          </a:ln>
+        </p:spPr>
+        <p:txBody>
+          <a:bodyPr anchorCtr="0" anchor="t" bIns="91425" lIns="91425" spcFirstLastPara="1" rIns="91425" wrap="square" tIns="91425">
+            <a:spAutoFit/>
+          </a:bodyPr>
+          <a:lstStyle/>
+          <a:p>
+            <a:pPr indent="0" lvl="0" marL="0" rtl="0" algn="ctr">
+              <a:spcBef>
+                <a:spcPts val="0"/>
+              </a:spcBef>
+              <a:spcAft>
+                <a:spcPts val="0"/>
+              </a:spcAft>
+              <a:buNone/>
+            </a:pPr>
+            <a:r>
+              <a:rPr lang="en" sz="2200">
+                <a:solidFill>
+                  <a:schemeClr val="dk1"/>
+                </a:solidFill>
+                <a:latin typeface="Roboto"/>
+                <a:ea typeface="Roboto"/>
+                <a:cs typeface="Roboto"/>
+                <a:sym typeface="Roboto"/>
+              </a:rPr>
+              <a:t>Analyzing Data</a:t>
+            </a:r>
+            <a:endParaRPr sz="2200">
+              <a:solidFill>
+                <a:schemeClr val="dk1"/>
+              </a:solidFill>
+              <a:latin typeface="Roboto"/>
+              <a:ea typeface="Roboto"/>
+              <a:cs typeface="Roboto"/>
+              <a:sym typeface="Roboto"/>
+            </a:endParaRPr>
+          </a:p>
+        </p:txBody>
+      </p:sp>
+      <p:sp>
+        <p:nvSpPr>
+          <p:cNvPr id="176" name="Google Shape;176;p24"/>
           <p:cNvSpPr txBox="1"/>
           <p:nvPr/>
         </p:nvSpPr>
@@ -8390,6 +9097,110 @@
           </a:p>
         </p:txBody>
       </p:sp>
+      <p:sp>
+        <p:nvSpPr>
+          <p:cNvPr id="177" name="Google Shape;177;p24"/>
+          <p:cNvSpPr txBox="1"/>
+          <p:nvPr/>
+        </p:nvSpPr>
+        <p:spPr>
+          <a:xfrm>
+            <a:off x="4136975" y="3215925"/>
+            <a:ext cx="1324500" cy="400200"/>
+          </a:xfrm>
+          <a:prstGeom prst="rect">
+            <a:avLst/>
+          </a:prstGeom>
+          <a:noFill/>
+          <a:ln>
+            <a:noFill/>
+          </a:ln>
+        </p:spPr>
+        <p:txBody>
+          <a:bodyPr anchorCtr="0" anchor="t" bIns="91425" lIns="91425" spcFirstLastPara="1" rIns="91425" wrap="square" tIns="91425">
+            <a:spAutoFit/>
+          </a:bodyPr>
+          <a:lstStyle/>
+          <a:p>
+            <a:pPr indent="0" lvl="0" marL="0" rtl="0" algn="l">
+              <a:spcBef>
+                <a:spcPts val="0"/>
+              </a:spcBef>
+              <a:spcAft>
+                <a:spcPts val="0"/>
+              </a:spcAft>
+              <a:buNone/>
+            </a:pPr>
+            <a:r>
+              <a:rPr lang="en">
+                <a:latin typeface="Roboto"/>
+                <a:ea typeface="Roboto"/>
+                <a:cs typeface="Roboto"/>
+                <a:sym typeface="Roboto"/>
+              </a:rPr>
+              <a:t>Congress 116</a:t>
+            </a:r>
+            <a:endParaRPr>
+              <a:latin typeface="Roboto"/>
+              <a:ea typeface="Roboto"/>
+              <a:cs typeface="Roboto"/>
+              <a:sym typeface="Roboto"/>
+            </a:endParaRPr>
+          </a:p>
+        </p:txBody>
+      </p:sp>
+      <p:sp>
+        <p:nvSpPr>
+          <p:cNvPr id="178" name="Google Shape;178;p24"/>
+          <p:cNvSpPr/>
+          <p:nvPr/>
+        </p:nvSpPr>
+        <p:spPr>
+          <a:xfrm rot="4216">
+            <a:off x="3682349" y="3299775"/>
+            <a:ext cx="489300" cy="232500"/>
+          </a:xfrm>
+          <a:prstGeom prst="leftArrow">
+            <a:avLst>
+              <a:gd fmla="val 50000" name="adj1"/>
+              <a:gd fmla="val 50000" name="adj2"/>
+            </a:avLst>
+          </a:prstGeom>
+          <a:solidFill>
+            <a:srgbClr val="FF0000"/>
+          </a:solidFill>
+          <a:ln cap="flat" cmpd="sng" w="9525">
+            <a:solidFill>
+              <a:schemeClr val="dk2"/>
+            </a:solidFill>
+            <a:prstDash val="solid"/>
+            <a:round/>
+            <a:headEnd len="sm" w="sm" type="none"/>
+            <a:tailEnd len="sm" w="sm" type="none"/>
+          </a:ln>
+        </p:spPr>
+        <p:txBody>
+          <a:bodyPr anchorCtr="0" anchor="ctr" bIns="91425" lIns="91425" spcFirstLastPara="1" rIns="91425" wrap="square" tIns="91425">
+            <a:noAutofit/>
+          </a:bodyPr>
+          <a:lstStyle/>
+          <a:p>
+            <a:pPr indent="0" lvl="0" marL="0" rtl="0" algn="l">
+              <a:spcBef>
+                <a:spcPts val="0"/>
+              </a:spcBef>
+              <a:spcAft>
+                <a:spcPts val="0"/>
+              </a:spcAft>
+              <a:buNone/>
+            </a:pPr>
+            <a:r>
+              <a:t/>
+            </a:r>
+            <a:endParaRPr/>
+          </a:p>
+        </p:txBody>
+      </p:sp>
     </p:spTree>
   </p:cSld>
   <p:clrMapOvr>
@@ -8398,12 +9209,12 @@
 </p:sld>
 </file>
 
-<file path=ppt/slides/slide12.xml><?xml version="1.0" encoding="utf-8"?>
+<file path=ppt/slides/slide13.xml><?xml version="1.0" encoding="utf-8"?>
 <p:sld xmlns:a="http://schemas.openxmlformats.org/drawingml/2006/main" xmlns:r="http://schemas.openxmlformats.org/officeDocument/2006/relationships" xmlns:mc="http://schemas.openxmlformats.org/markup-compatibility/2006" xmlns:mv="urn:schemas-microsoft-com:mac:vml" xmlns:p="http://schemas.openxmlformats.org/presentationml/2006/main" xmlns:c="http://schemas.openxmlformats.org/drawingml/2006/chart" xmlns:dgm="http://schemas.openxmlformats.org/drawingml/2006/diagram" xmlns:o="urn:schemas-microsoft-com:office:office" xmlns:v="urn:schemas-microsoft-com:vml" xmlns:pvml="urn:schemas-microsoft-com:office:powerpoint" xmlns:com="http://schemas.openxmlformats.org/drawingml/2006/compatibility" xmlns:p14="http://schemas.microsoft.com/office/powerpoint/2010/main" xmlns:p15="http://schemas.microsoft.com/office/powerpoint/2012/main" xmlns:ahyp="http://schemas.microsoft.com/office/drawing/2018/hyperlinkcolor">
   <p:cSld>
     <p:spTree>
       <p:nvGrpSpPr>
-        <p:cNvPr id="166" name="Shape 166"/>
+        <p:cNvPr id="182" name="Shape 182"/>
         <p:cNvGrpSpPr/>
         <p:nvPr/>
       </p:nvGrpSpPr>
@@ -8417,7 +9228,7 @@
       </p:grpSpPr>
       <p:pic>
         <p:nvPicPr>
-          <p:cNvPr id="167" name="Google Shape;167;p24"/>
+          <p:cNvPr id="183" name="Google Shape;183;p25"/>
           <p:cNvPicPr preferRelativeResize="0"/>
           <p:nvPr/>
         </p:nvPicPr>
@@ -8445,7 +9256,7 @@
       </p:pic>
       <p:pic>
         <p:nvPicPr>
-          <p:cNvPr id="168" name="Google Shape;168;p24"/>
+          <p:cNvPr id="184" name="Google Shape;184;p25"/>
           <p:cNvPicPr preferRelativeResize="0"/>
           <p:nvPr/>
         </p:nvPicPr>
@@ -8473,7 +9284,7 @@
       </p:pic>
       <p:pic>
         <p:nvPicPr>
-          <p:cNvPr id="169" name="Google Shape;169;p24"/>
+          <p:cNvPr id="185" name="Google Shape;185;p25"/>
           <p:cNvPicPr preferRelativeResize="0"/>
           <p:nvPr/>
         </p:nvPicPr>
@@ -8487,8 +9298,8 @@
         </p:blipFill>
         <p:spPr>
           <a:xfrm>
-            <a:off x="4572000" y="2879725"/>
-            <a:ext cx="3272798" cy="1992600"/>
+            <a:off x="4680425" y="2879725"/>
+            <a:ext cx="3331200" cy="1992600"/>
           </a:xfrm>
           <a:prstGeom prst="rect">
             <a:avLst/>
@@ -8501,7 +9312,7 @@
       </p:pic>
       <p:pic>
         <p:nvPicPr>
-          <p:cNvPr id="170" name="Google Shape;170;p24"/>
+          <p:cNvPr id="186" name="Google Shape;186;p25"/>
           <p:cNvPicPr preferRelativeResize="0"/>
           <p:nvPr/>
         </p:nvPicPr>
@@ -8529,7 +9340,7 @@
       </p:pic>
       <p:sp>
         <p:nvSpPr>
-          <p:cNvPr id="171" name="Google Shape;171;p24"/>
+          <p:cNvPr id="187" name="Google Shape;187;p25"/>
           <p:cNvSpPr txBox="1"/>
           <p:nvPr/>
         </p:nvSpPr>
@@ -8593,12 +9404,12 @@
 </p:sld>
 </file>
 
-<file path=ppt/slides/slide13.xml><?xml version="1.0" encoding="utf-8"?>
+<file path=ppt/slides/slide14.xml><?xml version="1.0" encoding="utf-8"?>
 <p:sld xmlns:a="http://schemas.openxmlformats.org/drawingml/2006/main" xmlns:r="http://schemas.openxmlformats.org/officeDocument/2006/relationships" xmlns:mc="http://schemas.openxmlformats.org/markup-compatibility/2006" xmlns:mv="urn:schemas-microsoft-com:mac:vml" xmlns:p="http://schemas.openxmlformats.org/presentationml/2006/main" xmlns:c="http://schemas.openxmlformats.org/drawingml/2006/chart" xmlns:dgm="http://schemas.openxmlformats.org/drawingml/2006/diagram" xmlns:o="urn:schemas-microsoft-com:office:office" xmlns:v="urn:schemas-microsoft-com:vml" xmlns:pvml="urn:schemas-microsoft-com:office:powerpoint" xmlns:com="http://schemas.openxmlformats.org/drawingml/2006/compatibility" xmlns:p14="http://schemas.microsoft.com/office/powerpoint/2010/main" xmlns:p15="http://schemas.microsoft.com/office/powerpoint/2012/main" xmlns:ahyp="http://schemas.microsoft.com/office/drawing/2018/hyperlinkcolor">
   <p:cSld>
     <p:spTree>
       <p:nvGrpSpPr>
-        <p:cNvPr id="175" name="Shape 175"/>
+        <p:cNvPr id="191" name="Shape 191"/>
         <p:cNvGrpSpPr/>
         <p:nvPr/>
       </p:nvGrpSpPr>
@@ -8612,7 +9423,7 @@
       </p:grpSpPr>
       <p:pic>
         <p:nvPicPr>
-          <p:cNvPr id="176" name="Google Shape;176;p25"/>
+          <p:cNvPr id="192" name="Google Shape;192;p26"/>
           <p:cNvPicPr preferRelativeResize="0"/>
           <p:nvPr/>
         </p:nvPicPr>
@@ -8640,7 +9451,7 @@
       </p:pic>
       <p:sp>
         <p:nvSpPr>
-          <p:cNvPr id="177" name="Google Shape;177;p25"/>
+          <p:cNvPr id="193" name="Google Shape;193;p26"/>
           <p:cNvSpPr txBox="1"/>
           <p:nvPr/>
         </p:nvSpPr>
@@ -8698,7 +9509,7 @@
       </p:sp>
       <p:sp>
         <p:nvSpPr>
-          <p:cNvPr id="178" name="Google Shape;178;p25"/>
+          <p:cNvPr id="194" name="Google Shape;194;p26"/>
           <p:cNvSpPr txBox="1"/>
           <p:nvPr/>
         </p:nvSpPr>
@@ -8810,12 +9621,12 @@
 </p:sld>
 </file>
 
-<file path=ppt/slides/slide14.xml><?xml version="1.0" encoding="utf-8"?>
+<file path=ppt/slides/slide15.xml><?xml version="1.0" encoding="utf-8"?>
 <p:sld xmlns:a="http://schemas.openxmlformats.org/drawingml/2006/main" xmlns:r="http://schemas.openxmlformats.org/officeDocument/2006/relationships" xmlns:mc="http://schemas.openxmlformats.org/markup-compatibility/2006" xmlns:mv="urn:schemas-microsoft-com:mac:vml" xmlns:p="http://schemas.openxmlformats.org/presentationml/2006/main" xmlns:c="http://schemas.openxmlformats.org/drawingml/2006/chart" xmlns:dgm="http://schemas.openxmlformats.org/drawingml/2006/diagram" xmlns:o="urn:schemas-microsoft-com:office:office" xmlns:v="urn:schemas-microsoft-com:vml" xmlns:pvml="urn:schemas-microsoft-com:office:powerpoint" xmlns:com="http://schemas.openxmlformats.org/drawingml/2006/compatibility" xmlns:p14="http://schemas.microsoft.com/office/powerpoint/2010/main" xmlns:p15="http://schemas.microsoft.com/office/powerpoint/2012/main" xmlns:ahyp="http://schemas.microsoft.com/office/drawing/2018/hyperlinkcolor">
   <p:cSld>
     <p:spTree>
       <p:nvGrpSpPr>
-        <p:cNvPr id="182" name="Shape 182"/>
+        <p:cNvPr id="198" name="Shape 198"/>
         <p:cNvGrpSpPr/>
         <p:nvPr/>
       </p:nvGrpSpPr>
@@ -8829,7 +9640,7 @@
       </p:grpSpPr>
       <p:sp>
         <p:nvSpPr>
-          <p:cNvPr id="183" name="Google Shape;183;p26"/>
+          <p:cNvPr id="199" name="Google Shape;199;p27"/>
           <p:cNvSpPr txBox="1"/>
           <p:nvPr>
             <p:ph type="title"/>
@@ -8869,7 +9680,7 @@
       </p:sp>
       <p:sp>
         <p:nvSpPr>
-          <p:cNvPr id="184" name="Google Shape;184;p26"/>
+          <p:cNvPr id="200" name="Google Shape;200;p27"/>
           <p:cNvSpPr txBox="1"/>
           <p:nvPr>
             <p:ph idx="1" type="body"/>
@@ -8983,12 +9794,12 @@
 </p:sld>
 </file>
 
-<file path=ppt/slides/slide15.xml><?xml version="1.0" encoding="utf-8"?>
+<file path=ppt/slides/slide16.xml><?xml version="1.0" encoding="utf-8"?>
 <p:sld xmlns:a="http://schemas.openxmlformats.org/drawingml/2006/main" xmlns:r="http://schemas.openxmlformats.org/officeDocument/2006/relationships" xmlns:mc="http://schemas.openxmlformats.org/markup-compatibility/2006" xmlns:mv="urn:schemas-microsoft-com:mac:vml" xmlns:p="http://schemas.openxmlformats.org/presentationml/2006/main" xmlns:c="http://schemas.openxmlformats.org/drawingml/2006/chart" xmlns:dgm="http://schemas.openxmlformats.org/drawingml/2006/diagram" xmlns:o="urn:schemas-microsoft-com:office:office" xmlns:v="urn:schemas-microsoft-com:vml" xmlns:pvml="urn:schemas-microsoft-com:office:powerpoint" xmlns:com="http://schemas.openxmlformats.org/drawingml/2006/compatibility" xmlns:p14="http://schemas.microsoft.com/office/powerpoint/2010/main" xmlns:p15="http://schemas.microsoft.com/office/powerpoint/2012/main" xmlns:ahyp="http://schemas.microsoft.com/office/drawing/2018/hyperlinkcolor">
   <p:cSld>
     <p:spTree>
       <p:nvGrpSpPr>
-        <p:cNvPr id="188" name="Shape 188"/>
+        <p:cNvPr id="204" name="Shape 204"/>
         <p:cNvGrpSpPr/>
         <p:nvPr/>
       </p:nvGrpSpPr>
@@ -9002,7 +9813,7 @@
       </p:grpSpPr>
       <p:sp>
         <p:nvSpPr>
-          <p:cNvPr id="189" name="Google Shape;189;p27"/>
+          <p:cNvPr id="205" name="Google Shape;205;p28"/>
           <p:cNvSpPr txBox="1"/>
           <p:nvPr>
             <p:ph type="title"/>
@@ -9042,7 +9853,7 @@
       </p:sp>
       <p:sp>
         <p:nvSpPr>
-          <p:cNvPr id="190" name="Google Shape;190;p27"/>
+          <p:cNvPr id="206" name="Google Shape;206;p28"/>
           <p:cNvSpPr txBox="1"/>
           <p:nvPr>
             <p:ph idx="1" type="body"/>
@@ -9059,7 +9870,7 @@
         </p:spPr>
         <p:txBody>
           <a:bodyPr anchorCtr="0" anchor="t" bIns="91425" lIns="91425" spcFirstLastPara="1" rIns="91425" wrap="square" tIns="91425">
-            <a:normAutofit/>
+            <a:normAutofit lnSpcReduction="20000"/>
           </a:bodyPr>
           <a:lstStyle/>
           <a:p>
@@ -9108,7 +9919,7 @@
                 <a:spcPts val="1200"/>
               </a:spcBef>
               <a:spcAft>
-                <a:spcPts val="1200"/>
+                <a:spcPts val="0"/>
               </a:spcAft>
               <a:buNone/>
             </a:pPr>
@@ -9119,6 +9930,22 @@
             <a:r>
               <a:rPr lang="en"/>
               <a:t>is a little polygonal visually</a:t>
+            </a:r>
+            <a:endParaRPr/>
+          </a:p>
+          <a:p>
+            <a:pPr indent="0" lvl="0" marL="0" rtl="0" algn="l">
+              <a:spcBef>
+                <a:spcPts val="1200"/>
+              </a:spcBef>
+              <a:spcAft>
+                <a:spcPts val="1200"/>
+              </a:spcAft>
+              <a:buNone/>
+            </a:pPr>
+            <a:r>
+              <a:rPr lang="en"/>
+              <a:t>- I could not figure out how to put the ggplot graphs on the same axis</a:t>
             </a:r>
             <a:endParaRPr/>
           </a:p>
@@ -9132,7 +9959,7 @@
 </p:sld>
 </file>
 
-<file path=ppt/slides/slide16.xml><?xml version="1.0" encoding="utf-8"?>
+<file path=ppt/slides/slide17.xml><?xml version="1.0" encoding="utf-8"?>
 <p:sld xmlns:a="http://schemas.openxmlformats.org/drawingml/2006/main" xmlns:r="http://schemas.openxmlformats.org/officeDocument/2006/relationships" xmlns:mc="http://schemas.openxmlformats.org/markup-compatibility/2006" xmlns:mv="urn:schemas-microsoft-com:mac:vml" xmlns:p="http://schemas.openxmlformats.org/presentationml/2006/main" xmlns:c="http://schemas.openxmlformats.org/drawingml/2006/chart" xmlns:dgm="http://schemas.openxmlformats.org/drawingml/2006/diagram" xmlns:o="urn:schemas-microsoft-com:office:office" xmlns:v="urn:schemas-microsoft-com:vml" xmlns:pvml="urn:schemas-microsoft-com:office:powerpoint" xmlns:com="http://schemas.openxmlformats.org/drawingml/2006/compatibility" xmlns:p14="http://schemas.microsoft.com/office/powerpoint/2010/main" xmlns:p15="http://schemas.microsoft.com/office/powerpoint/2012/main" xmlns:ahyp="http://schemas.microsoft.com/office/drawing/2018/hyperlinkcolor">
   <p:cSld>
     <p:bg>
@@ -9144,7 +9971,7 @@
     </p:bg>
     <p:spTree>
       <p:nvGrpSpPr>
-        <p:cNvPr id="194" name="Shape 194"/>
+        <p:cNvPr id="210" name="Shape 210"/>
         <p:cNvGrpSpPr/>
         <p:nvPr/>
       </p:nvGrpSpPr>
@@ -9158,7 +9985,7 @@
       </p:grpSpPr>
       <p:sp>
         <p:nvSpPr>
-          <p:cNvPr id="195" name="Google Shape;195;p28"/>
+          <p:cNvPr id="211" name="Google Shape;211;p29"/>
           <p:cNvSpPr txBox="1"/>
           <p:nvPr>
             <p:ph type="title"/>
@@ -9198,7 +10025,7 @@
       </p:sp>
       <p:sp>
         <p:nvSpPr>
-          <p:cNvPr id="196" name="Google Shape;196;p28"/>
+          <p:cNvPr id="212" name="Google Shape;212;p29"/>
           <p:cNvSpPr txBox="1"/>
           <p:nvPr>
             <p:ph idx="1" type="body"/>
@@ -9249,7 +10076,141 @@
   <p:cSld>
     <p:spTree>
       <p:nvGrpSpPr>
-        <p:cNvPr id="68" name="Shape 68"/>
+        <p:cNvPr id="70" name="Shape 70"/>
+        <p:cNvGrpSpPr/>
+        <p:nvPr/>
+      </p:nvGrpSpPr>
+      <p:grpSpPr>
+        <a:xfrm>
+          <a:off x="0" y="0"/>
+          <a:ext cx="0" cy="0"/>
+          <a:chOff x="0" y="0"/>
+          <a:chExt cx="0" cy="0"/>
+        </a:xfrm>
+      </p:grpSpPr>
+      <p:pic>
+        <p:nvPicPr>
+          <p:cNvPr id="71" name="Google Shape;71;p14"/>
+          <p:cNvPicPr preferRelativeResize="0"/>
+          <p:nvPr/>
+        </p:nvPicPr>
+        <p:blipFill>
+          <a:blip r:embed="rId3">
+            <a:alphaModFix/>
+          </a:blip>
+          <a:stretch>
+            <a:fillRect/>
+          </a:stretch>
+        </p:blipFill>
+        <p:spPr>
+          <a:xfrm>
+            <a:off x="327600" y="166675"/>
+            <a:ext cx="4953000" cy="4810125"/>
+          </a:xfrm>
+          <a:prstGeom prst="rect">
+            <a:avLst/>
+          </a:prstGeom>
+          <a:noFill/>
+          <a:ln>
+            <a:noFill/>
+          </a:ln>
+        </p:spPr>
+      </p:pic>
+      <p:pic>
+        <p:nvPicPr>
+          <p:cNvPr id="72" name="Google Shape;72;p14"/>
+          <p:cNvPicPr preferRelativeResize="0"/>
+          <p:nvPr/>
+        </p:nvPicPr>
+        <p:blipFill rotWithShape="1">
+          <a:blip r:embed="rId3">
+            <a:alphaModFix/>
+          </a:blip>
+          <a:srcRect b="67560" l="69983" r="0" t="0"/>
+          <a:stretch/>
+        </p:blipFill>
+        <p:spPr>
+          <a:xfrm>
+            <a:off x="6757875" y="166675"/>
+            <a:ext cx="1486726" cy="1560350"/>
+          </a:xfrm>
+          <a:prstGeom prst="rect">
+            <a:avLst/>
+          </a:prstGeom>
+          <a:noFill/>
+          <a:ln>
+            <a:noFill/>
+          </a:ln>
+        </p:spPr>
+      </p:pic>
+      <p:pic>
+        <p:nvPicPr>
+          <p:cNvPr id="73" name="Google Shape;73;p14"/>
+          <p:cNvPicPr preferRelativeResize="0"/>
+          <p:nvPr/>
+        </p:nvPicPr>
+        <p:blipFill rotWithShape="1">
+          <a:blip r:embed="rId3">
+            <a:alphaModFix/>
+          </a:blip>
+          <a:srcRect b="69861" l="34946" r="32880" t="0"/>
+          <a:stretch/>
+        </p:blipFill>
+        <p:spPr>
+          <a:xfrm>
+            <a:off x="6465900" y="2037750"/>
+            <a:ext cx="1593524" cy="1449674"/>
+          </a:xfrm>
+          <a:prstGeom prst="rect">
+            <a:avLst/>
+          </a:prstGeom>
+          <a:noFill/>
+          <a:ln>
+            <a:noFill/>
+          </a:ln>
+        </p:spPr>
+      </p:pic>
+      <p:pic>
+        <p:nvPicPr>
+          <p:cNvPr id="74" name="Google Shape;74;p14"/>
+          <p:cNvPicPr preferRelativeResize="0"/>
+          <p:nvPr/>
+        </p:nvPicPr>
+        <p:blipFill rotWithShape="1">
+          <a:blip r:embed="rId3">
+            <a:alphaModFix/>
+          </a:blip>
+          <a:srcRect b="65996" l="0" r="69983" t="0"/>
+          <a:stretch/>
+        </p:blipFill>
+        <p:spPr>
+          <a:xfrm>
+            <a:off x="3692075" y="333375"/>
+            <a:ext cx="1486726" cy="1635600"/>
+          </a:xfrm>
+          <a:prstGeom prst="rect">
+            <a:avLst/>
+          </a:prstGeom>
+          <a:noFill/>
+          <a:ln>
+            <a:noFill/>
+          </a:ln>
+        </p:spPr>
+      </p:pic>
+    </p:spTree>
+  </p:cSld>
+  <p:clrMapOvr>
+    <a:masterClrMapping/>
+  </p:clrMapOvr>
+</p:sld>
+</file>
+
+<file path=ppt/slides/slide3.xml><?xml version="1.0" encoding="utf-8"?>
+<p:sld xmlns:a="http://schemas.openxmlformats.org/drawingml/2006/main" xmlns:r="http://schemas.openxmlformats.org/officeDocument/2006/relationships" xmlns:mc="http://schemas.openxmlformats.org/markup-compatibility/2006" xmlns:mv="urn:schemas-microsoft-com:mac:vml" xmlns:p="http://schemas.openxmlformats.org/presentationml/2006/main" xmlns:c="http://schemas.openxmlformats.org/drawingml/2006/chart" xmlns:dgm="http://schemas.openxmlformats.org/drawingml/2006/diagram" xmlns:o="urn:schemas-microsoft-com:office:office" xmlns:v="urn:schemas-microsoft-com:vml" xmlns:pvml="urn:schemas-microsoft-com:office:powerpoint" xmlns:com="http://schemas.openxmlformats.org/drawingml/2006/compatibility" xmlns:p14="http://schemas.microsoft.com/office/powerpoint/2010/main" xmlns:p15="http://schemas.microsoft.com/office/powerpoint/2012/main" xmlns:ahyp="http://schemas.microsoft.com/office/drawing/2018/hyperlinkcolor">
+  <p:cSld>
+    <p:spTree>
+      <p:nvGrpSpPr>
+        <p:cNvPr id="78" name="Shape 78"/>
         <p:cNvGrpSpPr/>
         <p:nvPr/>
       </p:nvGrpSpPr>
@@ -9263,7 +10224,7 @@
       </p:grpSpPr>
       <p:sp>
         <p:nvSpPr>
-          <p:cNvPr id="69" name="Google Shape;69;p14"/>
+          <p:cNvPr id="79" name="Google Shape;79;p15"/>
           <p:cNvSpPr txBox="1"/>
           <p:nvPr>
             <p:ph type="title"/>
@@ -9271,7 +10232,7 @@
         </p:nvSpPr>
         <p:spPr>
           <a:xfrm>
-            <a:off x="387900" y="458025"/>
+            <a:off x="387900" y="441350"/>
             <a:ext cx="8368200" cy="686100"/>
           </a:xfrm>
           <a:prstGeom prst="rect">
@@ -9303,7 +10264,7 @@
       </p:sp>
       <p:sp>
         <p:nvSpPr>
-          <p:cNvPr id="70" name="Google Shape;70;p14"/>
+          <p:cNvPr id="80" name="Google Shape;80;p15"/>
           <p:cNvSpPr txBox="1"/>
           <p:nvPr>
             <p:ph idx="1" type="body"/>
@@ -9390,6 +10351,60 @@
           </a:p>
         </p:txBody>
       </p:sp>
+      <p:pic>
+        <p:nvPicPr>
+          <p:cNvPr id="81" name="Google Shape;81;p15"/>
+          <p:cNvPicPr preferRelativeResize="0"/>
+          <p:nvPr/>
+        </p:nvPicPr>
+        <p:blipFill rotWithShape="1">
+          <a:blip r:embed="rId3">
+            <a:alphaModFix/>
+          </a:blip>
+          <a:srcRect b="67560" l="69983" r="0" t="0"/>
+          <a:stretch/>
+        </p:blipFill>
+        <p:spPr>
+          <a:xfrm>
+            <a:off x="6757875" y="166675"/>
+            <a:ext cx="1486726" cy="1560350"/>
+          </a:xfrm>
+          <a:prstGeom prst="rect">
+            <a:avLst/>
+          </a:prstGeom>
+          <a:noFill/>
+          <a:ln>
+            <a:noFill/>
+          </a:ln>
+        </p:spPr>
+      </p:pic>
+      <p:pic>
+        <p:nvPicPr>
+          <p:cNvPr id="82" name="Google Shape;82;p15"/>
+          <p:cNvPicPr preferRelativeResize="0"/>
+          <p:nvPr/>
+        </p:nvPicPr>
+        <p:blipFill rotWithShape="1">
+          <a:blip r:embed="rId3">
+            <a:alphaModFix/>
+          </a:blip>
+          <a:srcRect b="65996" l="0" r="69983" t="0"/>
+          <a:stretch/>
+        </p:blipFill>
+        <p:spPr>
+          <a:xfrm>
+            <a:off x="1272575" y="3436975"/>
+            <a:ext cx="1486726" cy="1635600"/>
+          </a:xfrm>
+          <a:prstGeom prst="rect">
+            <a:avLst/>
+          </a:prstGeom>
+          <a:noFill/>
+          <a:ln>
+            <a:noFill/>
+          </a:ln>
+        </p:spPr>
+      </p:pic>
     </p:spTree>
   </p:cSld>
   <p:clrMapOvr>
@@ -9398,12 +10413,12 @@
 </p:sld>
 </file>
 
-<file path=ppt/slides/slide3.xml><?xml version="1.0" encoding="utf-8"?>
+<file path=ppt/slides/slide4.xml><?xml version="1.0" encoding="utf-8"?>
 <p:sld xmlns:a="http://schemas.openxmlformats.org/drawingml/2006/main" xmlns:r="http://schemas.openxmlformats.org/officeDocument/2006/relationships" xmlns:mc="http://schemas.openxmlformats.org/markup-compatibility/2006" xmlns:mv="urn:schemas-microsoft-com:mac:vml" xmlns:p="http://schemas.openxmlformats.org/presentationml/2006/main" xmlns:c="http://schemas.openxmlformats.org/drawingml/2006/chart" xmlns:dgm="http://schemas.openxmlformats.org/drawingml/2006/diagram" xmlns:o="urn:schemas-microsoft-com:office:office" xmlns:v="urn:schemas-microsoft-com:vml" xmlns:pvml="urn:schemas-microsoft-com:office:powerpoint" xmlns:com="http://schemas.openxmlformats.org/drawingml/2006/compatibility" xmlns:p14="http://schemas.microsoft.com/office/powerpoint/2010/main" xmlns:p15="http://schemas.microsoft.com/office/powerpoint/2012/main" xmlns:ahyp="http://schemas.microsoft.com/office/drawing/2018/hyperlinkcolor">
   <p:cSld>
     <p:spTree>
       <p:nvGrpSpPr>
-        <p:cNvPr id="74" name="Shape 74"/>
+        <p:cNvPr id="86" name="Shape 86"/>
         <p:cNvGrpSpPr/>
         <p:nvPr/>
       </p:nvGrpSpPr>
@@ -9417,7 +10432,7 @@
       </p:grpSpPr>
       <p:sp>
         <p:nvSpPr>
-          <p:cNvPr id="75" name="Google Shape;75;p15"/>
+          <p:cNvPr id="87" name="Google Shape;87;p16"/>
           <p:cNvSpPr txBox="1"/>
           <p:nvPr>
             <p:ph type="title"/>
@@ -9457,7 +10472,7 @@
       </p:sp>
       <p:sp>
         <p:nvSpPr>
-          <p:cNvPr id="76" name="Google Shape;76;p15"/>
+          <p:cNvPr id="88" name="Google Shape;88;p16"/>
           <p:cNvSpPr txBox="1"/>
           <p:nvPr>
             <p:ph idx="1" type="body"/>
@@ -9590,12 +10605,12 @@
 </p:sld>
 </file>
 
-<file path=ppt/slides/slide4.xml><?xml version="1.0" encoding="utf-8"?>
+<file path=ppt/slides/slide5.xml><?xml version="1.0" encoding="utf-8"?>
 <p:sld xmlns:a="http://schemas.openxmlformats.org/drawingml/2006/main" xmlns:r="http://schemas.openxmlformats.org/officeDocument/2006/relationships" xmlns:mc="http://schemas.openxmlformats.org/markup-compatibility/2006" xmlns:mv="urn:schemas-microsoft-com:mac:vml" xmlns:p="http://schemas.openxmlformats.org/presentationml/2006/main" xmlns:c="http://schemas.openxmlformats.org/drawingml/2006/chart" xmlns:dgm="http://schemas.openxmlformats.org/drawingml/2006/diagram" xmlns:o="urn:schemas-microsoft-com:office:office" xmlns:v="urn:schemas-microsoft-com:vml" xmlns:pvml="urn:schemas-microsoft-com:office:powerpoint" xmlns:com="http://schemas.openxmlformats.org/drawingml/2006/compatibility" xmlns:p14="http://schemas.microsoft.com/office/powerpoint/2010/main" xmlns:p15="http://schemas.microsoft.com/office/powerpoint/2012/main" xmlns:ahyp="http://schemas.microsoft.com/office/drawing/2018/hyperlinkcolor">
   <p:cSld>
     <p:spTree>
       <p:nvGrpSpPr>
-        <p:cNvPr id="80" name="Shape 80"/>
+        <p:cNvPr id="92" name="Shape 92"/>
         <p:cNvGrpSpPr/>
         <p:nvPr/>
       </p:nvGrpSpPr>
@@ -9609,7 +10624,7 @@
       </p:grpSpPr>
       <p:pic>
         <p:nvPicPr>
-          <p:cNvPr id="81" name="Google Shape;81;p16"/>
+          <p:cNvPr id="93" name="Google Shape;93;p17"/>
           <p:cNvPicPr preferRelativeResize="0"/>
           <p:nvPr/>
         </p:nvPicPr>
@@ -9637,7 +10652,7 @@
       </p:pic>
       <p:sp>
         <p:nvSpPr>
-          <p:cNvPr id="82" name="Google Shape;82;p16"/>
+          <p:cNvPr id="94" name="Google Shape;94;p17"/>
           <p:cNvSpPr/>
           <p:nvPr/>
         </p:nvSpPr>
@@ -9688,7 +10703,7 @@
       </p:sp>
       <p:sp>
         <p:nvSpPr>
-          <p:cNvPr id="83" name="Google Shape;83;p16"/>
+          <p:cNvPr id="95" name="Google Shape;95;p17"/>
           <p:cNvSpPr/>
           <p:nvPr/>
         </p:nvSpPr>
@@ -9739,7 +10754,7 @@
       </p:sp>
       <p:sp>
         <p:nvSpPr>
-          <p:cNvPr id="84" name="Google Shape;84;p16"/>
+          <p:cNvPr id="96" name="Google Shape;96;p17"/>
           <p:cNvSpPr/>
           <p:nvPr/>
         </p:nvSpPr>
@@ -9790,7 +10805,7 @@
       </p:sp>
       <p:sp>
         <p:nvSpPr>
-          <p:cNvPr id="85" name="Google Shape;85;p16"/>
+          <p:cNvPr id="97" name="Google Shape;97;p17"/>
           <p:cNvSpPr/>
           <p:nvPr/>
         </p:nvSpPr>
@@ -9842,7 +10857,7 @@
       </p:sp>
       <p:sp>
         <p:nvSpPr>
-          <p:cNvPr id="86" name="Google Shape;86;p16"/>
+          <p:cNvPr id="98" name="Google Shape;98;p17"/>
           <p:cNvSpPr txBox="1"/>
           <p:nvPr/>
         </p:nvSpPr>
@@ -9900,7 +10915,7 @@
       </p:sp>
       <p:sp>
         <p:nvSpPr>
-          <p:cNvPr id="87" name="Google Shape;87;p16"/>
+          <p:cNvPr id="99" name="Google Shape;99;p17"/>
           <p:cNvSpPr txBox="1"/>
           <p:nvPr/>
         </p:nvSpPr>
@@ -9988,12 +11003,12 @@
 </p:sld>
 </file>
 
-<file path=ppt/slides/slide5.xml><?xml version="1.0" encoding="utf-8"?>
+<file path=ppt/slides/slide6.xml><?xml version="1.0" encoding="utf-8"?>
 <p:sld xmlns:a="http://schemas.openxmlformats.org/drawingml/2006/main" xmlns:r="http://schemas.openxmlformats.org/officeDocument/2006/relationships" xmlns:mc="http://schemas.openxmlformats.org/markup-compatibility/2006" xmlns:mv="urn:schemas-microsoft-com:mac:vml" xmlns:p="http://schemas.openxmlformats.org/presentationml/2006/main" xmlns:c="http://schemas.openxmlformats.org/drawingml/2006/chart" xmlns:dgm="http://schemas.openxmlformats.org/drawingml/2006/diagram" xmlns:o="urn:schemas-microsoft-com:office:office" xmlns:v="urn:schemas-microsoft-com:vml" xmlns:pvml="urn:schemas-microsoft-com:office:powerpoint" xmlns:com="http://schemas.openxmlformats.org/drawingml/2006/compatibility" xmlns:p14="http://schemas.microsoft.com/office/powerpoint/2010/main" xmlns:p15="http://schemas.microsoft.com/office/powerpoint/2012/main" xmlns:ahyp="http://schemas.microsoft.com/office/drawing/2018/hyperlinkcolor">
   <p:cSld>
     <p:spTree>
       <p:nvGrpSpPr>
-        <p:cNvPr id="91" name="Shape 91"/>
+        <p:cNvPr id="103" name="Shape 103"/>
         <p:cNvGrpSpPr/>
         <p:nvPr/>
       </p:nvGrpSpPr>
@@ -10007,7 +11022,7 @@
       </p:grpSpPr>
       <p:pic>
         <p:nvPicPr>
-          <p:cNvPr id="92" name="Google Shape;92;p17"/>
+          <p:cNvPr id="104" name="Google Shape;104;p18"/>
           <p:cNvPicPr preferRelativeResize="0"/>
           <p:nvPr/>
         </p:nvPicPr>
@@ -10035,7 +11050,7 @@
       </p:pic>
       <p:pic>
         <p:nvPicPr>
-          <p:cNvPr id="93" name="Google Shape;93;p17"/>
+          <p:cNvPr id="105" name="Google Shape;105;p18"/>
           <p:cNvPicPr preferRelativeResize="0"/>
           <p:nvPr/>
         </p:nvPicPr>
@@ -10063,7 +11078,7 @@
       </p:pic>
       <p:sp>
         <p:nvSpPr>
-          <p:cNvPr id="94" name="Google Shape;94;p17"/>
+          <p:cNvPr id="106" name="Google Shape;106;p18"/>
           <p:cNvSpPr txBox="1"/>
           <p:nvPr/>
         </p:nvSpPr>
@@ -10121,7 +11136,7 @@
       </p:sp>
       <p:sp>
         <p:nvSpPr>
-          <p:cNvPr id="95" name="Google Shape;95;p17"/>
+          <p:cNvPr id="107" name="Google Shape;107;p18"/>
           <p:cNvSpPr/>
           <p:nvPr/>
         </p:nvSpPr>
@@ -10172,7 +11187,7 @@
       </p:sp>
       <p:sp>
         <p:nvSpPr>
-          <p:cNvPr id="96" name="Google Shape;96;p17"/>
+          <p:cNvPr id="108" name="Google Shape;108;p18"/>
           <p:cNvSpPr/>
           <p:nvPr/>
         </p:nvSpPr>
@@ -10223,7 +11238,7 @@
       </p:sp>
       <p:sp>
         <p:nvSpPr>
-          <p:cNvPr id="97" name="Google Shape;97;p17"/>
+          <p:cNvPr id="109" name="Google Shape;109;p18"/>
           <p:cNvSpPr/>
           <p:nvPr/>
         </p:nvSpPr>
@@ -10274,7 +11289,7 @@
       </p:sp>
       <p:sp>
         <p:nvSpPr>
-          <p:cNvPr id="98" name="Google Shape;98;p17"/>
+          <p:cNvPr id="110" name="Google Shape;110;p18"/>
           <p:cNvSpPr/>
           <p:nvPr/>
         </p:nvSpPr>
@@ -10325,7 +11340,7 @@
       </p:sp>
       <p:sp>
         <p:nvSpPr>
-          <p:cNvPr id="99" name="Google Shape;99;p17"/>
+          <p:cNvPr id="111" name="Google Shape;111;p18"/>
           <p:cNvSpPr/>
           <p:nvPr/>
         </p:nvSpPr>
@@ -10376,7 +11391,7 @@
       </p:sp>
       <p:sp>
         <p:nvSpPr>
-          <p:cNvPr id="100" name="Google Shape;100;p17"/>
+          <p:cNvPr id="112" name="Google Shape;112;p18"/>
           <p:cNvSpPr/>
           <p:nvPr/>
         </p:nvSpPr>
@@ -10427,7 +11442,7 @@
       </p:sp>
       <p:sp>
         <p:nvSpPr>
-          <p:cNvPr id="101" name="Google Shape;101;p17"/>
+          <p:cNvPr id="113" name="Google Shape;113;p18"/>
           <p:cNvSpPr txBox="1"/>
           <p:nvPr/>
         </p:nvSpPr>
@@ -10491,12 +11506,12 @@
 </p:sld>
 </file>
 
-<file path=ppt/slides/slide6.xml><?xml version="1.0" encoding="utf-8"?>
+<file path=ppt/slides/slide7.xml><?xml version="1.0" encoding="utf-8"?>
 <p:sld xmlns:a="http://schemas.openxmlformats.org/drawingml/2006/main" xmlns:r="http://schemas.openxmlformats.org/officeDocument/2006/relationships" xmlns:mc="http://schemas.openxmlformats.org/markup-compatibility/2006" xmlns:mv="urn:schemas-microsoft-com:mac:vml" xmlns:p="http://schemas.openxmlformats.org/presentationml/2006/main" xmlns:c="http://schemas.openxmlformats.org/drawingml/2006/chart" xmlns:dgm="http://schemas.openxmlformats.org/drawingml/2006/diagram" xmlns:o="urn:schemas-microsoft-com:office:office" xmlns:v="urn:schemas-microsoft-com:vml" xmlns:pvml="urn:schemas-microsoft-com:office:powerpoint" xmlns:com="http://schemas.openxmlformats.org/drawingml/2006/compatibility" xmlns:p14="http://schemas.microsoft.com/office/powerpoint/2010/main" xmlns:p15="http://schemas.microsoft.com/office/powerpoint/2012/main" xmlns:ahyp="http://schemas.microsoft.com/office/drawing/2018/hyperlinkcolor">
   <p:cSld>
     <p:spTree>
       <p:nvGrpSpPr>
-        <p:cNvPr id="105" name="Shape 105"/>
+        <p:cNvPr id="117" name="Shape 117"/>
         <p:cNvGrpSpPr/>
         <p:nvPr/>
       </p:nvGrpSpPr>
@@ -10510,7 +11525,7 @@
       </p:grpSpPr>
       <p:pic>
         <p:nvPicPr>
-          <p:cNvPr id="106" name="Google Shape;106;p18"/>
+          <p:cNvPr id="118" name="Google Shape;118;p19"/>
           <p:cNvPicPr preferRelativeResize="0"/>
           <p:nvPr/>
         </p:nvPicPr>
@@ -10538,7 +11553,7 @@
       </p:pic>
       <p:sp>
         <p:nvSpPr>
-          <p:cNvPr id="107" name="Google Shape;107;p18"/>
+          <p:cNvPr id="119" name="Google Shape;119;p19"/>
           <p:cNvSpPr txBox="1"/>
           <p:nvPr>
             <p:ph type="title"/>
@@ -10578,7 +11593,7 @@
       </p:sp>
       <p:sp>
         <p:nvSpPr>
-          <p:cNvPr id="108" name="Google Shape;108;p18"/>
+          <p:cNvPr id="120" name="Google Shape;120;p19"/>
           <p:cNvSpPr txBox="1"/>
           <p:nvPr/>
         </p:nvSpPr>
@@ -10636,7 +11651,7 @@
       </p:sp>
       <p:pic>
         <p:nvPicPr>
-          <p:cNvPr id="109" name="Google Shape;109;p18"/>
+          <p:cNvPr id="121" name="Google Shape;121;p19"/>
           <p:cNvPicPr preferRelativeResize="0"/>
           <p:nvPr/>
         </p:nvPicPr>
@@ -10664,7 +11679,7 @@
       </p:pic>
       <p:sp>
         <p:nvSpPr>
-          <p:cNvPr id="110" name="Google Shape;110;p18"/>
+          <p:cNvPr id="122" name="Google Shape;122;p19"/>
           <p:cNvSpPr txBox="1"/>
           <p:nvPr/>
         </p:nvSpPr>
@@ -10734,7 +11749,7 @@
       </p:sp>
       <p:sp>
         <p:nvSpPr>
-          <p:cNvPr id="111" name="Google Shape;111;p18"/>
+          <p:cNvPr id="123" name="Google Shape;123;p19"/>
           <p:cNvSpPr/>
           <p:nvPr/>
         </p:nvSpPr>
@@ -10794,12 +11809,12 @@
 </p:sld>
 </file>
 
-<file path=ppt/slides/slide7.xml><?xml version="1.0" encoding="utf-8"?>
+<file path=ppt/slides/slide8.xml><?xml version="1.0" encoding="utf-8"?>
 <p:sld xmlns:a="http://schemas.openxmlformats.org/drawingml/2006/main" xmlns:r="http://schemas.openxmlformats.org/officeDocument/2006/relationships" xmlns:mc="http://schemas.openxmlformats.org/markup-compatibility/2006" xmlns:mv="urn:schemas-microsoft-com:mac:vml" xmlns:p="http://schemas.openxmlformats.org/presentationml/2006/main" xmlns:c="http://schemas.openxmlformats.org/drawingml/2006/chart" xmlns:dgm="http://schemas.openxmlformats.org/drawingml/2006/diagram" xmlns:o="urn:schemas-microsoft-com:office:office" xmlns:v="urn:schemas-microsoft-com:vml" xmlns:pvml="urn:schemas-microsoft-com:office:powerpoint" xmlns:com="http://schemas.openxmlformats.org/drawingml/2006/compatibility" xmlns:p14="http://schemas.microsoft.com/office/powerpoint/2010/main" xmlns:p15="http://schemas.microsoft.com/office/powerpoint/2012/main" xmlns:ahyp="http://schemas.microsoft.com/office/drawing/2018/hyperlinkcolor">
   <p:cSld>
     <p:spTree>
       <p:nvGrpSpPr>
-        <p:cNvPr id="115" name="Shape 115"/>
+        <p:cNvPr id="127" name="Shape 127"/>
         <p:cNvGrpSpPr/>
         <p:nvPr/>
       </p:nvGrpSpPr>
@@ -10813,7 +11828,7 @@
       </p:grpSpPr>
       <p:pic>
         <p:nvPicPr>
-          <p:cNvPr id="116" name="Google Shape;116;p19"/>
+          <p:cNvPr id="128" name="Google Shape;128;p20"/>
           <p:cNvPicPr preferRelativeResize="0"/>
           <p:nvPr/>
         </p:nvPicPr>
@@ -10841,7 +11856,7 @@
       </p:pic>
       <p:pic>
         <p:nvPicPr>
-          <p:cNvPr id="117" name="Google Shape;117;p19"/>
+          <p:cNvPr id="129" name="Google Shape;129;p20"/>
           <p:cNvPicPr preferRelativeResize="0"/>
           <p:nvPr/>
         </p:nvPicPr>
@@ -10869,7 +11884,7 @@
       </p:pic>
       <p:sp>
         <p:nvSpPr>
-          <p:cNvPr id="118" name="Google Shape;118;p19"/>
+          <p:cNvPr id="130" name="Google Shape;130;p20"/>
           <p:cNvSpPr/>
           <p:nvPr/>
         </p:nvSpPr>
@@ -10921,7 +11936,7 @@
       </p:sp>
       <p:sp>
         <p:nvSpPr>
-          <p:cNvPr id="119" name="Google Shape;119;p19"/>
+          <p:cNvPr id="131" name="Google Shape;131;p20"/>
           <p:cNvSpPr txBox="1"/>
           <p:nvPr/>
         </p:nvSpPr>
@@ -10979,7 +11994,7 @@
       </p:sp>
       <p:sp>
         <p:nvSpPr>
-          <p:cNvPr id="120" name="Google Shape;120;p19"/>
+          <p:cNvPr id="132" name="Google Shape;132;p20"/>
           <p:cNvSpPr txBox="1"/>
           <p:nvPr/>
         </p:nvSpPr>
@@ -11025,7 +12040,7 @@
       </p:sp>
       <p:sp>
         <p:nvSpPr>
-          <p:cNvPr id="121" name="Google Shape;121;p19"/>
+          <p:cNvPr id="133" name="Google Shape;133;p20"/>
           <p:cNvSpPr txBox="1"/>
           <p:nvPr/>
         </p:nvSpPr>
@@ -11089,12 +12104,12 @@
 </p:sld>
 </file>
 
-<file path=ppt/slides/slide8.xml><?xml version="1.0" encoding="utf-8"?>
+<file path=ppt/slides/slide9.xml><?xml version="1.0" encoding="utf-8"?>
 <p:sld xmlns:a="http://schemas.openxmlformats.org/drawingml/2006/main" xmlns:r="http://schemas.openxmlformats.org/officeDocument/2006/relationships" xmlns:mc="http://schemas.openxmlformats.org/markup-compatibility/2006" xmlns:mv="urn:schemas-microsoft-com:mac:vml" xmlns:p="http://schemas.openxmlformats.org/presentationml/2006/main" xmlns:c="http://schemas.openxmlformats.org/drawingml/2006/chart" xmlns:dgm="http://schemas.openxmlformats.org/drawingml/2006/diagram" xmlns:o="urn:schemas-microsoft-com:office:office" xmlns:v="urn:schemas-microsoft-com:vml" xmlns:pvml="urn:schemas-microsoft-com:office:powerpoint" xmlns:com="http://schemas.openxmlformats.org/drawingml/2006/compatibility" xmlns:p14="http://schemas.microsoft.com/office/powerpoint/2010/main" xmlns:p15="http://schemas.microsoft.com/office/powerpoint/2012/main" xmlns:ahyp="http://schemas.microsoft.com/office/drawing/2018/hyperlinkcolor">
   <p:cSld>
     <p:spTree>
       <p:nvGrpSpPr>
-        <p:cNvPr id="125" name="Shape 125"/>
+        <p:cNvPr id="137" name="Shape 137"/>
         <p:cNvGrpSpPr/>
         <p:nvPr/>
       </p:nvGrpSpPr>
@@ -11108,7 +12123,7 @@
       </p:grpSpPr>
       <p:pic>
         <p:nvPicPr>
-          <p:cNvPr id="126" name="Google Shape;126;p20"/>
+          <p:cNvPr id="138" name="Google Shape;138;p21"/>
           <p:cNvPicPr preferRelativeResize="0"/>
           <p:nvPr/>
         </p:nvPicPr>
@@ -11136,7 +12151,7 @@
       </p:pic>
       <p:sp>
         <p:nvSpPr>
-          <p:cNvPr id="127" name="Google Shape;127;p20"/>
+          <p:cNvPr id="139" name="Google Shape;139;p21"/>
           <p:cNvSpPr txBox="1"/>
           <p:nvPr/>
         </p:nvSpPr>
@@ -11194,7 +12209,7 @@
       </p:sp>
       <p:sp>
         <p:nvSpPr>
-          <p:cNvPr id="128" name="Google Shape;128;p20"/>
+          <p:cNvPr id="140" name="Google Shape;140;p21"/>
           <p:cNvSpPr txBox="1"/>
           <p:nvPr/>
         </p:nvSpPr>
@@ -11276,7 +12291,7 @@
       </p:sp>
       <p:pic>
         <p:nvPicPr>
-          <p:cNvPr id="129" name="Google Shape;129;p20"/>
+          <p:cNvPr id="141" name="Google Shape;141;p21"/>
           <p:cNvPicPr preferRelativeResize="0"/>
           <p:nvPr/>
         </p:nvPicPr>
@@ -11304,7 +12319,7 @@
       </p:pic>
       <p:sp>
         <p:nvSpPr>
-          <p:cNvPr id="130" name="Google Shape;130;p20"/>
+          <p:cNvPr id="142" name="Google Shape;142;p21"/>
           <p:cNvSpPr/>
           <p:nvPr/>
         </p:nvSpPr>
@@ -11312,383 +12327,6 @@
           <a:xfrm>
             <a:off x="7699400" y="1778025"/>
             <a:ext cx="690600" cy="333300"/>
-          </a:xfrm>
-          <a:prstGeom prst="leftArrow">
-            <a:avLst>
-              <a:gd fmla="val 50000" name="adj1"/>
-              <a:gd fmla="val 50000" name="adj2"/>
-            </a:avLst>
-          </a:prstGeom>
-          <a:solidFill>
-            <a:srgbClr val="FF0000"/>
-          </a:solidFill>
-          <a:ln cap="flat" cmpd="sng" w="9525">
-            <a:solidFill>
-              <a:schemeClr val="dk2"/>
-            </a:solidFill>
-            <a:prstDash val="solid"/>
-            <a:round/>
-            <a:headEnd len="sm" w="sm" type="none"/>
-            <a:tailEnd len="sm" w="sm" type="none"/>
-          </a:ln>
-        </p:spPr>
-        <p:txBody>
-          <a:bodyPr anchorCtr="0" anchor="ctr" bIns="91425" lIns="91425" spcFirstLastPara="1" rIns="91425" wrap="square" tIns="91425">
-            <a:noAutofit/>
-          </a:bodyPr>
-          <a:lstStyle/>
-          <a:p>
-            <a:pPr indent="0" lvl="0" marL="0" rtl="0" algn="l">
-              <a:spcBef>
-                <a:spcPts val="0"/>
-              </a:spcBef>
-              <a:spcAft>
-                <a:spcPts val="0"/>
-              </a:spcAft>
-              <a:buNone/>
-            </a:pPr>
-            <a:r>
-              <a:t/>
-            </a:r>
-            <a:endParaRPr/>
-          </a:p>
-        </p:txBody>
-      </p:sp>
-    </p:spTree>
-  </p:cSld>
-  <p:clrMapOvr>
-    <a:masterClrMapping/>
-  </p:clrMapOvr>
-</p:sld>
-</file>
-
-<file path=ppt/slides/slide9.xml><?xml version="1.0" encoding="utf-8"?>
-<p:sld xmlns:a="http://schemas.openxmlformats.org/drawingml/2006/main" xmlns:r="http://schemas.openxmlformats.org/officeDocument/2006/relationships" xmlns:mc="http://schemas.openxmlformats.org/markup-compatibility/2006" xmlns:mv="urn:schemas-microsoft-com:mac:vml" xmlns:p="http://schemas.openxmlformats.org/presentationml/2006/main" xmlns:c="http://schemas.openxmlformats.org/drawingml/2006/chart" xmlns:dgm="http://schemas.openxmlformats.org/drawingml/2006/diagram" xmlns:o="urn:schemas-microsoft-com:office:office" xmlns:v="urn:schemas-microsoft-com:vml" xmlns:pvml="urn:schemas-microsoft-com:office:powerpoint" xmlns:com="http://schemas.openxmlformats.org/drawingml/2006/compatibility" xmlns:p14="http://schemas.microsoft.com/office/powerpoint/2010/main" xmlns:p15="http://schemas.microsoft.com/office/powerpoint/2012/main" xmlns:ahyp="http://schemas.microsoft.com/office/drawing/2018/hyperlinkcolor">
-  <p:cSld>
-    <p:spTree>
-      <p:nvGrpSpPr>
-        <p:cNvPr id="134" name="Shape 134"/>
-        <p:cNvGrpSpPr/>
-        <p:nvPr/>
-      </p:nvGrpSpPr>
-      <p:grpSpPr>
-        <a:xfrm>
-          <a:off x="0" y="0"/>
-          <a:ext cx="0" cy="0"/>
-          <a:chOff x="0" y="0"/>
-          <a:chExt cx="0" cy="0"/>
-        </a:xfrm>
-      </p:grpSpPr>
-      <p:pic>
-        <p:nvPicPr>
-          <p:cNvPr id="135" name="Google Shape;135;p21"/>
-          <p:cNvPicPr preferRelativeResize="0"/>
-          <p:nvPr/>
-        </p:nvPicPr>
-        <p:blipFill>
-          <a:blip r:embed="rId3">
-            <a:alphaModFix/>
-          </a:blip>
-          <a:stretch>
-            <a:fillRect/>
-          </a:stretch>
-        </p:blipFill>
-        <p:spPr>
-          <a:xfrm>
-            <a:off x="208300" y="921375"/>
-            <a:ext cx="4999151" cy="2952750"/>
-          </a:xfrm>
-          <a:prstGeom prst="rect">
-            <a:avLst/>
-          </a:prstGeom>
-          <a:noFill/>
-          <a:ln>
-            <a:noFill/>
-          </a:ln>
-        </p:spPr>
-      </p:pic>
-      <p:pic>
-        <p:nvPicPr>
-          <p:cNvPr id="136" name="Google Shape;136;p21"/>
-          <p:cNvPicPr preferRelativeResize="0"/>
-          <p:nvPr/>
-        </p:nvPicPr>
-        <p:blipFill>
-          <a:blip r:embed="rId4">
-            <a:alphaModFix/>
-          </a:blip>
-          <a:stretch>
-            <a:fillRect/>
-          </a:stretch>
-        </p:blipFill>
-        <p:spPr>
-          <a:xfrm>
-            <a:off x="5345851" y="1247238"/>
-            <a:ext cx="3631750" cy="2301032"/>
-          </a:xfrm>
-          <a:prstGeom prst="rect">
-            <a:avLst/>
-          </a:prstGeom>
-          <a:noFill/>
-          <a:ln>
-            <a:noFill/>
-          </a:ln>
-        </p:spPr>
-      </p:pic>
-      <p:sp>
-        <p:nvSpPr>
-          <p:cNvPr id="137" name="Google Shape;137;p21"/>
-          <p:cNvSpPr/>
-          <p:nvPr/>
-        </p:nvSpPr>
-        <p:spPr>
-          <a:xfrm rot="-1242391">
-            <a:off x="5804301" y="2595236"/>
-            <a:ext cx="387747" cy="198632"/>
-          </a:xfrm>
-          <a:prstGeom prst="rightArrow">
-            <a:avLst>
-              <a:gd fmla="val 50000" name="adj1"/>
-              <a:gd fmla="val 50000" name="adj2"/>
-            </a:avLst>
-          </a:prstGeom>
-          <a:solidFill>
-            <a:srgbClr val="FF0000"/>
-          </a:solidFill>
-          <a:ln cap="flat" cmpd="sng" w="9525">
-            <a:solidFill>
-              <a:schemeClr val="dk2"/>
-            </a:solidFill>
-            <a:prstDash val="solid"/>
-            <a:round/>
-            <a:headEnd len="sm" w="sm" type="none"/>
-            <a:tailEnd len="sm" w="sm" type="none"/>
-          </a:ln>
-        </p:spPr>
-        <p:txBody>
-          <a:bodyPr anchorCtr="0" anchor="ctr" bIns="91425" lIns="91425" spcFirstLastPara="1" rIns="91425" wrap="square" tIns="91425">
-            <a:noAutofit/>
-          </a:bodyPr>
-          <a:lstStyle/>
-          <a:p>
-            <a:pPr indent="0" lvl="0" marL="0" rtl="0" algn="l">
-              <a:spcBef>
-                <a:spcPts val="0"/>
-              </a:spcBef>
-              <a:spcAft>
-                <a:spcPts val="0"/>
-              </a:spcAft>
-              <a:buNone/>
-            </a:pPr>
-            <a:r>
-              <a:t/>
-            </a:r>
-            <a:endParaRPr/>
-          </a:p>
-        </p:txBody>
-      </p:sp>
-      <p:sp>
-        <p:nvSpPr>
-          <p:cNvPr id="138" name="Google Shape;138;p21"/>
-          <p:cNvSpPr/>
-          <p:nvPr/>
-        </p:nvSpPr>
-        <p:spPr>
-          <a:xfrm rot="10797341">
-            <a:off x="7929241" y="2496488"/>
-            <a:ext cx="387900" cy="198600"/>
-          </a:xfrm>
-          <a:prstGeom prst="rightArrow">
-            <a:avLst>
-              <a:gd fmla="val 50000" name="adj1"/>
-              <a:gd fmla="val 50000" name="adj2"/>
-            </a:avLst>
-          </a:prstGeom>
-          <a:solidFill>
-            <a:srgbClr val="FF0000"/>
-          </a:solidFill>
-          <a:ln cap="flat" cmpd="sng" w="9525">
-            <a:solidFill>
-              <a:schemeClr val="dk2"/>
-            </a:solidFill>
-            <a:prstDash val="solid"/>
-            <a:round/>
-            <a:headEnd len="sm" w="sm" type="none"/>
-            <a:tailEnd len="sm" w="sm" type="none"/>
-          </a:ln>
-        </p:spPr>
-        <p:txBody>
-          <a:bodyPr anchorCtr="0" anchor="ctr" bIns="91425" lIns="91425" spcFirstLastPara="1" rIns="91425" wrap="square" tIns="91425">
-            <a:noAutofit/>
-          </a:bodyPr>
-          <a:lstStyle/>
-          <a:p>
-            <a:pPr indent="0" lvl="0" marL="0" rtl="0" algn="l">
-              <a:spcBef>
-                <a:spcPts val="0"/>
-              </a:spcBef>
-              <a:spcAft>
-                <a:spcPts val="0"/>
-              </a:spcAft>
-              <a:buNone/>
-            </a:pPr>
-            <a:r>
-              <a:t/>
-            </a:r>
-            <a:endParaRPr/>
-          </a:p>
-        </p:txBody>
-      </p:sp>
-      <p:sp>
-        <p:nvSpPr>
-          <p:cNvPr id="139" name="Google Shape;139;p21"/>
-          <p:cNvSpPr txBox="1"/>
-          <p:nvPr/>
-        </p:nvSpPr>
-        <p:spPr>
-          <a:xfrm>
-            <a:off x="2433275" y="176075"/>
-            <a:ext cx="4122300" cy="523200"/>
-          </a:xfrm>
-          <a:prstGeom prst="rect">
-            <a:avLst/>
-          </a:prstGeom>
-          <a:noFill/>
-          <a:ln>
-            <a:noFill/>
-          </a:ln>
-        </p:spPr>
-        <p:txBody>
-          <a:bodyPr anchorCtr="0" anchor="t" bIns="91425" lIns="91425" spcFirstLastPara="1" rIns="91425" wrap="square" tIns="91425">
-            <a:spAutoFit/>
-          </a:bodyPr>
-          <a:lstStyle/>
-          <a:p>
-            <a:pPr indent="0" lvl="0" marL="0" rtl="0" algn="ctr">
-              <a:spcBef>
-                <a:spcPts val="0"/>
-              </a:spcBef>
-              <a:spcAft>
-                <a:spcPts val="0"/>
-              </a:spcAft>
-              <a:buNone/>
-            </a:pPr>
-            <a:r>
-              <a:rPr lang="en" sz="2200">
-                <a:solidFill>
-                  <a:schemeClr val="dk1"/>
-                </a:solidFill>
-                <a:latin typeface="Roboto"/>
-                <a:ea typeface="Roboto"/>
-                <a:cs typeface="Roboto"/>
-                <a:sym typeface="Roboto"/>
-              </a:rPr>
-              <a:t>Analyzing Data</a:t>
-            </a:r>
-            <a:endParaRPr sz="2200">
-              <a:solidFill>
-                <a:schemeClr val="dk1"/>
-              </a:solidFill>
-              <a:latin typeface="Roboto"/>
-              <a:ea typeface="Roboto"/>
-              <a:cs typeface="Roboto"/>
-              <a:sym typeface="Roboto"/>
-            </a:endParaRPr>
-          </a:p>
-        </p:txBody>
-      </p:sp>
-      <p:sp>
-        <p:nvSpPr>
-          <p:cNvPr id="140" name="Google Shape;140;p21"/>
-          <p:cNvSpPr txBox="1"/>
-          <p:nvPr/>
-        </p:nvSpPr>
-        <p:spPr>
-          <a:xfrm>
-            <a:off x="952500" y="4119575"/>
-            <a:ext cx="6540600" cy="615600"/>
-          </a:xfrm>
-          <a:prstGeom prst="rect">
-            <a:avLst/>
-          </a:prstGeom>
-          <a:noFill/>
-          <a:ln>
-            <a:noFill/>
-          </a:ln>
-        </p:spPr>
-        <p:txBody>
-          <a:bodyPr anchorCtr="0" anchor="t" bIns="91425" lIns="91425" spcFirstLastPara="1" rIns="91425" wrap="square" tIns="91425">
-            <a:spAutoFit/>
-          </a:bodyPr>
-          <a:lstStyle/>
-          <a:p>
-            <a:pPr indent="0" lvl="0" marL="0" rtl="0" algn="ctr">
-              <a:spcBef>
-                <a:spcPts val="0"/>
-              </a:spcBef>
-              <a:spcAft>
-                <a:spcPts val="0"/>
-              </a:spcAft>
-              <a:buNone/>
-            </a:pPr>
-            <a:r>
-              <a:rPr lang="en">
-                <a:solidFill>
-                  <a:schemeClr val="dk1"/>
-                </a:solidFill>
-                <a:latin typeface="Roboto"/>
-                <a:ea typeface="Roboto"/>
-                <a:cs typeface="Roboto"/>
-                <a:sym typeface="Roboto"/>
-              </a:rPr>
-              <a:t>There is a </a:t>
-            </a:r>
-            <a:r>
-              <a:rPr lang="en">
-                <a:solidFill>
-                  <a:schemeClr val="dk1"/>
-                </a:solidFill>
-                <a:latin typeface="Roboto"/>
-                <a:ea typeface="Roboto"/>
-                <a:cs typeface="Roboto"/>
-                <a:sym typeface="Roboto"/>
-              </a:rPr>
-              <a:t>significant</a:t>
-            </a:r>
-            <a:r>
-              <a:rPr lang="en">
-                <a:solidFill>
-                  <a:schemeClr val="dk1"/>
-                </a:solidFill>
-                <a:latin typeface="Roboto"/>
-                <a:ea typeface="Roboto"/>
-                <a:cs typeface="Roboto"/>
-                <a:sym typeface="Roboto"/>
-              </a:rPr>
-              <a:t> increase (p=8e-06) in how many laws were proposed as the linear model suggests.  In congress 116 nearly 4200 laws were proposed.</a:t>
-            </a:r>
-            <a:endParaRPr>
-              <a:solidFill>
-                <a:schemeClr val="dk1"/>
-              </a:solidFill>
-              <a:latin typeface="Roboto"/>
-              <a:ea typeface="Roboto"/>
-              <a:cs typeface="Roboto"/>
-              <a:sym typeface="Roboto"/>
-            </a:endParaRPr>
-          </a:p>
-        </p:txBody>
-      </p:sp>
-      <p:sp>
-        <p:nvSpPr>
-          <p:cNvPr id="141" name="Google Shape;141;p21"/>
-          <p:cNvSpPr/>
-          <p:nvPr/>
-        </p:nvSpPr>
-        <p:spPr>
-          <a:xfrm>
-            <a:off x="3524250" y="1301750"/>
-            <a:ext cx="412800" cy="190500"/>
           </a:xfrm>
           <a:prstGeom prst="leftArrow">
             <a:avLst>

</xml_diff>